<commit_message>
feat: Make head way for the powerpoint
</commit_message>
<xml_diff>
--- a/Báo cáo/ThesisReport.pptx
+++ b/Báo cáo/ThesisReport.pptx
@@ -5,7 +5,7 @@
     <p:sldMasterId id="2147483648" r:id="rId1"/>
   </p:sldMasterIdLst>
   <p:notesMasterIdLst>
-    <p:notesMasterId r:id="rId32"/>
+    <p:notesMasterId r:id="rId33"/>
   </p:notesMasterIdLst>
   <p:sldIdLst>
     <p:sldId id="271" r:id="rId2"/>
@@ -16,8 +16,8 @@
     <p:sldId id="286" r:id="rId7"/>
     <p:sldId id="281" r:id="rId8"/>
     <p:sldId id="284" r:id="rId9"/>
-    <p:sldId id="300" r:id="rId10"/>
-    <p:sldId id="299" r:id="rId11"/>
+    <p:sldId id="299" r:id="rId10"/>
+    <p:sldId id="300" r:id="rId11"/>
     <p:sldId id="292" r:id="rId12"/>
     <p:sldId id="296" r:id="rId13"/>
     <p:sldId id="293" r:id="rId14"/>
@@ -32,12 +32,13 @@
     <p:sldId id="278" r:id="rId23"/>
     <p:sldId id="285" r:id="rId24"/>
     <p:sldId id="279" r:id="rId25"/>
-    <p:sldId id="273" r:id="rId26"/>
-    <p:sldId id="272" r:id="rId27"/>
-    <p:sldId id="270" r:id="rId28"/>
-    <p:sldId id="261" r:id="rId29"/>
-    <p:sldId id="283" r:id="rId30"/>
-    <p:sldId id="267" r:id="rId31"/>
+    <p:sldId id="301" r:id="rId26"/>
+    <p:sldId id="273" r:id="rId27"/>
+    <p:sldId id="272" r:id="rId28"/>
+    <p:sldId id="270" r:id="rId29"/>
+    <p:sldId id="261" r:id="rId30"/>
+    <p:sldId id="283" r:id="rId31"/>
+    <p:sldId id="267" r:id="rId32"/>
   </p:sldIdLst>
   <p:sldSz cx="12192000" cy="6858000"/>
   <p:notesSz cx="6858000" cy="9144000"/>
@@ -226,7 +227,7 @@
           <a:p>
             <a:fld id="{36BB93D1-677A-4727-ACB1-B4ED1776CBF7}" type="datetimeFigureOut">
               <a:rPr lang="vi-VN" smtClean="0"/>
-              <a:t>10/12/2025</a:t>
+              <a:t>11/12/2025</a:t>
             </a:fld>
             <a:endParaRPr lang="vi-VN"/>
           </a:p>
@@ -522,6 +523,13 @@
           </p:nvPr>
         </p:nvSpPr>
         <p:spPr/>
+        <p:txBody>
+          <a:bodyPr/>
+          <a:lstStyle/>
+          <a:p>
+            <a:endParaRPr lang="en-US"/>
+          </a:p>
+        </p:txBody>
       </p:sp>
       <p:sp>
         <p:nvSpPr>
@@ -618,6 +626,13 @@
           </p:nvPr>
         </p:nvSpPr>
         <p:spPr/>
+        <p:txBody>
+          <a:bodyPr/>
+          <a:lstStyle/>
+          <a:p>
+            <a:endParaRPr lang="en-US"/>
+          </a:p>
+        </p:txBody>
       </p:sp>
       <p:sp>
         <p:nvSpPr>
@@ -726,6 +741,13 @@
           </p:nvPr>
         </p:nvSpPr>
         <p:spPr/>
+        <p:txBody>
+          <a:bodyPr/>
+          <a:lstStyle/>
+          <a:p>
+            <a:endParaRPr lang="en-US"/>
+          </a:p>
+        </p:txBody>
       </p:sp>
       <p:sp>
         <p:nvSpPr>
@@ -834,6 +856,13 @@
           </p:nvPr>
         </p:nvSpPr>
         <p:spPr/>
+        <p:txBody>
+          <a:bodyPr/>
+          <a:lstStyle/>
+          <a:p>
+            <a:endParaRPr lang="en-US"/>
+          </a:p>
+        </p:txBody>
       </p:sp>
       <p:sp>
         <p:nvSpPr>
@@ -942,6 +971,13 @@
           </p:nvPr>
         </p:nvSpPr>
         <p:spPr/>
+        <p:txBody>
+          <a:bodyPr/>
+          <a:lstStyle/>
+          <a:p>
+            <a:endParaRPr lang="en-US"/>
+          </a:p>
+        </p:txBody>
       </p:sp>
       <p:sp>
         <p:nvSpPr>
@@ -1050,6 +1086,13 @@
           </p:nvPr>
         </p:nvSpPr>
         <p:spPr/>
+        <p:txBody>
+          <a:bodyPr/>
+          <a:lstStyle/>
+          <a:p>
+            <a:endParaRPr lang="en-US"/>
+          </a:p>
+        </p:txBody>
       </p:sp>
       <p:sp>
         <p:nvSpPr>
@@ -1221,7 +1264,7 @@
           <a:p>
             <a:fld id="{A67E2EB4-AAAC-4D92-8F4B-6C8B3AB9BD3F}" type="slidenum">
               <a:rPr lang="vi-VN" smtClean="0"/>
-              <a:t>26</a:t>
+              <a:t>27</a:t>
             </a:fld>
             <a:endParaRPr lang="vi-VN"/>
           </a:p>
@@ -1324,7 +1367,7 @@
           <a:p>
             <a:fld id="{A67E2EB4-AAAC-4D92-8F4B-6C8B3AB9BD3F}" type="slidenum">
               <a:rPr lang="vi-VN" smtClean="0"/>
-              <a:t>27</a:t>
+              <a:t>28</a:t>
             </a:fld>
             <a:endParaRPr lang="vi-VN"/>
           </a:p>
@@ -1383,6 +1426,13 @@
           </p:nvPr>
         </p:nvSpPr>
         <p:spPr/>
+        <p:txBody>
+          <a:bodyPr/>
+          <a:lstStyle/>
+          <a:p>
+            <a:endParaRPr lang="en-US"/>
+          </a:p>
+        </p:txBody>
       </p:sp>
       <p:sp>
         <p:nvSpPr>
@@ -1432,7 +1482,7 @@
           <a:p>
             <a:fld id="{A67E2EB4-AAAC-4D92-8F4B-6C8B3AB9BD3F}" type="slidenum">
               <a:rPr lang="vi-VN" smtClean="0"/>
-              <a:t>29</a:t>
+              <a:t>30</a:t>
             </a:fld>
             <a:endParaRPr lang="vi-VN"/>
           </a:p>
@@ -1491,6 +1541,13 @@
           </p:nvPr>
         </p:nvSpPr>
         <p:spPr/>
+        <p:txBody>
+          <a:bodyPr/>
+          <a:lstStyle/>
+          <a:p>
+            <a:endParaRPr lang="en-US"/>
+          </a:p>
+        </p:txBody>
       </p:sp>
       <p:sp>
         <p:nvSpPr>
@@ -1599,6 +1656,13 @@
           </p:nvPr>
         </p:nvSpPr>
         <p:spPr/>
+        <p:txBody>
+          <a:bodyPr/>
+          <a:lstStyle/>
+          <a:p>
+            <a:endParaRPr lang="en-US"/>
+          </a:p>
+        </p:txBody>
       </p:sp>
       <p:sp>
         <p:nvSpPr>
@@ -1707,6 +1771,13 @@
           </p:nvPr>
         </p:nvSpPr>
         <p:spPr/>
+        <p:txBody>
+          <a:bodyPr/>
+          <a:lstStyle/>
+          <a:p>
+            <a:endParaRPr lang="en-US"/>
+          </a:p>
+        </p:txBody>
       </p:sp>
       <p:sp>
         <p:nvSpPr>
@@ -1815,6 +1886,13 @@
           </p:nvPr>
         </p:nvSpPr>
         <p:spPr/>
+        <p:txBody>
+          <a:bodyPr/>
+          <a:lstStyle/>
+          <a:p>
+            <a:endParaRPr lang="en-US"/>
+          </a:p>
+        </p:txBody>
       </p:sp>
       <p:sp>
         <p:nvSpPr>
@@ -1884,6 +1962,121 @@
 </file>
 
 <file path=ppt/notesSlides/notesSlide6.xml><?xml version="1.0" encoding="utf-8"?>
+<p:notes xmlns:a="http://schemas.openxmlformats.org/drawingml/2006/main" xmlns:r="http://schemas.openxmlformats.org/officeDocument/2006/relationships" xmlns:p="http://schemas.openxmlformats.org/presentationml/2006/main">
+  <p:cSld>
+    <p:spTree>
+      <p:nvGrpSpPr>
+        <p:cNvPr id="1" name="">
+          <a:extLst>
+            <a:ext uri="{FF2B5EF4-FFF2-40B4-BE49-F238E27FC236}">
+              <a16:creationId xmlns:a16="http://schemas.microsoft.com/office/drawing/2014/main" id="{651C9864-09C4-6054-51AE-EF6145664A7E}"/>
+            </a:ext>
+          </a:extLst>
+        </p:cNvPr>
+        <p:cNvGrpSpPr/>
+        <p:nvPr/>
+      </p:nvGrpSpPr>
+      <p:grpSpPr>
+        <a:xfrm>
+          <a:off x="0" y="0"/>
+          <a:ext cx="0" cy="0"/>
+          <a:chOff x="0" y="0"/>
+          <a:chExt cx="0" cy="0"/>
+        </a:xfrm>
+      </p:grpSpPr>
+      <p:sp>
+        <p:nvSpPr>
+          <p:cNvPr id="2" name="Slide Image Placeholder 1">
+            <a:extLst>
+              <a:ext uri="{FF2B5EF4-FFF2-40B4-BE49-F238E27FC236}">
+                <a16:creationId xmlns:a16="http://schemas.microsoft.com/office/drawing/2014/main" id="{46447CCC-3455-EB21-8BCD-2FE5D89A2B2E}"/>
+              </a:ext>
+            </a:extLst>
+          </p:cNvPr>
+          <p:cNvSpPr>
+            <a:spLocks noGrp="1" noRot="1" noChangeAspect="1"/>
+          </p:cNvSpPr>
+          <p:nvPr>
+            <p:ph type="sldImg"/>
+          </p:nvPr>
+        </p:nvSpPr>
+        <p:spPr/>
+        <p:txBody>
+          <a:bodyPr/>
+          <a:lstStyle/>
+          <a:p>
+            <a:endParaRPr lang="en-US"/>
+          </a:p>
+        </p:txBody>
+      </p:sp>
+      <p:sp>
+        <p:nvSpPr>
+          <p:cNvPr id="3" name="Notes Placeholder 2">
+            <a:extLst>
+              <a:ext uri="{FF2B5EF4-FFF2-40B4-BE49-F238E27FC236}">
+                <a16:creationId xmlns:a16="http://schemas.microsoft.com/office/drawing/2014/main" id="{2FED74A4-0917-7F79-352A-367026DCD2FE}"/>
+              </a:ext>
+            </a:extLst>
+          </p:cNvPr>
+          <p:cNvSpPr>
+            <a:spLocks noGrp="1"/>
+          </p:cNvSpPr>
+          <p:nvPr>
+            <p:ph type="body" idx="1"/>
+          </p:nvPr>
+        </p:nvSpPr>
+        <p:spPr/>
+        <p:txBody>
+          <a:bodyPr/>
+          <a:lstStyle/>
+          <a:p>
+            <a:endParaRPr lang="en-US" dirty="0"/>
+          </a:p>
+        </p:txBody>
+      </p:sp>
+      <p:sp>
+        <p:nvSpPr>
+          <p:cNvPr id="4" name="Slide Number Placeholder 3">
+            <a:extLst>
+              <a:ext uri="{FF2B5EF4-FFF2-40B4-BE49-F238E27FC236}">
+                <a16:creationId xmlns:a16="http://schemas.microsoft.com/office/drawing/2014/main" id="{9D7E5CA7-A5B7-5F79-F8FD-B8F4C922A232}"/>
+              </a:ext>
+            </a:extLst>
+          </p:cNvPr>
+          <p:cNvSpPr>
+            <a:spLocks noGrp="1"/>
+          </p:cNvSpPr>
+          <p:nvPr>
+            <p:ph type="sldNum" sz="quarter" idx="5"/>
+          </p:nvPr>
+        </p:nvSpPr>
+        <p:spPr/>
+        <p:txBody>
+          <a:bodyPr/>
+          <a:lstStyle/>
+          <a:p>
+            <a:fld id="{A67E2EB4-AAAC-4D92-8F4B-6C8B3AB9BD3F}" type="slidenum">
+              <a:rPr lang="vi-VN" smtClean="0"/>
+              <a:t>9</a:t>
+            </a:fld>
+            <a:endParaRPr lang="vi-VN"/>
+          </a:p>
+        </p:txBody>
+      </p:sp>
+    </p:spTree>
+    <p:extLst>
+      <p:ext uri="{BB962C8B-B14F-4D97-AF65-F5344CB8AC3E}">
+        <p14:creationId xmlns:p14="http://schemas.microsoft.com/office/powerpoint/2010/main" val="1375273524"/>
+      </p:ext>
+    </p:extLst>
+  </p:cSld>
+  <p:clrMapOvr>
+    <a:masterClrMapping/>
+  </p:clrMapOvr>
+</p:notes>
+</file>
+
+<file path=ppt/notesSlides/notesSlide7.xml><?xml version="1.0" encoding="utf-8"?>
 <p:notes xmlns:a="http://schemas.openxmlformats.org/drawingml/2006/main" xmlns:r="http://schemas.openxmlformats.org/officeDocument/2006/relationships" xmlns:p="http://schemas.openxmlformats.org/presentationml/2006/main">
   <p:cSld>
     <p:spTree>
@@ -1923,6 +2116,13 @@
           </p:nvPr>
         </p:nvSpPr>
         <p:spPr/>
+        <p:txBody>
+          <a:bodyPr/>
+          <a:lstStyle/>
+          <a:p>
+            <a:endParaRPr lang="en-US"/>
+          </a:p>
+        </p:txBody>
       </p:sp>
       <p:sp>
         <p:nvSpPr>
@@ -1972,7 +2172,7 @@
           <a:p>
             <a:fld id="{A67E2EB4-AAAC-4D92-8F4B-6C8B3AB9BD3F}" type="slidenum">
               <a:rPr lang="vi-VN" smtClean="0"/>
-              <a:t>9</a:t>
+              <a:t>10</a:t>
             </a:fld>
             <a:endParaRPr lang="vi-VN"/>
           </a:p>
@@ -1982,114 +2182,6 @@
     <p:extLst>
       <p:ext uri="{BB962C8B-B14F-4D97-AF65-F5344CB8AC3E}">
         <p14:creationId xmlns:p14="http://schemas.microsoft.com/office/powerpoint/2010/main" val="3439148564"/>
-      </p:ext>
-    </p:extLst>
-  </p:cSld>
-  <p:clrMapOvr>
-    <a:masterClrMapping/>
-  </p:clrMapOvr>
-</p:notes>
-</file>
-
-<file path=ppt/notesSlides/notesSlide7.xml><?xml version="1.0" encoding="utf-8"?>
-<p:notes xmlns:a="http://schemas.openxmlformats.org/drawingml/2006/main" xmlns:r="http://schemas.openxmlformats.org/officeDocument/2006/relationships" xmlns:p="http://schemas.openxmlformats.org/presentationml/2006/main">
-  <p:cSld>
-    <p:spTree>
-      <p:nvGrpSpPr>
-        <p:cNvPr id="1" name="">
-          <a:extLst>
-            <a:ext uri="{FF2B5EF4-FFF2-40B4-BE49-F238E27FC236}">
-              <a16:creationId xmlns:a16="http://schemas.microsoft.com/office/drawing/2014/main" id="{651C9864-09C4-6054-51AE-EF6145664A7E}"/>
-            </a:ext>
-          </a:extLst>
-        </p:cNvPr>
-        <p:cNvGrpSpPr/>
-        <p:nvPr/>
-      </p:nvGrpSpPr>
-      <p:grpSpPr>
-        <a:xfrm>
-          <a:off x="0" y="0"/>
-          <a:ext cx="0" cy="0"/>
-          <a:chOff x="0" y="0"/>
-          <a:chExt cx="0" cy="0"/>
-        </a:xfrm>
-      </p:grpSpPr>
-      <p:sp>
-        <p:nvSpPr>
-          <p:cNvPr id="2" name="Slide Image Placeholder 1">
-            <a:extLst>
-              <a:ext uri="{FF2B5EF4-FFF2-40B4-BE49-F238E27FC236}">
-                <a16:creationId xmlns:a16="http://schemas.microsoft.com/office/drawing/2014/main" id="{46447CCC-3455-EB21-8BCD-2FE5D89A2B2E}"/>
-              </a:ext>
-            </a:extLst>
-          </p:cNvPr>
-          <p:cNvSpPr>
-            <a:spLocks noGrp="1" noRot="1" noChangeAspect="1"/>
-          </p:cNvSpPr>
-          <p:nvPr>
-            <p:ph type="sldImg"/>
-          </p:nvPr>
-        </p:nvSpPr>
-        <p:spPr/>
-      </p:sp>
-      <p:sp>
-        <p:nvSpPr>
-          <p:cNvPr id="3" name="Notes Placeholder 2">
-            <a:extLst>
-              <a:ext uri="{FF2B5EF4-FFF2-40B4-BE49-F238E27FC236}">
-                <a16:creationId xmlns:a16="http://schemas.microsoft.com/office/drawing/2014/main" id="{2FED74A4-0917-7F79-352A-367026DCD2FE}"/>
-              </a:ext>
-            </a:extLst>
-          </p:cNvPr>
-          <p:cNvSpPr>
-            <a:spLocks noGrp="1"/>
-          </p:cNvSpPr>
-          <p:nvPr>
-            <p:ph type="body" idx="1"/>
-          </p:nvPr>
-        </p:nvSpPr>
-        <p:spPr/>
-        <p:txBody>
-          <a:bodyPr/>
-          <a:lstStyle/>
-          <a:p>
-            <a:endParaRPr lang="en-US" dirty="0"/>
-          </a:p>
-        </p:txBody>
-      </p:sp>
-      <p:sp>
-        <p:nvSpPr>
-          <p:cNvPr id="4" name="Slide Number Placeholder 3">
-            <a:extLst>
-              <a:ext uri="{FF2B5EF4-FFF2-40B4-BE49-F238E27FC236}">
-                <a16:creationId xmlns:a16="http://schemas.microsoft.com/office/drawing/2014/main" id="{9D7E5CA7-A5B7-5F79-F8FD-B8F4C922A232}"/>
-              </a:ext>
-            </a:extLst>
-          </p:cNvPr>
-          <p:cNvSpPr>
-            <a:spLocks noGrp="1"/>
-          </p:cNvSpPr>
-          <p:nvPr>
-            <p:ph type="sldNum" sz="quarter" idx="5"/>
-          </p:nvPr>
-        </p:nvSpPr>
-        <p:spPr/>
-        <p:txBody>
-          <a:bodyPr/>
-          <a:lstStyle/>
-          <a:p>
-            <a:fld id="{A67E2EB4-AAAC-4D92-8F4B-6C8B3AB9BD3F}" type="slidenum">
-              <a:rPr lang="vi-VN" smtClean="0"/>
-              <a:t>10</a:t>
-            </a:fld>
-            <a:endParaRPr lang="vi-VN"/>
-          </a:p>
-        </p:txBody>
-      </p:sp>
-    </p:spTree>
-    <p:extLst>
-      <p:ext uri="{BB962C8B-B14F-4D97-AF65-F5344CB8AC3E}">
-        <p14:creationId xmlns:p14="http://schemas.microsoft.com/office/powerpoint/2010/main" val="1375273524"/>
       </p:ext>
     </p:extLst>
   </p:cSld>
@@ -2139,6 +2231,13 @@
           </p:nvPr>
         </p:nvSpPr>
         <p:spPr/>
+        <p:txBody>
+          <a:bodyPr/>
+          <a:lstStyle/>
+          <a:p>
+            <a:endParaRPr lang="en-US"/>
+          </a:p>
+        </p:txBody>
       </p:sp>
       <p:sp>
         <p:nvSpPr>
@@ -2247,6 +2346,13 @@
           </p:nvPr>
         </p:nvSpPr>
         <p:spPr/>
+        <p:txBody>
+          <a:bodyPr/>
+          <a:lstStyle/>
+          <a:p>
+            <a:endParaRPr lang="en-US"/>
+          </a:p>
+        </p:txBody>
       </p:sp>
       <p:sp>
         <p:nvSpPr>
@@ -3103,7 +3209,7 @@
             <a:fld id="{D86B3AB3-BDCC-41BF-8781-963E853753C3}" type="datetime1">
               <a:rPr lang="en-US" smtClean="0"/>
               <a:pPr/>
-              <a:t>10-Dec-25</a:t>
+              <a:t>11-Dec-25</a:t>
             </a:fld>
             <a:endParaRPr lang="en-US"/>
           </a:p>
@@ -4376,7 +4482,7 @@
             <a:fld id="{D86B3AB3-BDCC-41BF-8781-963E853753C3}" type="datetime1">
               <a:rPr lang="en-US" smtClean="0"/>
               <a:pPr/>
-              <a:t>10-Dec-25</a:t>
+              <a:t>11-Dec-25</a:t>
             </a:fld>
             <a:endParaRPr lang="en-US"/>
           </a:p>
@@ -5473,7 +5579,7 @@
             <a:fld id="{D86B3AB3-BDCC-41BF-8781-963E853753C3}" type="datetime1">
               <a:rPr lang="en-US" smtClean="0"/>
               <a:pPr/>
-              <a:t>10-Dec-25</a:t>
+              <a:t>11-Dec-25</a:t>
             </a:fld>
             <a:endParaRPr lang="en-US"/>
           </a:p>
@@ -6598,7 +6704,7 @@
             <a:fld id="{D86B3AB3-BDCC-41BF-8781-963E853753C3}" type="datetime1">
               <a:rPr lang="en-US" smtClean="0"/>
               <a:pPr/>
-              <a:t>10-Dec-25</a:t>
+              <a:t>11-Dec-25</a:t>
             </a:fld>
             <a:endParaRPr lang="en-US"/>
           </a:p>
@@ -7581,7 +7687,7 @@
             <a:fld id="{D86B3AB3-BDCC-41BF-8781-963E853753C3}" type="datetime1">
               <a:rPr lang="en-US" smtClean="0"/>
               <a:pPr/>
-              <a:t>10-Dec-25</a:t>
+              <a:t>11-Dec-25</a:t>
             </a:fld>
             <a:endParaRPr lang="en-US"/>
           </a:p>
@@ -8564,7 +8670,7 @@
             <a:fld id="{D86B3AB3-BDCC-41BF-8781-963E853753C3}" type="datetime1">
               <a:rPr lang="en-US" smtClean="0"/>
               <a:pPr/>
-              <a:t>10-Dec-25</a:t>
+              <a:t>11-Dec-25</a:t>
             </a:fld>
             <a:endParaRPr lang="en-US"/>
           </a:p>
@@ -9568,7 +9674,7 @@
             <a:fld id="{D86B3AB3-BDCC-41BF-8781-963E853753C3}" type="datetime1">
               <a:rPr lang="en-US" smtClean="0"/>
               <a:pPr/>
-              <a:t>10-Dec-25</a:t>
+              <a:t>11-Dec-25</a:t>
             </a:fld>
             <a:endParaRPr lang="en-US"/>
           </a:p>
@@ -10657,7 +10763,7 @@
             <a:fld id="{D86B3AB3-BDCC-41BF-8781-963E853753C3}" type="datetime1">
               <a:rPr lang="en-US" smtClean="0"/>
               <a:pPr/>
-              <a:t>10-Dec-25</a:t>
+              <a:t>11-Dec-25</a:t>
             </a:fld>
             <a:endParaRPr lang="en-US"/>
           </a:p>
@@ -11567,7 +11673,7 @@
             <a:fld id="{D86B3AB3-BDCC-41BF-8781-963E853753C3}" type="datetime1">
               <a:rPr lang="en-US" smtClean="0"/>
               <a:pPr/>
-              <a:t>10-Dec-25</a:t>
+              <a:t>11-Dec-25</a:t>
             </a:fld>
             <a:endParaRPr lang="en-US"/>
           </a:p>
@@ -13014,7 +13120,7 @@
             <a:fld id="{D86B3AB3-BDCC-41BF-8781-963E853753C3}" type="datetime1">
               <a:rPr lang="en-US" smtClean="0"/>
               <a:pPr/>
-              <a:t>10-Dec-25</a:t>
+              <a:t>11-Dec-25</a:t>
             </a:fld>
             <a:endParaRPr lang="en-US"/>
           </a:p>
@@ -14233,7 +14339,7 @@
             <a:fld id="{D86B3AB3-BDCC-41BF-8781-963E853753C3}" type="datetime1">
               <a:rPr lang="en-US" smtClean="0"/>
               <a:pPr/>
-              <a:t>10-Dec-25</a:t>
+              <a:t>11-Dec-25</a:t>
             </a:fld>
             <a:endParaRPr lang="en-US"/>
           </a:p>
@@ -15054,7 +15160,7 @@
             <a:fld id="{D86B3AB3-BDCC-41BF-8781-963E853753C3}" type="datetime1">
               <a:rPr lang="en-US" smtClean="0"/>
               <a:pPr/>
-              <a:t>10-Dec-25</a:t>
+              <a:t>11-Dec-25</a:t>
             </a:fld>
             <a:endParaRPr lang="en-US"/>
           </a:p>
@@ -16264,7 +16370,7 @@
             <a:fld id="{D86B3AB3-BDCC-41BF-8781-963E853753C3}" type="datetime1">
               <a:rPr lang="en-US" smtClean="0"/>
               <a:pPr/>
-              <a:t>10-Dec-25</a:t>
+              <a:t>11-Dec-25</a:t>
             </a:fld>
             <a:endParaRPr lang="en-US"/>
           </a:p>
@@ -17108,7 +17214,7 @@
             <a:fld id="{D86B3AB3-BDCC-41BF-8781-963E853753C3}" type="datetime1">
               <a:rPr lang="en-US" smtClean="0"/>
               <a:pPr/>
-              <a:t>10-Dec-25</a:t>
+              <a:t>11-Dec-25</a:t>
             </a:fld>
             <a:endParaRPr lang="en-US"/>
           </a:p>
@@ -17813,7 +17919,7 @@
             <a:fld id="{D86B3AB3-BDCC-41BF-8781-963E853753C3}" type="datetime1">
               <a:rPr lang="en-US" smtClean="0"/>
               <a:pPr/>
-              <a:t>10-Dec-25</a:t>
+              <a:t>11-Dec-25</a:t>
             </a:fld>
             <a:endParaRPr lang="en-US"/>
           </a:p>
@@ -18539,7 +18645,7 @@
             <a:fld id="{D86B3AB3-BDCC-41BF-8781-963E853753C3}" type="datetime1">
               <a:rPr lang="en-US" smtClean="0"/>
               <a:pPr/>
-              <a:t>10-Dec-25</a:t>
+              <a:t>11-Dec-25</a:t>
             </a:fld>
             <a:endParaRPr lang="en-US"/>
           </a:p>
@@ -19339,7 +19445,7 @@
             <a:fld id="{D86B3AB3-BDCC-41BF-8781-963E853753C3}" type="datetime1">
               <a:rPr lang="en-US" smtClean="0"/>
               <a:pPr/>
-              <a:t>10-Dec-25</a:t>
+              <a:t>11-Dec-25</a:t>
             </a:fld>
             <a:endParaRPr lang="en-US"/>
           </a:p>
@@ -20142,7 +20248,7 @@
             <a:fld id="{D86B3AB3-BDCC-41BF-8781-963E853753C3}" type="datetime1">
               <a:rPr lang="en-US" smtClean="0"/>
               <a:pPr/>
-              <a:t>10-Dec-25</a:t>
+              <a:t>11-Dec-25</a:t>
             </a:fld>
             <a:endParaRPr lang="en-US"/>
           </a:p>
@@ -23116,7 +23222,7 @@
             <a:fld id="{D86B3AB3-BDCC-41BF-8781-963E853753C3}" type="datetime1">
               <a:rPr lang="en-US" smtClean="0"/>
               <a:pPr/>
-              <a:t>10-Dec-25</a:t>
+              <a:t>11-Dec-25</a:t>
             </a:fld>
             <a:endParaRPr lang="en-US"/>
           </a:p>
@@ -26246,7 +26352,7 @@
             <a:fld id="{D86B3AB3-BDCC-41BF-8781-963E853753C3}" type="datetime1">
               <a:rPr lang="en-US" smtClean="0"/>
               <a:pPr/>
-              <a:t>10-Dec-25</a:t>
+              <a:t>11-Dec-25</a:t>
             </a:fld>
             <a:endParaRPr lang="en-US"/>
           </a:p>
@@ -27262,7 +27368,7 @@
             <a:fld id="{D86B3AB3-BDCC-41BF-8781-963E853753C3}" type="datetime1">
               <a:rPr lang="en-US" smtClean="0"/>
               <a:pPr/>
-              <a:t>10-Dec-25</a:t>
+              <a:t>11-Dec-25</a:t>
             </a:fld>
             <a:endParaRPr lang="en-US"/>
           </a:p>
@@ -29364,7 +29470,7 @@
             <a:fld id="{D86B3AB3-BDCC-41BF-8781-963E853753C3}" type="datetime1">
               <a:rPr lang="en-US" smtClean="0"/>
               <a:pPr/>
-              <a:t>10-Dec-25</a:t>
+              <a:t>11-Dec-25</a:t>
             </a:fld>
             <a:endParaRPr lang="en-US"/>
           </a:p>
@@ -31559,7 +31665,7 @@
             <a:fld id="{D86B3AB3-BDCC-41BF-8781-963E853753C3}" type="datetime1">
               <a:rPr lang="en-US" smtClean="0"/>
               <a:pPr/>
-              <a:t>10-Dec-25</a:t>
+              <a:t>11-Dec-25</a:t>
             </a:fld>
             <a:endParaRPr lang="en-US"/>
           </a:p>
@@ -32746,7 +32852,7 @@
             <a:fld id="{D86B3AB3-BDCC-41BF-8781-963E853753C3}" type="datetime1">
               <a:rPr lang="en-US" smtClean="0"/>
               <a:pPr/>
-              <a:t>10-Dec-25</a:t>
+              <a:t>11-Dec-25</a:t>
             </a:fld>
             <a:endParaRPr lang="en-US"/>
           </a:p>
@@ -33826,7 +33932,7 @@
             <a:fld id="{D86B3AB3-BDCC-41BF-8781-963E853753C3}" type="datetime1">
               <a:rPr lang="en-US" smtClean="0"/>
               <a:pPr/>
-              <a:t>10-Dec-25</a:t>
+              <a:t>11-Dec-25</a:t>
             </a:fld>
             <a:endParaRPr lang="en-US"/>
           </a:p>
@@ -34783,7 +34889,7 @@
             <a:fld id="{D86B3AB3-BDCC-41BF-8781-963E853753C3}" type="datetime1">
               <a:rPr lang="en-US" smtClean="0"/>
               <a:pPr/>
-              <a:t>10-Dec-25</a:t>
+              <a:t>11-Dec-25</a:t>
             </a:fld>
             <a:endParaRPr lang="en-US"/>
           </a:p>
@@ -35686,7 +35792,7 @@
             <a:fld id="{D86B3AB3-BDCC-41BF-8781-963E853753C3}" type="datetime1">
               <a:rPr lang="en-US" smtClean="0"/>
               <a:pPr/>
-              <a:t>10-Dec-25</a:t>
+              <a:t>11-Dec-25</a:t>
             </a:fld>
             <a:endParaRPr lang="en-US"/>
           </a:p>
@@ -36621,7 +36727,7 @@
             <a:fld id="{D86B3AB3-BDCC-41BF-8781-963E853753C3}" type="datetime1">
               <a:rPr lang="en-US" smtClean="0"/>
               <a:pPr/>
-              <a:t>10-Dec-25</a:t>
+              <a:t>11-Dec-25</a:t>
             </a:fld>
             <a:endParaRPr lang="en-US"/>
           </a:p>
@@ -37650,7 +37756,7 @@
             <a:fld id="{D86B3AB3-BDCC-41BF-8781-963E853753C3}" type="datetime1">
               <a:rPr lang="en-US" smtClean="0"/>
               <a:pPr/>
-              <a:t>10-Dec-25</a:t>
+              <a:t>11-Dec-25</a:t>
             </a:fld>
             <a:endParaRPr lang="en-US"/>
           </a:p>
@@ -38041,7 +38147,7 @@
             <a:fld id="{00D1CE85-AA59-46D7-98F4-301D80B40614}" type="datetimeFigureOut">
               <a:rPr lang="en-US" smtClean="0"/>
               <a:pPr/>
-              <a:t>10-Dec-25</a:t>
+              <a:t>11-Dec-25</a:t>
             </a:fld>
             <a:endParaRPr lang="en-US"/>
           </a:p>
@@ -38638,7 +38744,7 @@
         <p:cNvPr id="1" name="">
           <a:extLst>
             <a:ext uri="{FF2B5EF4-FFF2-40B4-BE49-F238E27FC236}">
-              <a16:creationId xmlns:a16="http://schemas.microsoft.com/office/drawing/2014/main" id="{D6B3302F-2E3A-0B18-A55E-29D4E3309E6D}"/>
+              <a16:creationId xmlns:a16="http://schemas.microsoft.com/office/drawing/2014/main" id="{0620BF8C-2B1D-347D-08A0-5065EC1622FD}"/>
             </a:ext>
           </a:extLst>
         </p:cNvPr>
@@ -38658,7 +38764,7 @@
           <p:cNvPr id="2" name="Title 1">
             <a:extLst>
               <a:ext uri="{FF2B5EF4-FFF2-40B4-BE49-F238E27FC236}">
-                <a16:creationId xmlns:a16="http://schemas.microsoft.com/office/drawing/2014/main" id="{0DE05624-1CA7-765B-EB72-63043428EF7A}"/>
+                <a16:creationId xmlns:a16="http://schemas.microsoft.com/office/drawing/2014/main" id="{0C001596-C9BF-FDEE-FF39-A9F8DD96F9A7}"/>
               </a:ext>
             </a:extLst>
           </p:cNvPr>
@@ -38686,7 +38792,7 @@
           <p:cNvPr id="3" name="Content Placeholder 2">
             <a:extLst>
               <a:ext uri="{FF2B5EF4-FFF2-40B4-BE49-F238E27FC236}">
-                <a16:creationId xmlns:a16="http://schemas.microsoft.com/office/drawing/2014/main" id="{2670AC88-4913-68CD-4E45-70F0D66C536D}"/>
+                <a16:creationId xmlns:a16="http://schemas.microsoft.com/office/drawing/2014/main" id="{079AD8B6-ECCA-266A-0B15-B3B8B2A60770}"/>
               </a:ext>
             </a:extLst>
           </p:cNvPr>
@@ -38700,69 +38806,63 @@
         <p:spPr/>
         <p:txBody>
           <a:bodyPr>
-            <a:normAutofit/>
+            <a:normAutofit lnSpcReduction="10000"/>
           </a:bodyPr>
           <a:lstStyle/>
           <a:p>
             <a:r>
               <a:rPr lang="en-US" b="1" dirty="0"/>
-              <a:t>Vision Transformer (ViT) Model</a:t>
+              <a:t>SLIDE 2 — Deep Learning Overview</a:t>
             </a:r>
-            <a:endParaRPr lang="en-US" dirty="0"/>
-          </a:p>
-          <a:p>
-            <a:pPr marL="342900" indent="-342900">
-              <a:buFont typeface="Arial" panose="020B0604020202020204" pitchFamily="34" charset="0"/>
-              <a:buChar char="•"/>
-            </a:pPr>
+          </a:p>
+          <a:p>
             <a:r>
-              <a:rPr lang="en-US" dirty="0"/>
-              <a:t>Image → split into patches → embedded as tokens.</a:t>
-            </a:r>
-          </a:p>
-          <a:p>
-            <a:pPr marL="342900" indent="-342900">
-              <a:buFont typeface="Arial" panose="020B0604020202020204" pitchFamily="34" charset="0"/>
-              <a:buChar char="•"/>
-            </a:pPr>
-            <a:r>
-              <a:rPr lang="en-US" dirty="0"/>
-              <a:t>Multi-Head Self-Attention captures global relationships.</a:t>
-            </a:r>
-          </a:p>
-          <a:p>
-            <a:pPr marL="342900" indent="-342900">
-              <a:buFont typeface="Arial" panose="020B0604020202020204" pitchFamily="34" charset="0"/>
-              <a:buChar char="•"/>
-            </a:pPr>
-            <a:r>
-              <a:rPr lang="en-US" dirty="0"/>
-              <a:t>CLS token produces final class prediction.</a:t>
-            </a:r>
-          </a:p>
-          <a:p>
-            <a:pPr marL="342900" indent="-342900">
-              <a:buFont typeface="Arial" panose="020B0604020202020204" pitchFamily="34" charset="0"/>
-              <a:buChar char="•"/>
-            </a:pPr>
-            <a:r>
-              <a:rPr lang="en-US" dirty="0"/>
-              <a:t>Higher accuracy than ResNet-50, EfficientNet and </a:t>
-            </a:r>
-            <a:r>
-              <a:rPr lang="en-US" dirty="0" err="1"/>
-              <a:t>MobileNet</a:t>
+              <a:rPr lang="en-US" b="1" dirty="0"/>
+              <a:t>Deep Learning</a:t>
             </a:r>
             <a:r>
               <a:rPr lang="en-US" dirty="0"/>
-              <a:t> on the custom dataset.</a:t>
+              <a:t>: Multi-layer neural networks for automatic feature extraction.</a:t>
             </a:r>
           </a:p>
           <a:p>
-            <a:pPr marL="342900" indent="-342900">
-              <a:buFont typeface="Arial" panose="020B0604020202020204" pitchFamily="34" charset="0"/>
-              <a:buChar char="•"/>
-            </a:pPr>
+            <a:r>
+              <a:rPr lang="en-US" b="1" dirty="0"/>
+              <a:t>CNN vs ViT</a:t>
+            </a:r>
+            <a:r>
+              <a:rPr lang="en-US" dirty="0"/>
+              <a:t>:</a:t>
+            </a:r>
+          </a:p>
+          <a:p>
+            <a:pPr lvl="1"/>
+            <a:r>
+              <a:rPr lang="en-US" dirty="0"/>
+              <a:t>CNN: local feature extraction, strong on structured patterns.</a:t>
+            </a:r>
+          </a:p>
+          <a:p>
+            <a:pPr lvl="1"/>
+            <a:r>
+              <a:rPr lang="en-US" dirty="0"/>
+              <a:t>ViT: patch-based attention, better at global context and fine-grained differences.</a:t>
+            </a:r>
+          </a:p>
+          <a:p>
+            <a:r>
+              <a:rPr lang="en-US" b="1" dirty="0"/>
+              <a:t>Why ViT for mushrooms</a:t>
+            </a:r>
+            <a:r>
+              <a:rPr lang="en-US" dirty="0"/>
+              <a:t>: Handles subtle visual details and complex textures.</a:t>
+            </a:r>
+          </a:p>
+          <a:p>
+            <a:br>
+              <a:rPr lang="en-US" dirty="0"/>
+            </a:br>
             <a:endParaRPr lang="en-US" dirty="0"/>
           </a:p>
         </p:txBody>
@@ -38770,7 +38870,7 @@
     </p:spTree>
     <p:extLst>
       <p:ext uri="{BB962C8B-B14F-4D97-AF65-F5344CB8AC3E}">
-        <p14:creationId xmlns:p14="http://schemas.microsoft.com/office/powerpoint/2010/main" val="1847825848"/>
+        <p14:creationId xmlns:p14="http://schemas.microsoft.com/office/powerpoint/2010/main" val="1814031870"/>
       </p:ext>
     </p:extLst>
   </p:cSld>
@@ -38821,12 +38921,14 @@
         </p:nvSpPr>
         <p:spPr/>
         <p:txBody>
-          <a:bodyPr/>
+          <a:bodyPr>
+            <a:normAutofit/>
+          </a:bodyPr>
           <a:lstStyle/>
           <a:p>
             <a:r>
-              <a:rPr lang="en-US" dirty="0"/>
-              <a:t>Theoretical basis &amp; systems analysis</a:t>
+              <a:rPr lang="en-US" sz="6000" dirty="0"/>
+              <a:t>2.3. Dataset &amp; Augmentation</a:t>
             </a:r>
           </a:p>
         </p:txBody>
@@ -38854,12 +38956,6 @@
           </a:bodyPr>
           <a:lstStyle/>
           <a:p>
-            <a:r>
-              <a:rPr lang="en-US" b="1" dirty="0"/>
-              <a:t>Dataset &amp; Augmentation</a:t>
-            </a:r>
-          </a:p>
-          <a:p>
             <a:pPr marL="342900" indent="-342900">
               <a:buFont typeface="Arial" panose="020B0604020202020204" pitchFamily="34" charset="0"/>
               <a:buChar char="•"/>
@@ -38884,15 +38980,7 @@
             </a:r>
             <a:r>
               <a:rPr lang="en-US" dirty="0"/>
-              <a:t>: iNaturalist, Kaggle, </a:t>
-            </a:r>
-            <a:r>
-              <a:rPr lang="en-US" dirty="0" err="1"/>
-              <a:t>WildFoodUK</a:t>
-            </a:r>
-            <a:r>
-              <a:rPr lang="en-US" dirty="0"/>
-              <a:t>, blogs.</a:t>
+              <a:t>: iNaturalist, Kaggle, WildFoodUK, blogs.</a:t>
             </a:r>
           </a:p>
           <a:p>
@@ -38982,42 +39070,14 @@
         </p:nvSpPr>
         <p:spPr/>
         <p:txBody>
-          <a:bodyPr/>
-          <a:lstStyle/>
-          <a:p>
-            <a:r>
-              <a:rPr lang="en-US" dirty="0"/>
-              <a:t>Theoretical basis &amp; systems analysis</a:t>
-            </a:r>
-          </a:p>
-        </p:txBody>
-      </p:sp>
-      <p:sp>
-        <p:nvSpPr>
-          <p:cNvPr id="3" name="Content Placeholder 2">
-            <a:extLst>
-              <a:ext uri="{FF2B5EF4-FFF2-40B4-BE49-F238E27FC236}">
-                <a16:creationId xmlns:a16="http://schemas.microsoft.com/office/drawing/2014/main" id="{86AE6973-111A-B8E5-81AA-5B869417BE49}"/>
-              </a:ext>
-            </a:extLst>
-          </p:cNvPr>
-          <p:cNvSpPr>
-            <a:spLocks noGrp="1"/>
-          </p:cNvSpPr>
-          <p:nvPr>
-            <p:ph idx="1"/>
-          </p:nvPr>
-        </p:nvSpPr>
-        <p:spPr/>
-        <p:txBody>
           <a:bodyPr>
             <a:normAutofit/>
           </a:bodyPr>
           <a:lstStyle/>
           <a:p>
             <a:r>
-              <a:rPr lang="en-US" dirty="0"/>
-              <a:t>SYSTEM ARCHITECTURE OVERVIEW</a:t>
+              <a:rPr lang="en-US" sz="6000" dirty="0"/>
+              <a:t>2.4. System Architecture Overview</a:t>
             </a:r>
           </a:p>
         </p:txBody>
@@ -39044,8 +39104,8 @@
         </p:blipFill>
         <p:spPr>
           <a:xfrm>
-            <a:off x="3788790" y="2066957"/>
-            <a:ext cx="7269164" cy="3868674"/>
+            <a:off x="1978215" y="1733600"/>
+            <a:ext cx="8235570" cy="4382999"/>
           </a:xfrm>
           <a:prstGeom prst="rect">
             <a:avLst/>
@@ -39106,49 +39166,21 @@
         </p:nvSpPr>
         <p:spPr/>
         <p:txBody>
-          <a:bodyPr/>
-          <a:lstStyle/>
-          <a:p>
-            <a:r>
-              <a:rPr lang="en-US" dirty="0"/>
-              <a:t>Theoretical basis &amp; systems analysis</a:t>
-            </a:r>
-          </a:p>
-        </p:txBody>
-      </p:sp>
-      <p:sp>
-        <p:nvSpPr>
-          <p:cNvPr id="3" name="Content Placeholder 2">
-            <a:extLst>
-              <a:ext uri="{FF2B5EF4-FFF2-40B4-BE49-F238E27FC236}">
-                <a16:creationId xmlns:a16="http://schemas.microsoft.com/office/drawing/2014/main" id="{4669F7C4-BB45-1027-A6CA-34F5CA1C9AB2}"/>
-              </a:ext>
-            </a:extLst>
-          </p:cNvPr>
-          <p:cNvSpPr>
-            <a:spLocks noGrp="1"/>
-          </p:cNvSpPr>
-          <p:nvPr>
-            <p:ph idx="1"/>
-          </p:nvPr>
-        </p:nvSpPr>
-        <p:spPr/>
-        <p:txBody>
           <a:bodyPr>
             <a:normAutofit/>
           </a:bodyPr>
           <a:lstStyle/>
           <a:p>
             <a:r>
-              <a:rPr lang="en-US" dirty="0"/>
-              <a:t>Use Case Overview</a:t>
+              <a:rPr lang="en-US" sz="6000" dirty="0"/>
+              <a:t>2.5. Use Case Overview</a:t>
             </a:r>
           </a:p>
         </p:txBody>
       </p:sp>
       <p:pic>
         <p:nvPicPr>
-          <p:cNvPr id="4" name="Picture 3">
+          <p:cNvPr id="5" name="Picture 4">
             <a:extLst>
               <a:ext uri="{FF2B5EF4-FFF2-40B4-BE49-F238E27FC236}">
                 <a16:creationId xmlns:a16="http://schemas.microsoft.com/office/drawing/2014/main" id="{1F0B1829-292D-839A-9F32-1DD59350F4C2}"/>
@@ -39168,8 +39200,8 @@
         </p:blipFill>
         <p:spPr>
           <a:xfrm>
-            <a:off x="3845623" y="1651304"/>
-            <a:ext cx="7647792" cy="4252545"/>
+            <a:off x="1978214" y="1537222"/>
+            <a:ext cx="8235569" cy="4579378"/>
           </a:xfrm>
           <a:prstGeom prst="rect">
             <a:avLst/>
@@ -39230,42 +39262,14 @@
         </p:nvSpPr>
         <p:spPr/>
         <p:txBody>
-          <a:bodyPr/>
-          <a:lstStyle/>
-          <a:p>
-            <a:r>
-              <a:rPr lang="en-US" dirty="0"/>
-              <a:t>Theoretical basis &amp; systems analysis</a:t>
-            </a:r>
-          </a:p>
-        </p:txBody>
-      </p:sp>
-      <p:sp>
-        <p:nvSpPr>
-          <p:cNvPr id="3" name="Content Placeholder 2">
-            <a:extLst>
-              <a:ext uri="{FF2B5EF4-FFF2-40B4-BE49-F238E27FC236}">
-                <a16:creationId xmlns:a16="http://schemas.microsoft.com/office/drawing/2014/main" id="{5A6CA2FB-9F6C-654D-BDAF-4C7F1ABC9149}"/>
-              </a:ext>
-            </a:extLst>
-          </p:cNvPr>
-          <p:cNvSpPr>
-            <a:spLocks noGrp="1"/>
-          </p:cNvSpPr>
-          <p:nvPr>
-            <p:ph idx="1"/>
-          </p:nvPr>
-        </p:nvSpPr>
-        <p:spPr/>
-        <p:txBody>
           <a:bodyPr>
             <a:normAutofit/>
           </a:bodyPr>
           <a:lstStyle/>
           <a:p>
             <a:r>
-              <a:rPr lang="en-US" dirty="0"/>
-              <a:t>Main System Workflows</a:t>
+              <a:rPr lang="en-US" sz="6000" dirty="0"/>
+              <a:t>2.6. Main System Workflows</a:t>
             </a:r>
           </a:p>
         </p:txBody>
@@ -39292,8 +39296,8 @@
         </p:blipFill>
         <p:spPr>
           <a:xfrm>
-            <a:off x="7099236" y="681037"/>
-            <a:ext cx="3498215" cy="5227320"/>
+            <a:off x="4095210" y="1477568"/>
+            <a:ext cx="3690684" cy="4663440"/>
           </a:xfrm>
           <a:prstGeom prst="rect">
             <a:avLst/>
@@ -39354,46 +39358,15 @@
         </p:nvSpPr>
         <p:spPr/>
         <p:txBody>
-          <a:bodyPr/>
-          <a:lstStyle/>
-          <a:p>
-            <a:r>
-              <a:rPr lang="en-US" dirty="0"/>
-              <a:t>Theoretical basis &amp; systems analysis</a:t>
-            </a:r>
-          </a:p>
-        </p:txBody>
-      </p:sp>
-      <p:sp>
-        <p:nvSpPr>
-          <p:cNvPr id="3" name="Content Placeholder 2">
-            <a:extLst>
-              <a:ext uri="{FF2B5EF4-FFF2-40B4-BE49-F238E27FC236}">
-                <a16:creationId xmlns:a16="http://schemas.microsoft.com/office/drawing/2014/main" id="{1765176D-C3F1-43AE-1A3A-ECE83AAE3725}"/>
-              </a:ext>
-            </a:extLst>
-          </p:cNvPr>
-          <p:cNvSpPr>
-            <a:spLocks noGrp="1"/>
-          </p:cNvSpPr>
-          <p:nvPr>
-            <p:ph idx="1"/>
-          </p:nvPr>
-        </p:nvSpPr>
-        <p:spPr/>
-        <p:txBody>
           <a:bodyPr>
             <a:normAutofit/>
           </a:bodyPr>
           <a:lstStyle/>
           <a:p>
             <a:r>
-              <a:rPr lang="en-US" dirty="0"/>
-              <a:t>Main System Workflows</a:t>
+              <a:rPr lang="en-US" sz="6000" dirty="0"/>
+              <a:t>2.6. Main System Workflows</a:t>
             </a:r>
-          </a:p>
-          <a:p>
-            <a:endParaRPr lang="en-US" dirty="0"/>
           </a:p>
         </p:txBody>
       </p:sp>
@@ -39419,8 +39392,8 @@
         </p:blipFill>
         <p:spPr>
           <a:xfrm>
-            <a:off x="4556569" y="1241036"/>
-            <a:ext cx="6797231" cy="4587869"/>
+            <a:off x="2407729" y="1387340"/>
+            <a:ext cx="7056311" cy="4762738"/>
           </a:xfrm>
           <a:prstGeom prst="rect">
             <a:avLst/>
@@ -39481,46 +39454,15 @@
         </p:nvSpPr>
         <p:spPr/>
         <p:txBody>
-          <a:bodyPr/>
-          <a:lstStyle/>
-          <a:p>
-            <a:r>
-              <a:rPr lang="en-US" dirty="0"/>
-              <a:t>Theoretical basis &amp; systems analysis</a:t>
-            </a:r>
-          </a:p>
-        </p:txBody>
-      </p:sp>
-      <p:sp>
-        <p:nvSpPr>
-          <p:cNvPr id="3" name="Content Placeholder 2">
-            <a:extLst>
-              <a:ext uri="{FF2B5EF4-FFF2-40B4-BE49-F238E27FC236}">
-                <a16:creationId xmlns:a16="http://schemas.microsoft.com/office/drawing/2014/main" id="{79D42FAB-97B1-E9A8-2CCC-04E3C363222C}"/>
-              </a:ext>
-            </a:extLst>
-          </p:cNvPr>
-          <p:cNvSpPr>
-            <a:spLocks noGrp="1"/>
-          </p:cNvSpPr>
-          <p:nvPr>
-            <p:ph idx="1"/>
-          </p:nvPr>
-        </p:nvSpPr>
-        <p:spPr/>
-        <p:txBody>
           <a:bodyPr>
             <a:normAutofit/>
           </a:bodyPr>
           <a:lstStyle/>
           <a:p>
             <a:r>
-              <a:rPr lang="en-US" dirty="0"/>
-              <a:t>Main System Workflows</a:t>
+              <a:rPr lang="en-US" sz="6000" dirty="0"/>
+              <a:t>2.6. Main System Workflows</a:t>
             </a:r>
-          </a:p>
-          <a:p>
-            <a:endParaRPr lang="en-US" dirty="0"/>
           </a:p>
         </p:txBody>
       </p:sp>
@@ -39546,8 +39488,8 @@
         </p:blipFill>
         <p:spPr>
           <a:xfrm>
-            <a:off x="7545641" y="913448"/>
-            <a:ext cx="2239645" cy="5263515"/>
+            <a:off x="4844192" y="1325880"/>
+            <a:ext cx="2503615" cy="4896803"/>
           </a:xfrm>
           <a:prstGeom prst="rect">
             <a:avLst/>
@@ -39608,46 +39550,15 @@
         </p:nvSpPr>
         <p:spPr/>
         <p:txBody>
-          <a:bodyPr/>
-          <a:lstStyle/>
-          <a:p>
-            <a:r>
-              <a:rPr lang="en-US" dirty="0"/>
-              <a:t>Theoretical basis &amp; systems analysis</a:t>
-            </a:r>
-          </a:p>
-        </p:txBody>
-      </p:sp>
-      <p:sp>
-        <p:nvSpPr>
-          <p:cNvPr id="3" name="Content Placeholder 2">
-            <a:extLst>
-              <a:ext uri="{FF2B5EF4-FFF2-40B4-BE49-F238E27FC236}">
-                <a16:creationId xmlns:a16="http://schemas.microsoft.com/office/drawing/2014/main" id="{67430E25-A3DF-08EE-0918-7F6A8461B2A1}"/>
-              </a:ext>
-            </a:extLst>
-          </p:cNvPr>
-          <p:cNvSpPr>
-            <a:spLocks noGrp="1"/>
-          </p:cNvSpPr>
-          <p:nvPr>
-            <p:ph idx="1"/>
-          </p:nvPr>
-        </p:nvSpPr>
-        <p:spPr/>
-        <p:txBody>
           <a:bodyPr>
             <a:normAutofit/>
           </a:bodyPr>
           <a:lstStyle/>
           <a:p>
             <a:r>
-              <a:rPr lang="en-US" dirty="0"/>
-              <a:t>Main System Workflows</a:t>
+              <a:rPr lang="en-US" sz="6000" dirty="0"/>
+              <a:t>2.6. Main System Workflows</a:t>
             </a:r>
-          </a:p>
-          <a:p>
-            <a:endParaRPr lang="en-US" dirty="0"/>
           </a:p>
         </p:txBody>
       </p:sp>
@@ -39673,8 +39584,8 @@
         </p:blipFill>
         <p:spPr>
           <a:xfrm>
-            <a:off x="7269479" y="1106423"/>
-            <a:ext cx="2562027" cy="5222113"/>
+            <a:off x="4786883" y="1477568"/>
+            <a:ext cx="2618233" cy="4887544"/>
           </a:xfrm>
           <a:prstGeom prst="rect">
             <a:avLst/>
@@ -39813,10 +39724,10 @@
       </p:sp>
       <p:pic>
         <p:nvPicPr>
-          <p:cNvPr id="4" name="Picture 3">
+          <p:cNvPr id="5" name="Picture 4">
             <a:extLst>
               <a:ext uri="{FF2B5EF4-FFF2-40B4-BE49-F238E27FC236}">
-                <a16:creationId xmlns:a16="http://schemas.microsoft.com/office/drawing/2014/main" id="{F50120BF-173F-825E-6E45-4F696F724B8A}"/>
+                <a16:creationId xmlns:a16="http://schemas.microsoft.com/office/drawing/2014/main" id="{F39B73E7-E328-EC9A-AFA5-63970123C6A6}"/>
               </a:ext>
             </a:extLst>
           </p:cNvPr>
@@ -39826,21 +39737,15 @@
           <p:nvPr/>
         </p:nvPicPr>
         <p:blipFill>
-          <a:blip r:embed="rId2" cstate="print">
-            <a:extLst>
-              <a:ext uri="{28A0092B-C50C-407E-A947-70E740481C1C}">
-                <a14:useLocalDpi xmlns:a14="http://schemas.microsoft.com/office/drawing/2010/main" val="0"/>
-              </a:ext>
-            </a:extLst>
-          </a:blip>
+          <a:blip r:embed="rId2"/>
           <a:stretch>
             <a:fillRect/>
           </a:stretch>
         </p:blipFill>
         <p:spPr>
           <a:xfrm>
-            <a:off x="702119" y="1642071"/>
-            <a:ext cx="1698625" cy="3774440"/>
+            <a:off x="512691" y="1253905"/>
+            <a:ext cx="2438740" cy="5010849"/>
           </a:xfrm>
           <a:prstGeom prst="rect">
             <a:avLst/>
@@ -39849,10 +39754,10 @@
       </p:pic>
       <p:pic>
         <p:nvPicPr>
-          <p:cNvPr id="6" name="Picture 5">
+          <p:cNvPr id="10" name="Picture 9">
             <a:extLst>
               <a:ext uri="{FF2B5EF4-FFF2-40B4-BE49-F238E27FC236}">
-                <a16:creationId xmlns:a16="http://schemas.microsoft.com/office/drawing/2014/main" id="{907E41AE-9803-33AE-A341-ED3CEEC1F68E}"/>
+                <a16:creationId xmlns:a16="http://schemas.microsoft.com/office/drawing/2014/main" id="{013E5F31-9636-5700-8C62-BB8C34DA4FAB}"/>
               </a:ext>
             </a:extLst>
           </p:cNvPr>
@@ -39862,21 +39767,15 @@
           <p:nvPr/>
         </p:nvPicPr>
         <p:blipFill>
-          <a:blip r:embed="rId3" cstate="print">
-            <a:extLst>
-              <a:ext uri="{28A0092B-C50C-407E-A947-70E740481C1C}">
-                <a14:useLocalDpi xmlns:a14="http://schemas.microsoft.com/office/drawing/2010/main" val="0"/>
-              </a:ext>
-            </a:extLst>
-          </a:blip>
+          <a:blip r:embed="rId3"/>
           <a:stretch>
             <a:fillRect/>
           </a:stretch>
         </p:blipFill>
         <p:spPr>
           <a:xfrm>
-            <a:off x="3238627" y="1568704"/>
-            <a:ext cx="1929130" cy="4287520"/>
+            <a:off x="3368380" y="1206274"/>
+            <a:ext cx="2514879" cy="5068007"/>
           </a:xfrm>
           <a:prstGeom prst="rect">
             <a:avLst/>
@@ -39885,10 +39784,10 @@
       </p:pic>
       <p:pic>
         <p:nvPicPr>
-          <p:cNvPr id="7" name="Picture 6">
+          <p:cNvPr id="12" name="Picture 11">
             <a:extLst>
               <a:ext uri="{FF2B5EF4-FFF2-40B4-BE49-F238E27FC236}">
-                <a16:creationId xmlns:a16="http://schemas.microsoft.com/office/drawing/2014/main" id="{3C644662-7685-9226-8619-32505844E24F}"/>
+                <a16:creationId xmlns:a16="http://schemas.microsoft.com/office/drawing/2014/main" id="{E44DAB63-94CC-519F-80FE-82A4CD5C9493}"/>
               </a:ext>
             </a:extLst>
           </p:cNvPr>
@@ -39898,21 +39797,15 @@
           <p:nvPr/>
         </p:nvPicPr>
         <p:blipFill>
-          <a:blip r:embed="rId4" cstate="print">
-            <a:extLst>
-              <a:ext uri="{28A0092B-C50C-407E-A947-70E740481C1C}">
-                <a14:useLocalDpi xmlns:a14="http://schemas.microsoft.com/office/drawing/2010/main" val="0"/>
-              </a:ext>
-            </a:extLst>
-          </a:blip>
+          <a:blip r:embed="rId4"/>
           <a:stretch>
             <a:fillRect/>
           </a:stretch>
         </p:blipFill>
         <p:spPr>
           <a:xfrm>
-            <a:off x="5664009" y="1642071"/>
-            <a:ext cx="1924685" cy="4276725"/>
+            <a:off x="6300208" y="1196748"/>
+            <a:ext cx="2481699" cy="5068007"/>
           </a:xfrm>
           <a:prstGeom prst="rect">
             <a:avLst/>
@@ -39921,10 +39814,10 @@
       </p:pic>
       <p:pic>
         <p:nvPicPr>
-          <p:cNvPr id="8" name="Picture 7">
+          <p:cNvPr id="14" name="Picture 13">
             <a:extLst>
               <a:ext uri="{FF2B5EF4-FFF2-40B4-BE49-F238E27FC236}">
-                <a16:creationId xmlns:a16="http://schemas.microsoft.com/office/drawing/2014/main" id="{A8AB2768-94AD-B7FA-F930-1A733E656DC1}"/>
+                <a16:creationId xmlns:a16="http://schemas.microsoft.com/office/drawing/2014/main" id="{99B822AB-8CAE-4A39-3E4F-539A52FE8B99}"/>
               </a:ext>
             </a:extLst>
           </p:cNvPr>
@@ -39934,30 +39827,19 @@
           <p:nvPr/>
         </p:nvPicPr>
         <p:blipFill>
-          <a:blip r:embed="rId5" cstate="print">
-            <a:extLst>
-              <a:ext uri="{28A0092B-C50C-407E-A947-70E740481C1C}">
-                <a14:useLocalDpi xmlns:a14="http://schemas.microsoft.com/office/drawing/2010/main" val="0"/>
-              </a:ext>
-            </a:extLst>
-          </a:blip>
-          <a:srcRect/>
+          <a:blip r:embed="rId5"/>
           <a:stretch>
             <a:fillRect/>
           </a:stretch>
         </p:blipFill>
-        <p:spPr bwMode="auto">
+        <p:spPr>
           <a:xfrm>
-            <a:off x="8635492" y="1477568"/>
-            <a:ext cx="1925320" cy="4279265"/>
+            <a:off x="9198856" y="1196747"/>
+            <a:ext cx="2495898" cy="5068007"/>
           </a:xfrm>
           <a:prstGeom prst="rect">
             <a:avLst/>
           </a:prstGeom>
-          <a:noFill/>
-          <a:ln>
-            <a:noFill/>
-          </a:ln>
         </p:spPr>
       </p:pic>
     </p:spTree>
@@ -40355,10 +40237,10 @@
       </p:sp>
       <p:pic>
         <p:nvPicPr>
-          <p:cNvPr id="3" name="Picture 2">
+          <p:cNvPr id="9" name="Picture 8">
             <a:extLst>
               <a:ext uri="{FF2B5EF4-FFF2-40B4-BE49-F238E27FC236}">
-                <a16:creationId xmlns:a16="http://schemas.microsoft.com/office/drawing/2014/main" id="{69156EE5-344F-DA7E-2183-7C4665FACC77}"/>
+                <a16:creationId xmlns:a16="http://schemas.microsoft.com/office/drawing/2014/main" id="{085E7065-CC08-1CD3-4AC6-05F0E499BA2E}"/>
               </a:ext>
             </a:extLst>
           </p:cNvPr>
@@ -40368,21 +40250,15 @@
           <p:nvPr/>
         </p:nvPicPr>
         <p:blipFill>
-          <a:blip r:embed="rId2" cstate="print">
-            <a:extLst>
-              <a:ext uri="{28A0092B-C50C-407E-A947-70E740481C1C}">
-                <a14:useLocalDpi xmlns:a14="http://schemas.microsoft.com/office/drawing/2010/main" val="0"/>
-              </a:ext>
-            </a:extLst>
-          </a:blip>
+          <a:blip r:embed="rId2"/>
           <a:stretch>
             <a:fillRect/>
           </a:stretch>
         </p:blipFill>
         <p:spPr>
           <a:xfrm>
-            <a:off x="1366329" y="1477568"/>
-            <a:ext cx="1924685" cy="4276725"/>
+            <a:off x="4876630" y="1292011"/>
+            <a:ext cx="2438740" cy="4982270"/>
           </a:xfrm>
           <a:prstGeom prst="rect">
             <a:avLst/>
@@ -40391,10 +40267,10 @@
       </p:pic>
       <p:pic>
         <p:nvPicPr>
-          <p:cNvPr id="4" name="Picture 3">
+          <p:cNvPr id="11" name="Picture 10">
             <a:extLst>
               <a:ext uri="{FF2B5EF4-FFF2-40B4-BE49-F238E27FC236}">
-                <a16:creationId xmlns:a16="http://schemas.microsoft.com/office/drawing/2014/main" id="{BD6636AF-ED39-0021-F43F-E655BC56F9E9}"/>
+                <a16:creationId xmlns:a16="http://schemas.microsoft.com/office/drawing/2014/main" id="{64E8DD7B-56C7-5953-4602-EC7D1E94C173}"/>
               </a:ext>
             </a:extLst>
           </p:cNvPr>
@@ -40404,21 +40280,15 @@
           <p:nvPr/>
         </p:nvPicPr>
         <p:blipFill>
-          <a:blip r:embed="rId3" cstate="print">
-            <a:extLst>
-              <a:ext uri="{28A0092B-C50C-407E-A947-70E740481C1C}">
-                <a14:useLocalDpi xmlns:a14="http://schemas.microsoft.com/office/drawing/2010/main" val="0"/>
-              </a:ext>
-            </a:extLst>
-          </a:blip>
+          <a:blip r:embed="rId3"/>
           <a:stretch>
             <a:fillRect/>
           </a:stretch>
         </p:blipFill>
         <p:spPr>
           <a:xfrm>
-            <a:off x="3819143" y="1562100"/>
-            <a:ext cx="1927225" cy="4282440"/>
+            <a:off x="7735425" y="1258668"/>
+            <a:ext cx="2524477" cy="5020376"/>
           </a:xfrm>
           <a:prstGeom prst="rect">
             <a:avLst/>
@@ -40427,10 +40297,10 @@
       </p:pic>
       <p:pic>
         <p:nvPicPr>
-          <p:cNvPr id="5" name="Picture 4">
+          <p:cNvPr id="16" name="Picture 15">
             <a:extLst>
               <a:ext uri="{FF2B5EF4-FFF2-40B4-BE49-F238E27FC236}">
-                <a16:creationId xmlns:a16="http://schemas.microsoft.com/office/drawing/2014/main" id="{2721D39B-B647-DB8E-517D-9DB9AFA89654}"/>
+                <a16:creationId xmlns:a16="http://schemas.microsoft.com/office/drawing/2014/main" id="{EE1B147A-0C79-C5D3-6F1E-B3C48885F7D8}"/>
               </a:ext>
             </a:extLst>
           </p:cNvPr>
@@ -40440,30 +40310,19 @@
           <p:nvPr/>
         </p:nvPicPr>
         <p:blipFill>
-          <a:blip r:embed="rId4" cstate="print">
-            <a:extLst>
-              <a:ext uri="{28A0092B-C50C-407E-A947-70E740481C1C}">
-                <a14:useLocalDpi xmlns:a14="http://schemas.microsoft.com/office/drawing/2010/main" val="0"/>
-              </a:ext>
-            </a:extLst>
-          </a:blip>
-          <a:srcRect/>
+          <a:blip r:embed="rId4"/>
           <a:stretch>
             <a:fillRect/>
           </a:stretch>
         </p:blipFill>
-        <p:spPr bwMode="auto">
+        <p:spPr>
           <a:xfrm>
-            <a:off x="6649974" y="1423593"/>
-            <a:ext cx="1927860" cy="4284980"/>
+            <a:off x="1961059" y="1263432"/>
+            <a:ext cx="2486372" cy="5010849"/>
           </a:xfrm>
           <a:prstGeom prst="rect">
             <a:avLst/>
           </a:prstGeom>
-          <a:noFill/>
-          <a:ln>
-            <a:noFill/>
-          </a:ln>
         </p:spPr>
       </p:pic>
     </p:spTree>
@@ -40534,10 +40393,10 @@
       </p:sp>
       <p:pic>
         <p:nvPicPr>
-          <p:cNvPr id="3" name="Picture 2">
+          <p:cNvPr id="11" name="Picture 10">
             <a:extLst>
               <a:ext uri="{FF2B5EF4-FFF2-40B4-BE49-F238E27FC236}">
-                <a16:creationId xmlns:a16="http://schemas.microsoft.com/office/drawing/2014/main" id="{ED72F6ED-AB44-DFBD-137A-EB5E210FD53A}"/>
+                <a16:creationId xmlns:a16="http://schemas.microsoft.com/office/drawing/2014/main" id="{F39772C4-FC63-794A-F104-90FF2F66BD60}"/>
               </a:ext>
             </a:extLst>
           </p:cNvPr>
@@ -40547,21 +40406,15 @@
           <p:nvPr/>
         </p:nvPicPr>
         <p:blipFill>
-          <a:blip r:embed="rId2" cstate="print">
-            <a:extLst>
-              <a:ext uri="{28A0092B-C50C-407E-A947-70E740481C1C}">
-                <a14:useLocalDpi xmlns:a14="http://schemas.microsoft.com/office/drawing/2010/main" val="0"/>
-              </a:ext>
-            </a:extLst>
-          </a:blip>
+          <a:blip r:embed="rId2"/>
           <a:stretch>
             <a:fillRect/>
           </a:stretch>
         </p:blipFill>
         <p:spPr>
           <a:xfrm>
-            <a:off x="1285621" y="1434725"/>
-            <a:ext cx="1921510" cy="4269740"/>
+            <a:off x="7758859" y="1259432"/>
+            <a:ext cx="2429214" cy="5020376"/>
           </a:xfrm>
           <a:prstGeom prst="rect">
             <a:avLst/>
@@ -40570,10 +40423,10 @@
       </p:pic>
       <p:pic>
         <p:nvPicPr>
-          <p:cNvPr id="4" name="Picture 3">
+          <p:cNvPr id="12" name="Picture 11">
             <a:extLst>
               <a:ext uri="{FF2B5EF4-FFF2-40B4-BE49-F238E27FC236}">
-                <a16:creationId xmlns:a16="http://schemas.microsoft.com/office/drawing/2014/main" id="{A457E811-D613-8CFD-7625-88733628BE0D}"/>
+                <a16:creationId xmlns:a16="http://schemas.microsoft.com/office/drawing/2014/main" id="{68FDF0AC-D880-3F08-9DAE-B9E97A785186}"/>
               </a:ext>
             </a:extLst>
           </p:cNvPr>
@@ -40583,38 +40436,27 @@
           <p:nvPr/>
         </p:nvPicPr>
         <p:blipFill>
-          <a:blip r:embed="rId3" cstate="print">
-            <a:extLst>
-              <a:ext uri="{28A0092B-C50C-407E-A947-70E740481C1C}">
-                <a14:useLocalDpi xmlns:a14="http://schemas.microsoft.com/office/drawing/2010/main" val="0"/>
-              </a:ext>
-            </a:extLst>
-          </a:blip>
-          <a:srcRect/>
+          <a:blip r:embed="rId3"/>
           <a:stretch>
             <a:fillRect/>
           </a:stretch>
         </p:blipFill>
-        <p:spPr bwMode="auto">
+        <p:spPr>
           <a:xfrm>
-            <a:off x="8397113" y="1379817"/>
-            <a:ext cx="1926590" cy="4281805"/>
+            <a:off x="1975348" y="1225326"/>
+            <a:ext cx="2457793" cy="5048955"/>
           </a:xfrm>
           <a:prstGeom prst="rect">
             <a:avLst/>
           </a:prstGeom>
-          <a:noFill/>
-          <a:ln>
-            <a:noFill/>
-          </a:ln>
         </p:spPr>
       </p:pic>
       <p:pic>
         <p:nvPicPr>
-          <p:cNvPr id="5" name="Picture 4">
+          <p:cNvPr id="13" name="Picture 12">
             <a:extLst>
               <a:ext uri="{FF2B5EF4-FFF2-40B4-BE49-F238E27FC236}">
-                <a16:creationId xmlns:a16="http://schemas.microsoft.com/office/drawing/2014/main" id="{7E814C70-0F71-7DB0-85CD-CDC78A47B0BB}"/>
+                <a16:creationId xmlns:a16="http://schemas.microsoft.com/office/drawing/2014/main" id="{A171769A-554D-0FD2-F5C2-BA4CBA2EE537}"/>
               </a:ext>
             </a:extLst>
           </p:cNvPr>
@@ -40624,30 +40466,19 @@
           <p:nvPr/>
         </p:nvPicPr>
         <p:blipFill>
-          <a:blip r:embed="rId4" cstate="print">
-            <a:extLst>
-              <a:ext uri="{28A0092B-C50C-407E-A947-70E740481C1C}">
-                <a14:useLocalDpi xmlns:a14="http://schemas.microsoft.com/office/drawing/2010/main" val="0"/>
-              </a:ext>
-            </a:extLst>
-          </a:blip>
-          <a:srcRect/>
+          <a:blip r:embed="rId4"/>
           <a:stretch>
             <a:fillRect/>
           </a:stretch>
         </p:blipFill>
-        <p:spPr bwMode="auto">
+        <p:spPr>
           <a:xfrm>
-            <a:off x="4942903" y="1454877"/>
-            <a:ext cx="1922145" cy="4272280"/>
+            <a:off x="4848242" y="1258668"/>
+            <a:ext cx="2486372" cy="5039428"/>
           </a:xfrm>
           <a:prstGeom prst="rect">
             <a:avLst/>
           </a:prstGeom>
-          <a:noFill/>
-          <a:ln>
-            <a:noFill/>
-          </a:ln>
         </p:spPr>
       </p:pic>
     </p:spTree>
@@ -40718,10 +40549,10 @@
       </p:sp>
       <p:pic>
         <p:nvPicPr>
-          <p:cNvPr id="3" name="Picture 2">
+          <p:cNvPr id="15" name="Picture 14">
             <a:extLst>
               <a:ext uri="{FF2B5EF4-FFF2-40B4-BE49-F238E27FC236}">
-                <a16:creationId xmlns:a16="http://schemas.microsoft.com/office/drawing/2014/main" id="{C2D39AFB-7EDE-0146-243A-2D294F6AE14A}"/>
+                <a16:creationId xmlns:a16="http://schemas.microsoft.com/office/drawing/2014/main" id="{B3F73263-F735-26F2-EAE5-569160DBAEB8}"/>
               </a:ext>
             </a:extLst>
           </p:cNvPr>
@@ -40731,21 +40562,15 @@
           <p:nvPr/>
         </p:nvPicPr>
         <p:blipFill>
-          <a:blip r:embed="rId2" cstate="print">
-            <a:extLst>
-              <a:ext uri="{28A0092B-C50C-407E-A947-70E740481C1C}">
-                <a14:useLocalDpi xmlns:a14="http://schemas.microsoft.com/office/drawing/2010/main" val="0"/>
-              </a:ext>
-            </a:extLst>
-          </a:blip>
+          <a:blip r:embed="rId2"/>
           <a:stretch>
             <a:fillRect/>
           </a:stretch>
         </p:blipFill>
         <p:spPr>
           <a:xfrm>
-            <a:off x="943165" y="1604645"/>
-            <a:ext cx="1929765" cy="4288790"/>
+            <a:off x="1965822" y="1244378"/>
+            <a:ext cx="2467319" cy="5010849"/>
           </a:xfrm>
           <a:prstGeom prst="rect">
             <a:avLst/>
@@ -40754,10 +40579,10 @@
       </p:pic>
       <p:pic>
         <p:nvPicPr>
-          <p:cNvPr id="4" name="Picture 3">
+          <p:cNvPr id="19" name="Picture 18">
             <a:extLst>
               <a:ext uri="{FF2B5EF4-FFF2-40B4-BE49-F238E27FC236}">
-                <a16:creationId xmlns:a16="http://schemas.microsoft.com/office/drawing/2014/main" id="{ED70F0FA-726B-4039-6481-3BEDCF5DA1B5}"/>
+                <a16:creationId xmlns:a16="http://schemas.microsoft.com/office/drawing/2014/main" id="{5656FAC5-4E35-E7EF-7F38-C3D57A6555E9}"/>
               </a:ext>
             </a:extLst>
           </p:cNvPr>
@@ -40767,38 +40592,27 @@
           <p:nvPr/>
         </p:nvPicPr>
         <p:blipFill>
-          <a:blip r:embed="rId3" cstate="print">
-            <a:extLst>
-              <a:ext uri="{28A0092B-C50C-407E-A947-70E740481C1C}">
-                <a14:useLocalDpi xmlns:a14="http://schemas.microsoft.com/office/drawing/2010/main" val="0"/>
-              </a:ext>
-            </a:extLst>
-          </a:blip>
-          <a:srcRect/>
+          <a:blip r:embed="rId3"/>
           <a:stretch>
             <a:fillRect/>
           </a:stretch>
         </p:blipFill>
-        <p:spPr bwMode="auto">
+        <p:spPr>
           <a:xfrm>
-            <a:off x="3951224" y="1659509"/>
-            <a:ext cx="1930400" cy="4289425"/>
+            <a:off x="4848242" y="1268194"/>
+            <a:ext cx="2514951" cy="5039428"/>
           </a:xfrm>
           <a:prstGeom prst="rect">
             <a:avLst/>
           </a:prstGeom>
-          <a:noFill/>
-          <a:ln>
-            <a:noFill/>
-          </a:ln>
         </p:spPr>
       </p:pic>
       <p:pic>
         <p:nvPicPr>
-          <p:cNvPr id="5" name="Picture 4">
+          <p:cNvPr id="7" name="Picture 6">
             <a:extLst>
               <a:ext uri="{FF2B5EF4-FFF2-40B4-BE49-F238E27FC236}">
-                <a16:creationId xmlns:a16="http://schemas.microsoft.com/office/drawing/2014/main" id="{DAAEB19F-79AD-4399-80F1-933EC6DEA694}"/>
+                <a16:creationId xmlns:a16="http://schemas.microsoft.com/office/drawing/2014/main" id="{023F5F15-323A-9242-BF3A-0424041F7CF9}"/>
               </a:ext>
             </a:extLst>
           </p:cNvPr>
@@ -40808,30 +40622,19 @@
           <p:nvPr/>
         </p:nvPicPr>
         <p:blipFill>
-          <a:blip r:embed="rId4" cstate="print">
-            <a:extLst>
-              <a:ext uri="{28A0092B-C50C-407E-A947-70E740481C1C}">
-                <a14:useLocalDpi xmlns:a14="http://schemas.microsoft.com/office/drawing/2010/main" val="0"/>
-              </a:ext>
-            </a:extLst>
-          </a:blip>
-          <a:srcRect/>
+          <a:blip r:embed="rId4"/>
           <a:stretch>
             <a:fillRect/>
           </a:stretch>
         </p:blipFill>
-        <p:spPr bwMode="auto">
+        <p:spPr>
           <a:xfrm>
-            <a:off x="7391908" y="1477568"/>
-            <a:ext cx="1925320" cy="4279265"/>
+            <a:off x="7778294" y="1234851"/>
+            <a:ext cx="2505425" cy="5020376"/>
           </a:xfrm>
           <a:prstGeom prst="rect">
             <a:avLst/>
           </a:prstGeom>
-          <a:noFill/>
-          <a:ln>
-            <a:noFill/>
-          </a:ln>
         </p:spPr>
       </p:pic>
     </p:spTree>
@@ -40912,11 +40715,17 @@
           <p:cNvGraphicFramePr>
             <a:graphicFrameLocks noGrp="1"/>
           </p:cNvGraphicFramePr>
-          <p:nvPr/>
+          <p:nvPr>
+            <p:extLst>
+              <p:ext uri="{D42A27DB-BD31-4B8C-83A1-F6EECF244321}">
+                <p14:modId xmlns:p14="http://schemas.microsoft.com/office/powerpoint/2010/main" val="3909021375"/>
+              </p:ext>
+            </p:extLst>
+          </p:nvPr>
         </p:nvGraphicFramePr>
         <p:xfrm>
-          <a:off x="1073594" y="1496282"/>
-          <a:ext cx="4064635" cy="914400"/>
+          <a:off x="2948114" y="2622660"/>
+          <a:ext cx="5537518" cy="1612680"/>
         </p:xfrm>
         <a:graphic>
           <a:graphicData uri="http://schemas.openxmlformats.org/drawingml/2006/table">
@@ -40925,35 +40734,35 @@
                 <a:tableStyleId>{5C22544A-7EE6-4342-B048-85BDC9FD1C3A}</a:tableStyleId>
               </a:tblPr>
               <a:tblGrid>
-                <a:gridCol w="1069340">
+                <a:gridCol w="1889062">
                   <a:extLst>
                     <a:ext uri="{9D8B030D-6E8A-4147-A177-3AD203B41FA5}">
                       <a16:colId xmlns:a16="http://schemas.microsoft.com/office/drawing/2014/main" val="4076723973"/>
                     </a:ext>
                   </a:extLst>
                 </a:gridCol>
-                <a:gridCol w="779145">
+                <a:gridCol w="1051560">
                   <a:extLst>
                     <a:ext uri="{9D8B030D-6E8A-4147-A177-3AD203B41FA5}">
                       <a16:colId xmlns:a16="http://schemas.microsoft.com/office/drawing/2014/main" val="3089822522"/>
                     </a:ext>
                   </a:extLst>
                 </a:gridCol>
-                <a:gridCol w="745490">
+                <a:gridCol w="804672">
                   <a:extLst>
                     <a:ext uri="{9D8B030D-6E8A-4147-A177-3AD203B41FA5}">
                       <a16:colId xmlns:a16="http://schemas.microsoft.com/office/drawing/2014/main" val="79730080"/>
                     </a:ext>
                   </a:extLst>
                 </a:gridCol>
-                <a:gridCol w="737870">
+                <a:gridCol w="1042416">
                   <a:extLst>
                     <a:ext uri="{9D8B030D-6E8A-4147-A177-3AD203B41FA5}">
                       <a16:colId xmlns:a16="http://schemas.microsoft.com/office/drawing/2014/main" val="3724914705"/>
                     </a:ext>
                   </a:extLst>
                 </a:gridCol>
-                <a:gridCol w="732790">
+                <a:gridCol w="749808">
                   <a:extLst>
                     <a:ext uri="{9D8B030D-6E8A-4147-A177-3AD203B41FA5}">
                       <a16:colId xmlns:a16="http://schemas.microsoft.com/office/drawing/2014/main" val="2157743554"/>
@@ -40961,121 +40770,121 @@
                   </a:extLst>
                 </a:gridCol>
               </a:tblGrid>
-              <a:tr h="0">
+              <a:tr h="322536">
                 <a:tc>
                   <a:txBody>
                     <a:bodyPr/>
                     <a:lstStyle/>
                     <a:p>
-                      <a:pPr marL="0" marR="0">
+                      <a:pPr marL="0" marR="0" algn="ctr">
                         <a:buNone/>
                       </a:pPr>
                       <a:r>
-                        <a:rPr lang="en-US" sz="1200">
+                        <a:rPr lang="en-US" sz="1600" dirty="0">
                           <a:effectLst/>
                         </a:rPr>
                         <a:t>Model</a:t>
                       </a:r>
-                      <a:endParaRPr lang="en-US" sz="1200">
+                      <a:endParaRPr lang="en-US" sz="1600" dirty="0">
                         <a:effectLst/>
                         <a:latin typeface="Times New Roman" panose="02020603050405020304" pitchFamily="18" charset="0"/>
                         <a:ea typeface="Times New Roman" panose="02020603050405020304" pitchFamily="18" charset="0"/>
                       </a:endParaRPr>
                     </a:p>
                   </a:txBody>
-                  <a:tcPr marL="68580" marR="68580" marT="0" marB="0"/>
+                  <a:tcPr marL="68580" marR="68580" marT="0" marB="0" anchor="ctr"/>
                 </a:tc>
                 <a:tc>
                   <a:txBody>
                     <a:bodyPr/>
                     <a:lstStyle/>
                     <a:p>
-                      <a:pPr marL="0" marR="0">
+                      <a:pPr marL="0" marR="0" algn="ctr">
                         <a:buNone/>
                       </a:pPr>
                       <a:r>
-                        <a:rPr lang="en-US" sz="1200">
+                        <a:rPr lang="en-US" sz="1600">
                           <a:effectLst/>
                         </a:rPr>
                         <a:t>Precision</a:t>
                       </a:r>
-                      <a:endParaRPr lang="en-US" sz="1200">
+                      <a:endParaRPr lang="en-US" sz="1600">
                         <a:effectLst/>
                         <a:latin typeface="Times New Roman" panose="02020603050405020304" pitchFamily="18" charset="0"/>
                         <a:ea typeface="Times New Roman" panose="02020603050405020304" pitchFamily="18" charset="0"/>
                       </a:endParaRPr>
                     </a:p>
                   </a:txBody>
-                  <a:tcPr marL="68580" marR="68580" marT="0" marB="0"/>
+                  <a:tcPr marL="68580" marR="68580" marT="0" marB="0" anchor="ctr"/>
                 </a:tc>
                 <a:tc>
                   <a:txBody>
                     <a:bodyPr/>
                     <a:lstStyle/>
                     <a:p>
-                      <a:pPr marL="0" marR="0">
+                      <a:pPr marL="0" marR="0" algn="ctr">
                         <a:buNone/>
                       </a:pPr>
                       <a:r>
-                        <a:rPr lang="en-US" sz="1200">
+                        <a:rPr lang="en-US" sz="1600">
                           <a:effectLst/>
                         </a:rPr>
                         <a:t>Recall</a:t>
                       </a:r>
-                      <a:endParaRPr lang="en-US" sz="1200">
+                      <a:endParaRPr lang="en-US" sz="1600">
                         <a:effectLst/>
                         <a:latin typeface="Times New Roman" panose="02020603050405020304" pitchFamily="18" charset="0"/>
                         <a:ea typeface="Times New Roman" panose="02020603050405020304" pitchFamily="18" charset="0"/>
                       </a:endParaRPr>
                     </a:p>
                   </a:txBody>
-                  <a:tcPr marL="68580" marR="68580" marT="0" marB="0"/>
+                  <a:tcPr marL="68580" marR="68580" marT="0" marB="0" anchor="ctr"/>
                 </a:tc>
                 <a:tc>
                   <a:txBody>
                     <a:bodyPr/>
                     <a:lstStyle/>
                     <a:p>
-                      <a:pPr marL="0" marR="0">
+                      <a:pPr marL="0" marR="0" algn="ctr">
                         <a:buNone/>
                       </a:pPr>
                       <a:r>
-                        <a:rPr lang="en-US" sz="1200">
+                        <a:rPr lang="en-US" sz="1600" dirty="0">
                           <a:effectLst/>
                         </a:rPr>
                         <a:t>F1 Score</a:t>
                       </a:r>
-                      <a:endParaRPr lang="en-US" sz="1200">
+                      <a:endParaRPr lang="en-US" sz="1600" dirty="0">
                         <a:effectLst/>
                         <a:latin typeface="Times New Roman" panose="02020603050405020304" pitchFamily="18" charset="0"/>
                         <a:ea typeface="Times New Roman" panose="02020603050405020304" pitchFamily="18" charset="0"/>
                       </a:endParaRPr>
                     </a:p>
                   </a:txBody>
-                  <a:tcPr marL="68580" marR="68580" marT="0" marB="0"/>
+                  <a:tcPr marL="68580" marR="68580" marT="0" marB="0" anchor="ctr"/>
                 </a:tc>
                 <a:tc>
                   <a:txBody>
                     <a:bodyPr/>
                     <a:lstStyle/>
                     <a:p>
-                      <a:pPr marL="0" marR="0">
+                      <a:pPr marL="0" marR="0" algn="ctr">
                         <a:buNone/>
                       </a:pPr>
                       <a:r>
-                        <a:rPr lang="en-US" sz="1200">
+                        <a:rPr lang="en-US" sz="1600">
                           <a:effectLst/>
                         </a:rPr>
                         <a:t>AUC</a:t>
                       </a:r>
-                      <a:endParaRPr lang="en-US" sz="1200">
+                      <a:endParaRPr lang="en-US" sz="1600">
                         <a:effectLst/>
                         <a:latin typeface="Times New Roman" panose="02020603050405020304" pitchFamily="18" charset="0"/>
                         <a:ea typeface="Times New Roman" panose="02020603050405020304" pitchFamily="18" charset="0"/>
                       </a:endParaRPr>
                     </a:p>
                   </a:txBody>
-                  <a:tcPr marL="68580" marR="68580" marT="0" marB="0"/>
+                  <a:tcPr marL="68580" marR="68580" marT="0" marB="0" anchor="ctr"/>
                 </a:tc>
                 <a:extLst>
                   <a:ext uri="{0D108BD9-81ED-4DB2-BD59-A6C34878D82A}">
@@ -41083,121 +40892,121 @@
                   </a:ext>
                 </a:extLst>
               </a:tr>
-              <a:tr h="0">
+              <a:tr h="322536">
                 <a:tc>
                   <a:txBody>
                     <a:bodyPr/>
                     <a:lstStyle/>
                     <a:p>
-                      <a:pPr marL="0" marR="0">
+                      <a:pPr marL="0" marR="0" algn="l">
                         <a:buNone/>
                       </a:pPr>
                       <a:r>
-                        <a:rPr lang="en-US" sz="1200">
+                        <a:rPr lang="en-US" sz="1600" dirty="0">
                           <a:effectLst/>
                         </a:rPr>
                         <a:t>ViT</a:t>
                       </a:r>
-                      <a:endParaRPr lang="en-US" sz="1200">
+                      <a:endParaRPr lang="en-US" sz="1600" dirty="0">
                         <a:effectLst/>
                         <a:latin typeface="Times New Roman" panose="02020603050405020304" pitchFamily="18" charset="0"/>
                         <a:ea typeface="Times New Roman" panose="02020603050405020304" pitchFamily="18" charset="0"/>
                       </a:endParaRPr>
                     </a:p>
                   </a:txBody>
-                  <a:tcPr marL="68580" marR="68580" marT="0" marB="0"/>
+                  <a:tcPr marL="68580" marR="68580" marT="0" marB="0" anchor="ctr"/>
                 </a:tc>
                 <a:tc>
                   <a:txBody>
                     <a:bodyPr/>
                     <a:lstStyle/>
                     <a:p>
-                      <a:pPr marL="0" marR="0">
+                      <a:pPr marL="0" marR="0" algn="ctr">
                         <a:buNone/>
                       </a:pPr>
                       <a:r>
-                        <a:rPr lang="en-US" sz="1200">
+                        <a:rPr lang="en-US" sz="1600">
                           <a:effectLst/>
                         </a:rPr>
                         <a:t>0.89</a:t>
                       </a:r>
-                      <a:endParaRPr lang="en-US" sz="1200">
+                      <a:endParaRPr lang="en-US" sz="1600">
                         <a:effectLst/>
                         <a:latin typeface="Times New Roman" panose="02020603050405020304" pitchFamily="18" charset="0"/>
                         <a:ea typeface="Times New Roman" panose="02020603050405020304" pitchFamily="18" charset="0"/>
                       </a:endParaRPr>
                     </a:p>
                   </a:txBody>
-                  <a:tcPr marL="68580" marR="68580" marT="0" marB="0"/>
+                  <a:tcPr marL="68580" marR="68580" marT="0" marB="0" anchor="ctr"/>
                 </a:tc>
                 <a:tc>
                   <a:txBody>
                     <a:bodyPr/>
                     <a:lstStyle/>
                     <a:p>
-                      <a:pPr marL="0" marR="0">
+                      <a:pPr marL="0" marR="0" algn="ctr">
                         <a:buNone/>
                       </a:pPr>
                       <a:r>
-                        <a:rPr lang="en-US" sz="1200">
+                        <a:rPr lang="en-US" sz="1600">
                           <a:effectLst/>
                         </a:rPr>
                         <a:t>0.88</a:t>
                       </a:r>
-                      <a:endParaRPr lang="en-US" sz="1200">
+                      <a:endParaRPr lang="en-US" sz="1600">
                         <a:effectLst/>
                         <a:latin typeface="Times New Roman" panose="02020603050405020304" pitchFamily="18" charset="0"/>
                         <a:ea typeface="Times New Roman" panose="02020603050405020304" pitchFamily="18" charset="0"/>
                       </a:endParaRPr>
                     </a:p>
                   </a:txBody>
-                  <a:tcPr marL="68580" marR="68580" marT="0" marB="0"/>
+                  <a:tcPr marL="68580" marR="68580" marT="0" marB="0" anchor="ctr"/>
                 </a:tc>
                 <a:tc>
                   <a:txBody>
                     <a:bodyPr/>
                     <a:lstStyle/>
                     <a:p>
-                      <a:pPr marL="0" marR="0">
+                      <a:pPr marL="0" marR="0" algn="ctr">
                         <a:buNone/>
                       </a:pPr>
                       <a:r>
-                        <a:rPr lang="en-US" sz="1200">
+                        <a:rPr lang="en-US" sz="1600">
                           <a:effectLst/>
                         </a:rPr>
                         <a:t>0.88</a:t>
                       </a:r>
-                      <a:endParaRPr lang="en-US" sz="1200">
+                      <a:endParaRPr lang="en-US" sz="1600">
                         <a:effectLst/>
                         <a:latin typeface="Times New Roman" panose="02020603050405020304" pitchFamily="18" charset="0"/>
                         <a:ea typeface="Times New Roman" panose="02020603050405020304" pitchFamily="18" charset="0"/>
                       </a:endParaRPr>
                     </a:p>
                   </a:txBody>
-                  <a:tcPr marL="68580" marR="68580" marT="0" marB="0"/>
+                  <a:tcPr marL="68580" marR="68580" marT="0" marB="0" anchor="ctr"/>
                 </a:tc>
                 <a:tc>
                   <a:txBody>
                     <a:bodyPr/>
                     <a:lstStyle/>
                     <a:p>
-                      <a:pPr marL="0" marR="0">
+                      <a:pPr marL="0" marR="0" algn="ctr">
                         <a:buNone/>
                       </a:pPr>
                       <a:r>
-                        <a:rPr lang="en-US" sz="1200">
+                        <a:rPr lang="en-US" sz="1600">
                           <a:effectLst/>
                         </a:rPr>
                         <a:t>0.998</a:t>
                       </a:r>
-                      <a:endParaRPr lang="en-US" sz="1200">
+                      <a:endParaRPr lang="en-US" sz="1600">
                         <a:effectLst/>
                         <a:latin typeface="Times New Roman" panose="02020603050405020304" pitchFamily="18" charset="0"/>
                         <a:ea typeface="Times New Roman" panose="02020603050405020304" pitchFamily="18" charset="0"/>
                       </a:endParaRPr>
                     </a:p>
                   </a:txBody>
-                  <a:tcPr marL="68580" marR="68580" marT="0" marB="0"/>
+                  <a:tcPr marL="68580" marR="68580" marT="0" marB="0" anchor="ctr"/>
                 </a:tc>
                 <a:extLst>
                   <a:ext uri="{0D108BD9-81ED-4DB2-BD59-A6C34878D82A}">
@@ -41205,121 +41014,121 @@
                   </a:ext>
                 </a:extLst>
               </a:tr>
-              <a:tr h="0">
+              <a:tr h="322536">
                 <a:tc>
                   <a:txBody>
                     <a:bodyPr/>
                     <a:lstStyle/>
                     <a:p>
-                      <a:pPr marL="0" marR="0">
+                      <a:pPr marL="0" marR="0" algn="l">
                         <a:buNone/>
                       </a:pPr>
                       <a:r>
-                        <a:rPr lang="en-US" sz="1200">
+                        <a:rPr lang="en-US" sz="1600" dirty="0">
                           <a:effectLst/>
                         </a:rPr>
                         <a:t>ResNet-50</a:t>
                       </a:r>
-                      <a:endParaRPr lang="en-US" sz="1200">
+                      <a:endParaRPr lang="en-US" sz="1600" dirty="0">
                         <a:effectLst/>
                         <a:latin typeface="Times New Roman" panose="02020603050405020304" pitchFamily="18" charset="0"/>
                         <a:ea typeface="Times New Roman" panose="02020603050405020304" pitchFamily="18" charset="0"/>
                       </a:endParaRPr>
                     </a:p>
                   </a:txBody>
-                  <a:tcPr marL="68580" marR="68580" marT="0" marB="0"/>
+                  <a:tcPr marL="68580" marR="68580" marT="0" marB="0" anchor="ctr"/>
                 </a:tc>
                 <a:tc>
                   <a:txBody>
                     <a:bodyPr/>
                     <a:lstStyle/>
                     <a:p>
-                      <a:pPr marL="0" marR="0">
+                      <a:pPr marL="0" marR="0" algn="ctr">
                         <a:buNone/>
                       </a:pPr>
                       <a:r>
-                        <a:rPr lang="en-US" sz="1200">
+                        <a:rPr lang="en-US" sz="1600" dirty="0">
                           <a:effectLst/>
                         </a:rPr>
                         <a:t>0.85</a:t>
                       </a:r>
-                      <a:endParaRPr lang="en-US" sz="1200">
+                      <a:endParaRPr lang="en-US" sz="1600" dirty="0">
                         <a:effectLst/>
                         <a:latin typeface="Times New Roman" panose="02020603050405020304" pitchFamily="18" charset="0"/>
                         <a:ea typeface="Times New Roman" panose="02020603050405020304" pitchFamily="18" charset="0"/>
                       </a:endParaRPr>
                     </a:p>
                   </a:txBody>
-                  <a:tcPr marL="68580" marR="68580" marT="0" marB="0"/>
+                  <a:tcPr marL="68580" marR="68580" marT="0" marB="0" anchor="ctr"/>
                 </a:tc>
                 <a:tc>
                   <a:txBody>
                     <a:bodyPr/>
                     <a:lstStyle/>
                     <a:p>
-                      <a:pPr marL="0" marR="0">
+                      <a:pPr marL="0" marR="0" algn="ctr">
                         <a:buNone/>
                       </a:pPr>
                       <a:r>
-                        <a:rPr lang="en-US" sz="1200">
+                        <a:rPr lang="en-US" sz="1600">
                           <a:effectLst/>
                         </a:rPr>
                         <a:t>0.84</a:t>
                       </a:r>
-                      <a:endParaRPr lang="en-US" sz="1200">
+                      <a:endParaRPr lang="en-US" sz="1600">
                         <a:effectLst/>
                         <a:latin typeface="Times New Roman" panose="02020603050405020304" pitchFamily="18" charset="0"/>
                         <a:ea typeface="Times New Roman" panose="02020603050405020304" pitchFamily="18" charset="0"/>
                       </a:endParaRPr>
                     </a:p>
                   </a:txBody>
-                  <a:tcPr marL="68580" marR="68580" marT="0" marB="0"/>
+                  <a:tcPr marL="68580" marR="68580" marT="0" marB="0" anchor="ctr"/>
                 </a:tc>
                 <a:tc>
                   <a:txBody>
                     <a:bodyPr/>
                     <a:lstStyle/>
                     <a:p>
-                      <a:pPr marL="0" marR="0">
+                      <a:pPr marL="0" marR="0" algn="ctr">
                         <a:buNone/>
                       </a:pPr>
                       <a:r>
-                        <a:rPr lang="en-US" sz="1200">
+                        <a:rPr lang="en-US" sz="1600">
                           <a:effectLst/>
                         </a:rPr>
                         <a:t>0.84</a:t>
                       </a:r>
-                      <a:endParaRPr lang="en-US" sz="1200">
+                      <a:endParaRPr lang="en-US" sz="1600">
                         <a:effectLst/>
                         <a:latin typeface="Times New Roman" panose="02020603050405020304" pitchFamily="18" charset="0"/>
                         <a:ea typeface="Times New Roman" panose="02020603050405020304" pitchFamily="18" charset="0"/>
                       </a:endParaRPr>
                     </a:p>
                   </a:txBody>
-                  <a:tcPr marL="68580" marR="68580" marT="0" marB="0"/>
+                  <a:tcPr marL="68580" marR="68580" marT="0" marB="0" anchor="ctr"/>
                 </a:tc>
                 <a:tc>
                   <a:txBody>
                     <a:bodyPr/>
                     <a:lstStyle/>
                     <a:p>
-                      <a:pPr marL="0" marR="0">
+                      <a:pPr marL="0" marR="0" algn="ctr">
                         <a:buNone/>
                       </a:pPr>
                       <a:r>
-                        <a:rPr lang="en-US" sz="1200">
+                        <a:rPr lang="en-US" sz="1600" dirty="0">
                           <a:effectLst/>
                         </a:rPr>
                         <a:t>0.997</a:t>
                       </a:r>
-                      <a:endParaRPr lang="en-US" sz="1200">
+                      <a:endParaRPr lang="en-US" sz="1600" dirty="0">
                         <a:effectLst/>
                         <a:latin typeface="Times New Roman" panose="02020603050405020304" pitchFamily="18" charset="0"/>
                         <a:ea typeface="Times New Roman" panose="02020603050405020304" pitchFamily="18" charset="0"/>
                       </a:endParaRPr>
                     </a:p>
                   </a:txBody>
-                  <a:tcPr marL="68580" marR="68580" marT="0" marB="0"/>
+                  <a:tcPr marL="68580" marR="68580" marT="0" marB="0" anchor="ctr"/>
                 </a:tc>
                 <a:extLst>
                   <a:ext uri="{0D108BD9-81ED-4DB2-BD59-A6C34878D82A}">
@@ -41327,121 +41136,121 @@
                   </a:ext>
                 </a:extLst>
               </a:tr>
-              <a:tr h="0">
+              <a:tr h="322536">
                 <a:tc>
                   <a:txBody>
                     <a:bodyPr/>
                     <a:lstStyle/>
                     <a:p>
-                      <a:pPr marL="0" marR="0">
+                      <a:pPr marL="0" marR="0" algn="l">
                         <a:buNone/>
                       </a:pPr>
                       <a:r>
-                        <a:rPr lang="en-US" sz="1200">
+                        <a:rPr lang="en-US" sz="1600" dirty="0">
                           <a:effectLst/>
                         </a:rPr>
                         <a:t>EfficientNetB4</a:t>
                       </a:r>
-                      <a:endParaRPr lang="en-US" sz="1200">
+                      <a:endParaRPr lang="en-US" sz="1600" dirty="0">
                         <a:effectLst/>
                         <a:latin typeface="Times New Roman" panose="02020603050405020304" pitchFamily="18" charset="0"/>
                         <a:ea typeface="Times New Roman" panose="02020603050405020304" pitchFamily="18" charset="0"/>
                       </a:endParaRPr>
                     </a:p>
                   </a:txBody>
-                  <a:tcPr marL="68580" marR="68580" marT="0" marB="0"/>
+                  <a:tcPr marL="68580" marR="68580" marT="0" marB="0" anchor="ctr"/>
                 </a:tc>
                 <a:tc>
                   <a:txBody>
                     <a:bodyPr/>
                     <a:lstStyle/>
                     <a:p>
-                      <a:pPr marL="0" marR="0">
+                      <a:pPr marL="0" marR="0" algn="ctr">
                         <a:buNone/>
                       </a:pPr>
                       <a:r>
-                        <a:rPr lang="en-US" sz="1200">
+                        <a:rPr lang="en-US" sz="1600">
                           <a:effectLst/>
                         </a:rPr>
                         <a:t>0.84</a:t>
                       </a:r>
-                      <a:endParaRPr lang="en-US" sz="1200">
+                      <a:endParaRPr lang="en-US" sz="1600">
                         <a:effectLst/>
                         <a:latin typeface="Times New Roman" panose="02020603050405020304" pitchFamily="18" charset="0"/>
                         <a:ea typeface="Times New Roman" panose="02020603050405020304" pitchFamily="18" charset="0"/>
                       </a:endParaRPr>
                     </a:p>
                   </a:txBody>
-                  <a:tcPr marL="68580" marR="68580" marT="0" marB="0"/>
+                  <a:tcPr marL="68580" marR="68580" marT="0" marB="0" anchor="ctr"/>
                 </a:tc>
                 <a:tc>
                   <a:txBody>
                     <a:bodyPr/>
                     <a:lstStyle/>
                     <a:p>
-                      <a:pPr marL="0" marR="0">
+                      <a:pPr marL="0" marR="0" algn="ctr">
                         <a:buNone/>
                       </a:pPr>
                       <a:r>
-                        <a:rPr lang="en-US" sz="1200">
+                        <a:rPr lang="en-US" sz="1600">
                           <a:effectLst/>
                         </a:rPr>
                         <a:t>0.83</a:t>
                       </a:r>
-                      <a:endParaRPr lang="en-US" sz="1200">
+                      <a:endParaRPr lang="en-US" sz="1600">
                         <a:effectLst/>
                         <a:latin typeface="Times New Roman" panose="02020603050405020304" pitchFamily="18" charset="0"/>
                         <a:ea typeface="Times New Roman" panose="02020603050405020304" pitchFamily="18" charset="0"/>
                       </a:endParaRPr>
                     </a:p>
                   </a:txBody>
-                  <a:tcPr marL="68580" marR="68580" marT="0" marB="0"/>
+                  <a:tcPr marL="68580" marR="68580" marT="0" marB="0" anchor="ctr"/>
                 </a:tc>
                 <a:tc>
                   <a:txBody>
                     <a:bodyPr/>
                     <a:lstStyle/>
                     <a:p>
-                      <a:pPr marL="0" marR="0">
+                      <a:pPr marL="0" marR="0" algn="ctr">
                         <a:buNone/>
                       </a:pPr>
                       <a:r>
-                        <a:rPr lang="en-US" sz="1200">
+                        <a:rPr lang="en-US" sz="1600">
                           <a:effectLst/>
                         </a:rPr>
                         <a:t>0.83</a:t>
                       </a:r>
-                      <a:endParaRPr lang="en-US" sz="1200">
+                      <a:endParaRPr lang="en-US" sz="1600">
                         <a:effectLst/>
                         <a:latin typeface="Times New Roman" panose="02020603050405020304" pitchFamily="18" charset="0"/>
                         <a:ea typeface="Times New Roman" panose="02020603050405020304" pitchFamily="18" charset="0"/>
                       </a:endParaRPr>
                     </a:p>
                   </a:txBody>
-                  <a:tcPr marL="68580" marR="68580" marT="0" marB="0"/>
+                  <a:tcPr marL="68580" marR="68580" marT="0" marB="0" anchor="ctr"/>
                 </a:tc>
                 <a:tc>
                   <a:txBody>
                     <a:bodyPr/>
                     <a:lstStyle/>
                     <a:p>
-                      <a:pPr marL="0" marR="0">
+                      <a:pPr marL="0" marR="0" algn="ctr">
                         <a:buNone/>
                       </a:pPr>
                       <a:r>
-                        <a:rPr lang="en-US" sz="1200">
+                        <a:rPr lang="en-US" sz="1600" dirty="0">
                           <a:effectLst/>
                         </a:rPr>
                         <a:t>0.996</a:t>
                       </a:r>
-                      <a:endParaRPr lang="en-US" sz="1200">
+                      <a:endParaRPr lang="en-US" sz="1600" dirty="0">
                         <a:effectLst/>
                         <a:latin typeface="Times New Roman" panose="02020603050405020304" pitchFamily="18" charset="0"/>
                         <a:ea typeface="Times New Roman" panose="02020603050405020304" pitchFamily="18" charset="0"/>
                       </a:endParaRPr>
                     </a:p>
                   </a:txBody>
-                  <a:tcPr marL="68580" marR="68580" marT="0" marB="0"/>
+                  <a:tcPr marL="68580" marR="68580" marT="0" marB="0" anchor="ctr"/>
                 </a:tc>
                 <a:extLst>
                   <a:ext uri="{0D108BD9-81ED-4DB2-BD59-A6C34878D82A}">
@@ -41449,121 +41258,121 @@
                   </a:ext>
                 </a:extLst>
               </a:tr>
-              <a:tr h="0">
+              <a:tr h="322536">
                 <a:tc>
                   <a:txBody>
                     <a:bodyPr/>
                     <a:lstStyle/>
                     <a:p>
-                      <a:pPr marL="0" marR="0">
+                      <a:pPr marL="0" marR="0" algn="l">
                         <a:buNone/>
                       </a:pPr>
                       <a:r>
-                        <a:rPr lang="en-US" sz="1200">
+                        <a:rPr lang="en-US" sz="1600" dirty="0">
                           <a:effectLst/>
                         </a:rPr>
                         <a:t>MobileNetV3</a:t>
                       </a:r>
-                      <a:endParaRPr lang="en-US" sz="1200">
+                      <a:endParaRPr lang="en-US" sz="1600" dirty="0">
                         <a:effectLst/>
                         <a:latin typeface="Times New Roman" panose="02020603050405020304" pitchFamily="18" charset="0"/>
                         <a:ea typeface="Times New Roman" panose="02020603050405020304" pitchFamily="18" charset="0"/>
                       </a:endParaRPr>
                     </a:p>
                   </a:txBody>
-                  <a:tcPr marL="68580" marR="68580" marT="0" marB="0"/>
+                  <a:tcPr marL="68580" marR="68580" marT="0" marB="0" anchor="ctr"/>
                 </a:tc>
                 <a:tc>
                   <a:txBody>
                     <a:bodyPr/>
                     <a:lstStyle/>
                     <a:p>
-                      <a:pPr marL="0" marR="0">
+                      <a:pPr marL="0" marR="0" algn="ctr">
                         <a:buNone/>
                       </a:pPr>
                       <a:r>
-                        <a:rPr lang="en-US" sz="1200">
+                        <a:rPr lang="en-US" sz="1600" dirty="0">
                           <a:effectLst/>
                         </a:rPr>
                         <a:t>0.83</a:t>
                       </a:r>
-                      <a:endParaRPr lang="en-US" sz="1200">
+                      <a:endParaRPr lang="en-US" sz="1600" dirty="0">
                         <a:effectLst/>
                         <a:latin typeface="Times New Roman" panose="02020603050405020304" pitchFamily="18" charset="0"/>
                         <a:ea typeface="Times New Roman" panose="02020603050405020304" pitchFamily="18" charset="0"/>
                       </a:endParaRPr>
                     </a:p>
                   </a:txBody>
-                  <a:tcPr marL="68580" marR="68580" marT="0" marB="0"/>
+                  <a:tcPr marL="68580" marR="68580" marT="0" marB="0" anchor="ctr"/>
                 </a:tc>
                 <a:tc>
                   <a:txBody>
                     <a:bodyPr/>
                     <a:lstStyle/>
                     <a:p>
-                      <a:pPr marL="0" marR="0">
+                      <a:pPr marL="0" marR="0" algn="ctr">
                         <a:buNone/>
                       </a:pPr>
                       <a:r>
-                        <a:rPr lang="en-US" sz="1200">
+                        <a:rPr lang="en-US" sz="1600" dirty="0">
                           <a:effectLst/>
                         </a:rPr>
                         <a:t>0.82</a:t>
                       </a:r>
-                      <a:endParaRPr lang="en-US" sz="1200">
+                      <a:endParaRPr lang="en-US" sz="1600" dirty="0">
                         <a:effectLst/>
                         <a:latin typeface="Times New Roman" panose="02020603050405020304" pitchFamily="18" charset="0"/>
                         <a:ea typeface="Times New Roman" panose="02020603050405020304" pitchFamily="18" charset="0"/>
                       </a:endParaRPr>
                     </a:p>
                   </a:txBody>
-                  <a:tcPr marL="68580" marR="68580" marT="0" marB="0"/>
+                  <a:tcPr marL="68580" marR="68580" marT="0" marB="0" anchor="ctr"/>
                 </a:tc>
                 <a:tc>
                   <a:txBody>
                     <a:bodyPr/>
                     <a:lstStyle/>
                     <a:p>
-                      <a:pPr marL="0" marR="0">
+                      <a:pPr marL="0" marR="0" algn="ctr">
                         <a:buNone/>
                       </a:pPr>
                       <a:r>
-                        <a:rPr lang="en-US" sz="1200">
+                        <a:rPr lang="en-US" sz="1600" dirty="0">
                           <a:effectLst/>
                         </a:rPr>
                         <a:t>0.82</a:t>
                       </a:r>
-                      <a:endParaRPr lang="en-US" sz="1200">
+                      <a:endParaRPr lang="en-US" sz="1600" dirty="0">
                         <a:effectLst/>
                         <a:latin typeface="Times New Roman" panose="02020603050405020304" pitchFamily="18" charset="0"/>
                         <a:ea typeface="Times New Roman" panose="02020603050405020304" pitchFamily="18" charset="0"/>
                       </a:endParaRPr>
                     </a:p>
                   </a:txBody>
-                  <a:tcPr marL="68580" marR="68580" marT="0" marB="0"/>
+                  <a:tcPr marL="68580" marR="68580" marT="0" marB="0" anchor="ctr"/>
                 </a:tc>
                 <a:tc>
                   <a:txBody>
                     <a:bodyPr/>
                     <a:lstStyle/>
                     <a:p>
-                      <a:pPr marL="0" marR="0">
+                      <a:pPr marL="0" marR="0" algn="ctr">
                         <a:buNone/>
                       </a:pPr>
                       <a:r>
-                        <a:rPr lang="en-US" sz="1200" dirty="0">
+                        <a:rPr lang="en-US" sz="1600" dirty="0">
                           <a:effectLst/>
                         </a:rPr>
                         <a:t>0.995</a:t>
                       </a:r>
-                      <a:endParaRPr lang="en-US" sz="1200" dirty="0">
+                      <a:endParaRPr lang="en-US" sz="1600" dirty="0">
                         <a:effectLst/>
                         <a:latin typeface="Times New Roman" panose="02020603050405020304" pitchFamily="18" charset="0"/>
                         <a:ea typeface="Times New Roman" panose="02020603050405020304" pitchFamily="18" charset="0"/>
                       </a:endParaRPr>
                     </a:p>
                   </a:txBody>
-                  <a:tcPr marL="68580" marR="68580" marT="0" marB="0"/>
+                  <a:tcPr marL="68580" marR="68580" marT="0" marB="0" anchor="ctr"/>
                 </a:tc>
                 <a:extLst>
                   <a:ext uri="{0D108BD9-81ED-4DB2-BD59-A6C34878D82A}">
@@ -41575,36 +41384,6 @@
           </a:graphicData>
         </a:graphic>
       </p:graphicFrame>
-      <p:pic>
-        <p:nvPicPr>
-          <p:cNvPr id="4" name="Picture 3">
-            <a:extLst>
-              <a:ext uri="{FF2B5EF4-FFF2-40B4-BE49-F238E27FC236}">
-                <a16:creationId xmlns:a16="http://schemas.microsoft.com/office/drawing/2014/main" id="{FDB71698-2F97-9ADC-8FA2-A833C9E8D7C2}"/>
-              </a:ext>
-            </a:extLst>
-          </p:cNvPr>
-          <p:cNvPicPr>
-            <a:picLocks noChangeAspect="1"/>
-          </p:cNvPicPr>
-          <p:nvPr/>
-        </p:nvPicPr>
-        <p:blipFill>
-          <a:blip r:embed="rId2"/>
-          <a:stretch>
-            <a:fillRect/>
-          </a:stretch>
-        </p:blipFill>
-        <p:spPr>
-          <a:xfrm>
-            <a:off x="6096000" y="1496282"/>
-            <a:ext cx="4652645" cy="3620135"/>
-          </a:xfrm>
-          <a:prstGeom prst="rect">
-            <a:avLst/>
-          </a:prstGeom>
-        </p:spPr>
-      </p:pic>
     </p:spTree>
     <p:extLst>
       <p:ext uri="{BB962C8B-B14F-4D97-AF65-F5344CB8AC3E}">
@@ -41693,8 +41472,8 @@
         </p:blipFill>
         <p:spPr>
           <a:xfrm>
-            <a:off x="5773039" y="2001774"/>
-            <a:ext cx="4679950" cy="3604260"/>
+            <a:off x="6341313" y="1618932"/>
+            <a:ext cx="5249723" cy="4043070"/>
           </a:xfrm>
           <a:prstGeom prst="rect">
             <a:avLst/>
@@ -41703,10 +41482,10 @@
       </p:pic>
       <p:pic>
         <p:nvPicPr>
-          <p:cNvPr id="6" name="Picture 5">
+          <p:cNvPr id="3" name="Picture 2">
             <a:extLst>
               <a:ext uri="{FF2B5EF4-FFF2-40B4-BE49-F238E27FC236}">
-                <a16:creationId xmlns:a16="http://schemas.microsoft.com/office/drawing/2014/main" id="{E3D31D36-05C3-2ABC-4436-43DF3075B1FC}"/>
+                <a16:creationId xmlns:a16="http://schemas.microsoft.com/office/drawing/2014/main" id="{FDB71698-2F97-9ADC-8FA2-A833C9E8D7C2}"/>
               </a:ext>
             </a:extLst>
           </p:cNvPr>
@@ -41723,8 +41502,8 @@
         </p:blipFill>
         <p:spPr>
           <a:xfrm>
-            <a:off x="912876" y="2100396"/>
-            <a:ext cx="4064635" cy="3047925"/>
+            <a:off x="600964" y="1618932"/>
+            <a:ext cx="5196206" cy="4043070"/>
           </a:xfrm>
           <a:prstGeom prst="rect">
             <a:avLst/>
@@ -41745,6 +41524,102 @@
 </file>
 
 <file path=ppt/slides/slide25.xml><?xml version="1.0" encoding="utf-8"?>
+<p:sld xmlns:a="http://schemas.openxmlformats.org/drawingml/2006/main" xmlns:r="http://schemas.openxmlformats.org/officeDocument/2006/relationships" xmlns:p="http://schemas.openxmlformats.org/presentationml/2006/main">
+  <p:cSld>
+    <p:spTree>
+      <p:nvGrpSpPr>
+        <p:cNvPr id="1" name="">
+          <a:extLst>
+            <a:ext uri="{FF2B5EF4-FFF2-40B4-BE49-F238E27FC236}">
+              <a16:creationId xmlns:a16="http://schemas.microsoft.com/office/drawing/2014/main" id="{819593C3-B0A6-8CAD-CDF0-1B72227242AA}"/>
+            </a:ext>
+          </a:extLst>
+        </p:cNvPr>
+        <p:cNvGrpSpPr/>
+        <p:nvPr/>
+      </p:nvGrpSpPr>
+      <p:grpSpPr>
+        <a:xfrm>
+          <a:off x="0" y="0"/>
+          <a:ext cx="0" cy="0"/>
+          <a:chOff x="0" y="0"/>
+          <a:chExt cx="0" cy="0"/>
+        </a:xfrm>
+      </p:grpSpPr>
+      <p:sp>
+        <p:nvSpPr>
+          <p:cNvPr id="2" name="Title 1">
+            <a:extLst>
+              <a:ext uri="{FF2B5EF4-FFF2-40B4-BE49-F238E27FC236}">
+                <a16:creationId xmlns:a16="http://schemas.microsoft.com/office/drawing/2014/main" id="{721FFEAF-7CF2-C4FF-8113-EEFCF525266C}"/>
+              </a:ext>
+            </a:extLst>
+          </p:cNvPr>
+          <p:cNvSpPr>
+            <a:spLocks noGrp="1"/>
+          </p:cNvSpPr>
+          <p:nvPr>
+            <p:ph type="title"/>
+          </p:nvPr>
+        </p:nvSpPr>
+        <p:spPr/>
+        <p:txBody>
+          <a:bodyPr>
+            <a:normAutofit/>
+          </a:bodyPr>
+          <a:lstStyle/>
+          <a:p>
+            <a:r>
+              <a:rPr lang="en-US" sz="6000" dirty="0"/>
+              <a:t>3.2. AI Model Implementation</a:t>
+            </a:r>
+          </a:p>
+        </p:txBody>
+      </p:sp>
+      <p:pic>
+        <p:nvPicPr>
+          <p:cNvPr id="6" name="Picture 5">
+            <a:extLst>
+              <a:ext uri="{FF2B5EF4-FFF2-40B4-BE49-F238E27FC236}">
+                <a16:creationId xmlns:a16="http://schemas.microsoft.com/office/drawing/2014/main" id="{6A6287B1-B112-7A50-0521-992762F7EC61}"/>
+              </a:ext>
+            </a:extLst>
+          </p:cNvPr>
+          <p:cNvPicPr>
+            <a:picLocks noChangeAspect="1"/>
+          </p:cNvPicPr>
+          <p:nvPr/>
+        </p:nvPicPr>
+        <p:blipFill>
+          <a:blip r:embed="rId2"/>
+          <a:stretch>
+            <a:fillRect/>
+          </a:stretch>
+        </p:blipFill>
+        <p:spPr>
+          <a:xfrm>
+            <a:off x="3091434" y="1477568"/>
+            <a:ext cx="6009132" cy="4506034"/>
+          </a:xfrm>
+          <a:prstGeom prst="rect">
+            <a:avLst/>
+          </a:prstGeom>
+        </p:spPr>
+      </p:pic>
+    </p:spTree>
+    <p:extLst>
+      <p:ext uri="{BB962C8B-B14F-4D97-AF65-F5344CB8AC3E}">
+        <p14:creationId xmlns:p14="http://schemas.microsoft.com/office/powerpoint/2010/main" val="3988449871"/>
+      </p:ext>
+    </p:extLst>
+  </p:cSld>
+  <p:clrMapOvr>
+    <a:masterClrMapping/>
+  </p:clrMapOvr>
+</p:sld>
+</file>
+
+<file path=ppt/slides/slide26.xml><?xml version="1.0" encoding="utf-8"?>
 <p:sld xmlns:a="http://schemas.openxmlformats.org/drawingml/2006/main" xmlns:r="http://schemas.openxmlformats.org/officeDocument/2006/relationships" xmlns:p="http://schemas.openxmlformats.org/presentationml/2006/main">
   <p:cSld>
     <p:spTree>
@@ -41808,7 +41683,7 @@
 </p:sld>
 </file>
 
-<file path=ppt/slides/slide26.xml><?xml version="1.0" encoding="utf-8"?>
+<file path=ppt/slides/slide27.xml><?xml version="1.0" encoding="utf-8"?>
 <p:sld xmlns:a="http://schemas.openxmlformats.org/drawingml/2006/main" xmlns:r="http://schemas.openxmlformats.org/officeDocument/2006/relationships" xmlns:p="http://schemas.openxmlformats.org/presentationml/2006/main">
   <p:cSld>
     <p:spTree>
@@ -41856,7 +41731,7 @@
           <a:p>
             <a:r>
               <a:rPr lang="en-US" sz="6000" noProof="0" dirty="0"/>
-              <a:t>Conclusion</a:t>
+              <a:t>4.1. Achieved Results &amp; Limitations </a:t>
             </a:r>
           </a:p>
         </p:txBody>
@@ -42001,7 +41876,7 @@
 </p:sld>
 </file>
 
-<file path=ppt/slides/slide27.xml><?xml version="1.0" encoding="utf-8"?>
+<file path=ppt/slides/slide28.xml><?xml version="1.0" encoding="utf-8"?>
 <p:sld xmlns:a="http://schemas.openxmlformats.org/drawingml/2006/main" xmlns:r="http://schemas.openxmlformats.org/officeDocument/2006/relationships" xmlns:p="http://schemas.openxmlformats.org/presentationml/2006/main">
   <p:cSld>
     <p:spTree>
@@ -42049,7 +41924,7 @@
           <a:p>
             <a:r>
               <a:rPr lang="en-US" sz="6000" dirty="0"/>
-              <a:t>Conclusion	</a:t>
+              <a:t>4.2. Development Direction	</a:t>
             </a:r>
           </a:p>
         </p:txBody>
@@ -42147,7 +42022,7 @@
 </p:sld>
 </file>
 
-<file path=ppt/slides/slide28.xml><?xml version="1.0" encoding="utf-8"?>
+<file path=ppt/slides/slide29.xml><?xml version="1.0" encoding="utf-8"?>
 <p:sld xmlns:a="http://schemas.openxmlformats.org/drawingml/2006/main" xmlns:r="http://schemas.openxmlformats.org/officeDocument/2006/relationships" xmlns:p="http://schemas.openxmlformats.org/presentationml/2006/main">
   <p:cSld>
     <p:spTree>
@@ -42226,94 +42101,6 @@
     <p:extLst>
       <p:ext uri="{BB962C8B-B14F-4D97-AF65-F5344CB8AC3E}">
         <p14:creationId xmlns:p14="http://schemas.microsoft.com/office/powerpoint/2010/main" val="131648227"/>
-      </p:ext>
-    </p:extLst>
-  </p:cSld>
-  <p:clrMapOvr>
-    <a:masterClrMapping/>
-  </p:clrMapOvr>
-</p:sld>
-</file>
-
-<file path=ppt/slides/slide29.xml><?xml version="1.0" encoding="utf-8"?>
-<p:sld xmlns:a="http://schemas.openxmlformats.org/drawingml/2006/main" xmlns:r="http://schemas.openxmlformats.org/officeDocument/2006/relationships" xmlns:p="http://schemas.openxmlformats.org/presentationml/2006/main">
-  <p:cSld>
-    <p:spTree>
-      <p:nvGrpSpPr>
-        <p:cNvPr id="1" name="">
-          <a:extLst>
-            <a:ext uri="{FF2B5EF4-FFF2-40B4-BE49-F238E27FC236}">
-              <a16:creationId xmlns:a16="http://schemas.microsoft.com/office/drawing/2014/main" id="{CA10988A-D0E1-75AB-220F-9387E0741A09}"/>
-            </a:ext>
-          </a:extLst>
-        </p:cNvPr>
-        <p:cNvGrpSpPr/>
-        <p:nvPr/>
-      </p:nvGrpSpPr>
-      <p:grpSpPr>
-        <a:xfrm>
-          <a:off x="0" y="0"/>
-          <a:ext cx="0" cy="0"/>
-          <a:chOff x="0" y="0"/>
-          <a:chExt cx="0" cy="0"/>
-        </a:xfrm>
-      </p:grpSpPr>
-      <p:sp>
-        <p:nvSpPr>
-          <p:cNvPr id="2" name="Title 1">
-            <a:extLst>
-              <a:ext uri="{FF2B5EF4-FFF2-40B4-BE49-F238E27FC236}">
-                <a16:creationId xmlns:a16="http://schemas.microsoft.com/office/drawing/2014/main" id="{56CB7F25-6628-CF27-C5CA-22FEF4B89EBC}"/>
-              </a:ext>
-            </a:extLst>
-          </p:cNvPr>
-          <p:cNvSpPr>
-            <a:spLocks noGrp="1"/>
-          </p:cNvSpPr>
-          <p:nvPr>
-            <p:ph type="title"/>
-          </p:nvPr>
-        </p:nvSpPr>
-        <p:spPr/>
-        <p:txBody>
-          <a:bodyPr/>
-          <a:lstStyle/>
-          <a:p>
-            <a:endParaRPr lang="en-US" dirty="0"/>
-          </a:p>
-        </p:txBody>
-      </p:sp>
-      <p:sp>
-        <p:nvSpPr>
-          <p:cNvPr id="3" name="Content Placeholder 2">
-            <a:extLst>
-              <a:ext uri="{FF2B5EF4-FFF2-40B4-BE49-F238E27FC236}">
-                <a16:creationId xmlns:a16="http://schemas.microsoft.com/office/drawing/2014/main" id="{82630AE2-833A-8EEB-48FC-93F020F714C3}"/>
-              </a:ext>
-            </a:extLst>
-          </p:cNvPr>
-          <p:cNvSpPr>
-            <a:spLocks noGrp="1"/>
-          </p:cNvSpPr>
-          <p:nvPr>
-            <p:ph idx="1"/>
-          </p:nvPr>
-        </p:nvSpPr>
-        <p:spPr/>
-        <p:txBody>
-          <a:bodyPr>
-            <a:normAutofit/>
-          </a:bodyPr>
-          <a:lstStyle/>
-          <a:p>
-            <a:endParaRPr lang="en-US" dirty="0"/>
-          </a:p>
-        </p:txBody>
-      </p:sp>
-    </p:spTree>
-    <p:extLst>
-      <p:ext uri="{BB962C8B-B14F-4D97-AF65-F5344CB8AC3E}">
-        <p14:creationId xmlns:p14="http://schemas.microsoft.com/office/powerpoint/2010/main" val="2331155445"/>
       </p:ext>
     </p:extLst>
   </p:cSld>
@@ -42392,7 +42179,13 @@
   <p:cSld>
     <p:spTree>
       <p:nvGrpSpPr>
-        <p:cNvPr id="1" name=""/>
+        <p:cNvPr id="1" name="">
+          <a:extLst>
+            <a:ext uri="{FF2B5EF4-FFF2-40B4-BE49-F238E27FC236}">
+              <a16:creationId xmlns:a16="http://schemas.microsoft.com/office/drawing/2014/main" id="{CA10988A-D0E1-75AB-220F-9387E0741A09}"/>
+            </a:ext>
+          </a:extLst>
+        </p:cNvPr>
         <p:cNvGrpSpPr/>
         <p:nvPr/>
       </p:nvGrpSpPr>
@@ -42406,10 +42199,10 @@
       </p:grpSpPr>
       <p:sp>
         <p:nvSpPr>
-          <p:cNvPr id="80" name="Picture Placeholder 79">
+          <p:cNvPr id="2" name="Title 1">
             <a:extLst>
               <a:ext uri="{FF2B5EF4-FFF2-40B4-BE49-F238E27FC236}">
-                <a16:creationId xmlns:a16="http://schemas.microsoft.com/office/drawing/2014/main" id="{F093B2DB-8BE8-A46A-4714-37C5898CB6F1}"/>
+                <a16:creationId xmlns:a16="http://schemas.microsoft.com/office/drawing/2014/main" id="{56CB7F25-6628-CF27-C5CA-22FEF4B89EBC}"/>
               </a:ext>
             </a:extLst>
           </p:cNvPr>
@@ -42417,7 +42210,7 @@
             <a:spLocks noGrp="1"/>
           </p:cNvSpPr>
           <p:nvPr>
-            <p:ph type="pic" sz="quarter" idx="15"/>
+            <p:ph type="title"/>
           </p:nvPr>
         </p:nvSpPr>
         <p:spPr/>
@@ -42425,10 +42218,67 @@
           <a:bodyPr/>
           <a:lstStyle/>
           <a:p>
-            <a:endParaRPr lang="en-US"/>
+            <a:endParaRPr lang="en-US" dirty="0"/>
           </a:p>
         </p:txBody>
       </p:sp>
+      <p:sp>
+        <p:nvSpPr>
+          <p:cNvPr id="3" name="Content Placeholder 2">
+            <a:extLst>
+              <a:ext uri="{FF2B5EF4-FFF2-40B4-BE49-F238E27FC236}">
+                <a16:creationId xmlns:a16="http://schemas.microsoft.com/office/drawing/2014/main" id="{82630AE2-833A-8EEB-48FC-93F020F714C3}"/>
+              </a:ext>
+            </a:extLst>
+          </p:cNvPr>
+          <p:cNvSpPr>
+            <a:spLocks noGrp="1"/>
+          </p:cNvSpPr>
+          <p:nvPr>
+            <p:ph idx="1"/>
+          </p:nvPr>
+        </p:nvSpPr>
+        <p:spPr/>
+        <p:txBody>
+          <a:bodyPr>
+            <a:normAutofit/>
+          </a:bodyPr>
+          <a:lstStyle/>
+          <a:p>
+            <a:endParaRPr lang="en-US" dirty="0"/>
+          </a:p>
+        </p:txBody>
+      </p:sp>
+    </p:spTree>
+    <p:extLst>
+      <p:ext uri="{BB962C8B-B14F-4D97-AF65-F5344CB8AC3E}">
+        <p14:creationId xmlns:p14="http://schemas.microsoft.com/office/powerpoint/2010/main" val="2331155445"/>
+      </p:ext>
+    </p:extLst>
+  </p:cSld>
+  <p:clrMapOvr>
+    <a:masterClrMapping/>
+  </p:clrMapOvr>
+</p:sld>
+</file>
+
+<file path=ppt/slides/slide31.xml><?xml version="1.0" encoding="utf-8"?>
+<p:sld xmlns:a="http://schemas.openxmlformats.org/drawingml/2006/main" xmlns:r="http://schemas.openxmlformats.org/officeDocument/2006/relationships" xmlns:p="http://schemas.openxmlformats.org/presentationml/2006/main">
+  <p:cSld>
+    <p:spTree>
+      <p:nvGrpSpPr>
+        <p:cNvPr id="1" name=""/>
+        <p:cNvGrpSpPr/>
+        <p:nvPr/>
+      </p:nvGrpSpPr>
+      <p:grpSpPr>
+        <a:xfrm>
+          <a:off x="0" y="0"/>
+          <a:ext cx="0" cy="0"/>
+          <a:chOff x="0" y="0"/>
+          <a:chExt cx="0" cy="0"/>
+        </a:xfrm>
+      </p:grpSpPr>
       <p:sp>
         <p:nvSpPr>
           <p:cNvPr id="78" name="Title 77">
@@ -42481,10 +42331,10 @@
       </p:sp>
       <p:sp>
         <p:nvSpPr>
-          <p:cNvPr id="81" name="Picture Placeholder 80">
+          <p:cNvPr id="59" name="Picture Placeholder 58">
             <a:extLst>
               <a:ext uri="{FF2B5EF4-FFF2-40B4-BE49-F238E27FC236}">
-                <a16:creationId xmlns:a16="http://schemas.microsoft.com/office/drawing/2014/main" id="{712CDDDF-DB29-99C8-A185-54F6B0FCAF48}"/>
+                <a16:creationId xmlns:a16="http://schemas.microsoft.com/office/drawing/2014/main" id="{C711BF57-35D0-306D-9C25-BF112354CB4E}"/>
               </a:ext>
             </a:extLst>
           </p:cNvPr>
@@ -42492,14 +42342,12 @@
             <a:spLocks noGrp="1"/>
           </p:cNvSpPr>
           <p:nvPr>
-            <p:ph type="pic" sz="quarter" idx="16"/>
+            <p:ph type="pic" sz="quarter" idx="15"/>
           </p:nvPr>
         </p:nvSpPr>
         <p:spPr/>
         <p:txBody>
-          <a:bodyPr>
-            <a:normAutofit fontScale="25000" lnSpcReduction="20000"/>
-          </a:bodyPr>
+          <a:bodyPr/>
           <a:lstStyle/>
           <a:p>
             <a:endParaRPr lang="en-US"/>
@@ -42560,12 +42408,14 @@
         </p:nvSpPr>
         <p:spPr/>
         <p:txBody>
-          <a:bodyPr/>
+          <a:bodyPr>
+            <a:normAutofit/>
+          </a:bodyPr>
           <a:lstStyle/>
           <a:p>
             <a:r>
-              <a:rPr lang="en-US" dirty="0"/>
-              <a:t>Introduction</a:t>
+              <a:rPr lang="en-US" sz="6000" dirty="0"/>
+              <a:t>1.1. Problem Description</a:t>
             </a:r>
           </a:p>
         </p:txBody>
@@ -42593,43 +42443,54 @@
           </a:bodyPr>
           <a:lstStyle/>
           <a:p>
-            <a:r>
-              <a:rPr lang="en-US" b="1" dirty="0"/>
-              <a:t>Problem Description</a:t>
-            </a:r>
-          </a:p>
-          <a:p>
+            <a:pPr marL="342900" indent="-342900">
+              <a:buFont typeface="Arial" panose="020B0604020202020204" pitchFamily="34" charset="0"/>
+              <a:buChar char="•"/>
+            </a:pPr>
             <a:r>
               <a:rPr lang="en-US" dirty="0"/>
-              <a:t>Mushroom identification is difficult for beginners due to subtle visual similarities.</a:t>
+              <a:t>Mushroom identification is difficult for beginners due to subtle similarities.</a:t>
             </a:r>
           </a:p>
           <a:p>
-            <a:r>
-              <a:rPr lang="en-US" dirty="0"/>
-              <a:t>Misidentification can cause serious health risks and poisoning.</a:t>
-            </a:r>
-          </a:p>
-          <a:p>
+            <a:pPr marL="342900" indent="-342900">
+              <a:buFont typeface="Arial" panose="020B0604020202020204" pitchFamily="34" charset="0"/>
+              <a:buChar char="•"/>
+            </a:pPr>
             <a:r>
               <a:rPr lang="en-US" dirty="0"/>
               <a:t>Traditional methods require prior knowledge and are prone to errors.</a:t>
             </a:r>
           </a:p>
           <a:p>
+            <a:pPr marL="342900" indent="-342900">
+              <a:buFont typeface="Arial" panose="020B0604020202020204" pitchFamily="34" charset="0"/>
+              <a:buChar char="•"/>
+            </a:pPr>
             <a:r>
               <a:rPr lang="en-US" dirty="0"/>
-              <a:t>Growing interest in outdoor activities increases demand for accessible identification tools.</a:t>
+              <a:t>Misidentification can cause serious health risks.</a:t>
             </a:r>
           </a:p>
           <a:p>
+            <a:pPr marL="342900" indent="-342900">
+              <a:buFont typeface="Arial" panose="020B0604020202020204" pitchFamily="34" charset="0"/>
+              <a:buChar char="•"/>
+            </a:pPr>
             <a:r>
               <a:rPr lang="en-US" dirty="0"/>
-              <a:t>Image-based tools alone are not enough; users also need search and location-based context.</a:t>
+              <a:t>Growing interest in foraging has increased demand for reliable, accessible tools</a:t>
             </a:r>
           </a:p>
           <a:p>
-            <a:endParaRPr lang="en-US" dirty="0"/>
+            <a:pPr marL="342900" indent="-342900">
+              <a:buFont typeface="Arial" panose="020B0604020202020204" pitchFamily="34" charset="0"/>
+              <a:buChar char="•"/>
+            </a:pPr>
+            <a:r>
+              <a:rPr lang="en-US" dirty="0"/>
+              <a:t>Existing digital solutions are often limited by high cost or restrictive freemium models.</a:t>
+            </a:r>
           </a:p>
         </p:txBody>
       </p:sp>
@@ -42687,12 +42548,14 @@
         </p:nvSpPr>
         <p:spPr/>
         <p:txBody>
-          <a:bodyPr/>
+          <a:bodyPr>
+            <a:normAutofit/>
+          </a:bodyPr>
           <a:lstStyle/>
           <a:p>
             <a:r>
-              <a:rPr lang="en-US" dirty="0"/>
-              <a:t>Introduction</a:t>
+              <a:rPr lang="en-US" sz="6000" dirty="0"/>
+              <a:t>1.2. Purpose of the Study</a:t>
             </a:r>
           </a:p>
         </p:txBody>
@@ -42720,47 +42583,43 @@
           </a:bodyPr>
           <a:lstStyle/>
           <a:p>
-            <a:r>
-              <a:rPr lang="en-US" b="1" dirty="0"/>
-              <a:t>Purpose of the Study</a:t>
-            </a:r>
-          </a:p>
-          <a:p>
+            <a:pPr marL="342900" indent="-342900">
+              <a:buFont typeface="Arial" panose="020B0604020202020204" pitchFamily="34" charset="0"/>
+              <a:buChar char="•"/>
+            </a:pPr>
             <a:r>
               <a:rPr lang="en-US" dirty="0"/>
-              <a:t>Develop </a:t>
+              <a:t>Develop a beginner friendly Android app for safe mushroom identification that support safe foraging practices and self-learning.</a:t>
             </a:r>
-            <a:r>
-              <a:rPr lang="en-US" i="1" dirty="0"/>
-              <a:t>FungiScan</a:t>
-            </a:r>
+          </a:p>
+          <a:p>
+            <a:pPr marL="342900" indent="-342900">
+              <a:buFont typeface="Arial" panose="020B0604020202020204" pitchFamily="34" charset="0"/>
+              <a:buChar char="•"/>
+            </a:pPr>
             <a:r>
               <a:rPr lang="en-US" dirty="0"/>
-              <a:t>, a beginner-friendly Android app for safe mushroom identification.</a:t>
+              <a:t>Provide real time image recognition using a server-side model with local result storage.</a:t>
             </a:r>
           </a:p>
           <a:p>
+            <a:pPr marL="342900" indent="-342900">
+              <a:buFont typeface="Arial" panose="020B0604020202020204" pitchFamily="34" charset="0"/>
+              <a:buChar char="•"/>
+            </a:pPr>
             <a:r>
               <a:rPr lang="en-US" dirty="0"/>
-              <a:t>Provide real-time image recognition using a server-side ViT model.</a:t>
+              <a:t>Include a keyword-searchable mushroom database.</a:t>
             </a:r>
           </a:p>
           <a:p>
-            <a:r>
-              <a:rPr lang="en-US" dirty="0"/>
-              <a:t>Include a keyword-searchable mushroom database for offline exploration.</a:t>
-            </a:r>
-          </a:p>
-          <a:p>
+            <a:pPr marL="342900" indent="-342900">
+              <a:buFont typeface="Arial" panose="020B0604020202020204" pitchFamily="34" charset="0"/>
+              <a:buChar char="•"/>
+            </a:pPr>
             <a:r>
               <a:rPr lang="en-US" dirty="0"/>
               <a:t>Integrate an interactive forage map using iNaturalist community observations.</a:t>
-            </a:r>
-          </a:p>
-          <a:p>
-            <a:r>
-              <a:rPr lang="en-US" dirty="0"/>
-              <a:t>Support safe foraging practices and self-learning.</a:t>
             </a:r>
           </a:p>
           <a:p>
@@ -42822,12 +42681,14 @@
         </p:nvSpPr>
         <p:spPr/>
         <p:txBody>
-          <a:bodyPr/>
+          <a:bodyPr>
+            <a:normAutofit/>
+          </a:bodyPr>
           <a:lstStyle/>
           <a:p>
             <a:r>
-              <a:rPr lang="en-US" dirty="0"/>
-              <a:t>Introduction</a:t>
+              <a:rPr lang="en-US" sz="6000" dirty="0"/>
+              <a:t>1.3. Objectives &amp; Scope</a:t>
             </a:r>
           </a:p>
         </p:txBody>
@@ -42857,23 +42718,34 @@
           <a:p>
             <a:r>
               <a:rPr lang="en-US" b="1" dirty="0"/>
-              <a:t>Objectives &amp; Scope Objectives</a:t>
+              <a:t>Objectives:</a:t>
             </a:r>
-            <a:endParaRPr lang="en-US" dirty="0"/>
-          </a:p>
-          <a:p>
+          </a:p>
+          <a:p>
+            <a:pPr marL="342900" indent="-342900">
+              <a:buFont typeface="Arial" panose="020B0604020202020204" pitchFamily="34" charset="0"/>
+              <a:buChar char="•"/>
+            </a:pPr>
             <a:r>
               <a:rPr lang="en-US" dirty="0"/>
               <a:t>Build an app that delivers reliable AI-based identification.</a:t>
             </a:r>
           </a:p>
           <a:p>
+            <a:pPr marL="342900" indent="-342900">
+              <a:buFont typeface="Arial" panose="020B0604020202020204" pitchFamily="34" charset="0"/>
+              <a:buChar char="•"/>
+            </a:pPr>
             <a:r>
               <a:rPr lang="en-US" dirty="0"/>
-              <a:t>Design a fast client–server architecture with intuitive UI/UX.</a:t>
+              <a:t>Design a fast client server architecture with intuitive UI/UX.</a:t>
             </a:r>
           </a:p>
           <a:p>
+            <a:pPr marL="342900" indent="-342900">
+              <a:buFont typeface="Arial" panose="020B0604020202020204" pitchFamily="34" charset="0"/>
+              <a:buChar char="•"/>
+            </a:pPr>
             <a:r>
               <a:rPr lang="en-US" dirty="0"/>
               <a:t>Combine image inference, search, history, and map features.</a:t>
@@ -42882,23 +42754,35 @@
           <a:p>
             <a:r>
               <a:rPr lang="en-US" b="1" dirty="0"/>
-              <a:t>Scope</a:t>
+              <a:t>Scope:</a:t>
             </a:r>
             <a:endParaRPr lang="en-US" dirty="0"/>
           </a:p>
           <a:p>
+            <a:pPr marL="342900" indent="-342900">
+              <a:buFont typeface="Arial" panose="020B0604020202020204" pitchFamily="34" charset="0"/>
+              <a:buChar char="•"/>
+            </a:pPr>
             <a:r>
               <a:rPr lang="en-US" dirty="0"/>
-              <a:t>Android app using Flutter; server inference via PyTorch + Lightning.ai.</a:t>
+              <a:t>Android app using Flutter, server inference via PyTorch + Lightning.ai.</a:t>
             </a:r>
           </a:p>
           <a:p>
+            <a:pPr marL="342900" indent="-342900">
+              <a:buFont typeface="Arial" panose="020B0604020202020204" pitchFamily="34" charset="0"/>
+              <a:buChar char="•"/>
+            </a:pPr>
             <a:r>
               <a:rPr lang="en-US" dirty="0"/>
               <a:t>Local SQLite storage and a bundled JSON dataset.</a:t>
             </a:r>
           </a:p>
           <a:p>
+            <a:pPr marL="342900" indent="-342900">
+              <a:buFont typeface="Arial" panose="020B0604020202020204" pitchFamily="34" charset="0"/>
+              <a:buChar char="•"/>
+            </a:pPr>
             <a:r>
               <a:rPr lang="en-US" dirty="0"/>
               <a:t>Integration of iNaturalist API.</a:t>
@@ -43032,12 +42916,14 @@
         </p:nvSpPr>
         <p:spPr/>
         <p:txBody>
-          <a:bodyPr/>
+          <a:bodyPr>
+            <a:normAutofit/>
+          </a:bodyPr>
           <a:lstStyle/>
           <a:p>
             <a:r>
-              <a:rPr lang="en-US" dirty="0"/>
-              <a:t>Theoretical basis &amp; systems analysis</a:t>
+              <a:rPr lang="en-US" sz="6000" dirty="0"/>
+              <a:t>2.1. Key Technologies </a:t>
             </a:r>
           </a:p>
         </p:txBody>
@@ -43061,15 +42947,9 @@
         <p:spPr/>
         <p:txBody>
           <a:bodyPr>
-            <a:normAutofit fontScale="92500"/>
+            <a:normAutofit lnSpcReduction="10000"/>
           </a:bodyPr>
           <a:lstStyle/>
-          <a:p>
-            <a:r>
-              <a:rPr lang="en-US" b="1" dirty="0"/>
-              <a:t>Key Technologies Used</a:t>
-            </a:r>
-          </a:p>
           <a:p>
             <a:pPr marL="342900" indent="-342900">
               <a:buFont typeface="Arial" panose="020B0604020202020204" pitchFamily="34" charset="0"/>
@@ -43170,7 +43050,7 @@
         <p:cNvPr id="1" name="">
           <a:extLst>
             <a:ext uri="{FF2B5EF4-FFF2-40B4-BE49-F238E27FC236}">
-              <a16:creationId xmlns:a16="http://schemas.microsoft.com/office/drawing/2014/main" id="{0620BF8C-2B1D-347D-08A0-5065EC1622FD}"/>
+              <a16:creationId xmlns:a16="http://schemas.microsoft.com/office/drawing/2014/main" id="{D6B3302F-2E3A-0B18-A55E-29D4E3309E6D}"/>
             </a:ext>
           </a:extLst>
         </p:cNvPr>
@@ -43190,7 +43070,7 @@
           <p:cNvPr id="2" name="Title 1">
             <a:extLst>
               <a:ext uri="{FF2B5EF4-FFF2-40B4-BE49-F238E27FC236}">
-                <a16:creationId xmlns:a16="http://schemas.microsoft.com/office/drawing/2014/main" id="{0C001596-C9BF-FDEE-FF39-A9F8DD96F9A7}"/>
+                <a16:creationId xmlns:a16="http://schemas.microsoft.com/office/drawing/2014/main" id="{0DE05624-1CA7-765B-EB72-63043428EF7A}"/>
               </a:ext>
             </a:extLst>
           </p:cNvPr>
@@ -43203,12 +43083,14 @@
         </p:nvSpPr>
         <p:spPr/>
         <p:txBody>
-          <a:bodyPr/>
+          <a:bodyPr>
+            <a:normAutofit/>
+          </a:bodyPr>
           <a:lstStyle/>
           <a:p>
             <a:r>
-              <a:rPr lang="en-US" dirty="0"/>
-              <a:t>Theoretical basis &amp; systems analysis</a:t>
+              <a:rPr lang="en-US" sz="6000" dirty="0"/>
+              <a:t>2.2. Vision Transformer Model</a:t>
             </a:r>
           </a:p>
         </p:txBody>
@@ -43218,7 +43100,7 @@
           <p:cNvPr id="3" name="Content Placeholder 2">
             <a:extLst>
               <a:ext uri="{FF2B5EF4-FFF2-40B4-BE49-F238E27FC236}">
-                <a16:creationId xmlns:a16="http://schemas.microsoft.com/office/drawing/2014/main" id="{079AD8B6-ECCA-266A-0B15-B3B8B2A60770}"/>
+                <a16:creationId xmlns:a16="http://schemas.microsoft.com/office/drawing/2014/main" id="{2670AC88-4913-68CD-4E45-70F0D66C536D}"/>
               </a:ext>
             </a:extLst>
           </p:cNvPr>
@@ -43232,63 +43114,69 @@
         <p:spPr/>
         <p:txBody>
           <a:bodyPr>
-            <a:normAutofit lnSpcReduction="10000"/>
+            <a:normAutofit/>
           </a:bodyPr>
           <a:lstStyle/>
           <a:p>
             <a:r>
               <a:rPr lang="en-US" b="1" dirty="0"/>
-              <a:t>SLIDE 2 — Deep Learning Overview</a:t>
+              <a:t>Vision Transformer (ViT) Model (which model, add it here</a:t>
             </a:r>
-          </a:p>
-          <a:p>
+            <a:r>
+              <a:rPr lang="en-US" b="1"/>
+              <a:t>, pre-trained </a:t>
+            </a:r>
             <a:r>
               <a:rPr lang="en-US" b="1" dirty="0"/>
-              <a:t>Deep Learning</a:t>
+              <a:t>on?)</a:t>
             </a:r>
+            <a:endParaRPr lang="en-US" dirty="0"/>
+          </a:p>
+          <a:p>
+            <a:pPr marL="342900" indent="-342900">
+              <a:buFont typeface="Arial" panose="020B0604020202020204" pitchFamily="34" charset="0"/>
+              <a:buChar char="•"/>
+            </a:pPr>
             <a:r>
               <a:rPr lang="en-US" dirty="0"/>
-              <a:t>: Multi-layer neural networks for automatic feature extraction.</a:t>
+              <a:t>Image → split into patches → embedded as tokens.</a:t>
             </a:r>
           </a:p>
           <a:p>
-            <a:r>
-              <a:rPr lang="en-US" b="1" dirty="0"/>
-              <a:t>CNN vs ViT</a:t>
-            </a:r>
+            <a:pPr marL="342900" indent="-342900">
+              <a:buFont typeface="Arial" panose="020B0604020202020204" pitchFamily="34" charset="0"/>
+              <a:buChar char="•"/>
+            </a:pPr>
             <a:r>
               <a:rPr lang="en-US" dirty="0"/>
-              <a:t>:</a:t>
+              <a:t>Multi-Head Self-Attention captures global relationships.</a:t>
             </a:r>
           </a:p>
           <a:p>
-            <a:pPr lvl="1"/>
+            <a:pPr marL="342900" indent="-342900">
+              <a:buFont typeface="Arial" panose="020B0604020202020204" pitchFamily="34" charset="0"/>
+              <a:buChar char="•"/>
+            </a:pPr>
             <a:r>
               <a:rPr lang="en-US" dirty="0"/>
-              <a:t>CNN: local feature extraction, strong on structured patterns.</a:t>
+              <a:t>CLS token produces final class prediction.</a:t>
             </a:r>
           </a:p>
           <a:p>
-            <a:pPr lvl="1"/>
+            <a:pPr marL="342900" indent="-342900">
+              <a:buFont typeface="Arial" panose="020B0604020202020204" pitchFamily="34" charset="0"/>
+              <a:buChar char="•"/>
+            </a:pPr>
             <a:r>
               <a:rPr lang="en-US" dirty="0"/>
-              <a:t>ViT: patch-based attention, better at global context and fine-grained differences.</a:t>
+              <a:t>Higher accuracy than ResNet-50, EfficientNet and MobileNet on the custom dataset.</a:t>
             </a:r>
           </a:p>
           <a:p>
-            <a:r>
-              <a:rPr lang="en-US" b="1" dirty="0"/>
-              <a:t>Why ViT for mushrooms</a:t>
-            </a:r>
-            <a:r>
-              <a:rPr lang="en-US" dirty="0"/>
-              <a:t>: Handles subtle visual details and complex textures.</a:t>
-            </a:r>
-          </a:p>
-          <a:p>
-            <a:br>
-              <a:rPr lang="en-US" dirty="0"/>
-            </a:br>
+            <a:pPr marL="342900" indent="-342900">
+              <a:buFont typeface="Arial" panose="020B0604020202020204" pitchFamily="34" charset="0"/>
+              <a:buChar char="•"/>
+            </a:pPr>
             <a:endParaRPr lang="en-US" dirty="0"/>
           </a:p>
         </p:txBody>
@@ -43296,7 +43184,7 @@
     </p:spTree>
     <p:extLst>
       <p:ext uri="{BB962C8B-B14F-4D97-AF65-F5344CB8AC3E}">
-        <p14:creationId xmlns:p14="http://schemas.microsoft.com/office/powerpoint/2010/main" val="1814031870"/>
+        <p14:creationId xmlns:p14="http://schemas.microsoft.com/office/powerpoint/2010/main" val="1847825848"/>
       </p:ext>
     </p:extLst>
   </p:cSld>

</xml_diff>

<commit_message>
feat: ppt draft 1
</commit_message>
<xml_diff>
--- a/Báo cáo/ThesisReport.pptx
+++ b/Báo cáo/ThesisReport.pptx
@@ -5,7 +5,7 @@
     <p:sldMasterId id="2147483648" r:id="rId1"/>
   </p:sldMasterIdLst>
   <p:notesMasterIdLst>
-    <p:notesMasterId r:id="rId33"/>
+    <p:notesMasterId r:id="rId30"/>
   </p:notesMasterIdLst>
   <p:sldIdLst>
     <p:sldId id="271" r:id="rId2"/>
@@ -17,28 +17,25 @@
     <p:sldId id="281" r:id="rId8"/>
     <p:sldId id="284" r:id="rId9"/>
     <p:sldId id="299" r:id="rId10"/>
-    <p:sldId id="300" r:id="rId11"/>
-    <p:sldId id="292" r:id="rId12"/>
-    <p:sldId id="296" r:id="rId13"/>
-    <p:sldId id="293" r:id="rId14"/>
-    <p:sldId id="294" r:id="rId15"/>
-    <p:sldId id="295" r:id="rId16"/>
-    <p:sldId id="298" r:id="rId17"/>
-    <p:sldId id="297" r:id="rId18"/>
-    <p:sldId id="274" r:id="rId19"/>
-    <p:sldId id="275" r:id="rId20"/>
-    <p:sldId id="276" r:id="rId21"/>
-    <p:sldId id="277" r:id="rId22"/>
-    <p:sldId id="278" r:id="rId23"/>
-    <p:sldId id="285" r:id="rId24"/>
-    <p:sldId id="279" r:id="rId25"/>
-    <p:sldId id="301" r:id="rId26"/>
-    <p:sldId id="273" r:id="rId27"/>
-    <p:sldId id="272" r:id="rId28"/>
-    <p:sldId id="270" r:id="rId29"/>
-    <p:sldId id="261" r:id="rId30"/>
-    <p:sldId id="283" r:id="rId31"/>
-    <p:sldId id="267" r:id="rId32"/>
+    <p:sldId id="292" r:id="rId11"/>
+    <p:sldId id="296" r:id="rId12"/>
+    <p:sldId id="293" r:id="rId13"/>
+    <p:sldId id="294" r:id="rId14"/>
+    <p:sldId id="295" r:id="rId15"/>
+    <p:sldId id="298" r:id="rId16"/>
+    <p:sldId id="297" r:id="rId17"/>
+    <p:sldId id="274" r:id="rId18"/>
+    <p:sldId id="275" r:id="rId19"/>
+    <p:sldId id="276" r:id="rId20"/>
+    <p:sldId id="277" r:id="rId21"/>
+    <p:sldId id="278" r:id="rId22"/>
+    <p:sldId id="285" r:id="rId23"/>
+    <p:sldId id="279" r:id="rId24"/>
+    <p:sldId id="301" r:id="rId25"/>
+    <p:sldId id="273" r:id="rId26"/>
+    <p:sldId id="272" r:id="rId27"/>
+    <p:sldId id="270" r:id="rId28"/>
+    <p:sldId id="261" r:id="rId29"/>
   </p:sldIdLst>
   <p:sldSz cx="12192000" cy="6858000"/>
   <p:notesSz cx="6858000" cy="9144000"/>
@@ -594,121 +591,6 @@
         <p:cNvPr id="1" name="">
           <a:extLst>
             <a:ext uri="{FF2B5EF4-FFF2-40B4-BE49-F238E27FC236}">
-              <a16:creationId xmlns:a16="http://schemas.microsoft.com/office/drawing/2014/main" id="{38D4E520-8007-473F-1EAD-F11A63BDDB6A}"/>
-            </a:ext>
-          </a:extLst>
-        </p:cNvPr>
-        <p:cNvGrpSpPr/>
-        <p:nvPr/>
-      </p:nvGrpSpPr>
-      <p:grpSpPr>
-        <a:xfrm>
-          <a:off x="0" y="0"/>
-          <a:ext cx="0" cy="0"/>
-          <a:chOff x="0" y="0"/>
-          <a:chExt cx="0" cy="0"/>
-        </a:xfrm>
-      </p:grpSpPr>
-      <p:sp>
-        <p:nvSpPr>
-          <p:cNvPr id="2" name="Slide Image Placeholder 1">
-            <a:extLst>
-              <a:ext uri="{FF2B5EF4-FFF2-40B4-BE49-F238E27FC236}">
-                <a16:creationId xmlns:a16="http://schemas.microsoft.com/office/drawing/2014/main" id="{85569434-C290-0358-EADD-2A95BF7707BA}"/>
-              </a:ext>
-            </a:extLst>
-          </p:cNvPr>
-          <p:cNvSpPr>
-            <a:spLocks noGrp="1" noRot="1" noChangeAspect="1"/>
-          </p:cNvSpPr>
-          <p:nvPr>
-            <p:ph type="sldImg"/>
-          </p:nvPr>
-        </p:nvSpPr>
-        <p:spPr/>
-        <p:txBody>
-          <a:bodyPr/>
-          <a:lstStyle/>
-          <a:p>
-            <a:endParaRPr lang="en-US"/>
-          </a:p>
-        </p:txBody>
-      </p:sp>
-      <p:sp>
-        <p:nvSpPr>
-          <p:cNvPr id="3" name="Notes Placeholder 2">
-            <a:extLst>
-              <a:ext uri="{FF2B5EF4-FFF2-40B4-BE49-F238E27FC236}">
-                <a16:creationId xmlns:a16="http://schemas.microsoft.com/office/drawing/2014/main" id="{82B74D49-C1CE-653B-4198-1DE2391C5539}"/>
-              </a:ext>
-            </a:extLst>
-          </p:cNvPr>
-          <p:cNvSpPr>
-            <a:spLocks noGrp="1"/>
-          </p:cNvSpPr>
-          <p:nvPr>
-            <p:ph type="body" idx="1"/>
-          </p:nvPr>
-        </p:nvSpPr>
-        <p:spPr/>
-        <p:txBody>
-          <a:bodyPr/>
-          <a:lstStyle/>
-          <a:p>
-            <a:endParaRPr lang="en-US" dirty="0"/>
-          </a:p>
-        </p:txBody>
-      </p:sp>
-      <p:sp>
-        <p:nvSpPr>
-          <p:cNvPr id="4" name="Slide Number Placeholder 3">
-            <a:extLst>
-              <a:ext uri="{FF2B5EF4-FFF2-40B4-BE49-F238E27FC236}">
-                <a16:creationId xmlns:a16="http://schemas.microsoft.com/office/drawing/2014/main" id="{958A0187-9FF7-9E37-C7E5-DCF651889753}"/>
-              </a:ext>
-            </a:extLst>
-          </p:cNvPr>
-          <p:cNvSpPr>
-            <a:spLocks noGrp="1"/>
-          </p:cNvSpPr>
-          <p:nvPr>
-            <p:ph type="sldNum" sz="quarter" idx="5"/>
-          </p:nvPr>
-        </p:nvSpPr>
-        <p:spPr/>
-        <p:txBody>
-          <a:bodyPr/>
-          <a:lstStyle/>
-          <a:p>
-            <a:fld id="{A67E2EB4-AAAC-4D92-8F4B-6C8B3AB9BD3F}" type="slidenum">
-              <a:rPr lang="vi-VN" smtClean="0"/>
-              <a:t>13</a:t>
-            </a:fld>
-            <a:endParaRPr lang="vi-VN"/>
-          </a:p>
-        </p:txBody>
-      </p:sp>
-    </p:spTree>
-    <p:extLst>
-      <p:ext uri="{BB962C8B-B14F-4D97-AF65-F5344CB8AC3E}">
-        <p14:creationId xmlns:p14="http://schemas.microsoft.com/office/powerpoint/2010/main" val="3213775446"/>
-      </p:ext>
-    </p:extLst>
-  </p:cSld>
-  <p:clrMapOvr>
-    <a:masterClrMapping/>
-  </p:clrMapOvr>
-</p:notes>
-</file>
-
-<file path=ppt/notesSlides/notesSlide11.xml><?xml version="1.0" encoding="utf-8"?>
-<p:notes xmlns:a="http://schemas.openxmlformats.org/drawingml/2006/main" xmlns:r="http://schemas.openxmlformats.org/officeDocument/2006/relationships" xmlns:p="http://schemas.openxmlformats.org/presentationml/2006/main">
-  <p:cSld>
-    <p:spTree>
-      <p:nvGrpSpPr>
-        <p:cNvPr id="1" name="">
-          <a:extLst>
-            <a:ext uri="{FF2B5EF4-FFF2-40B4-BE49-F238E27FC236}">
               <a16:creationId xmlns:a16="http://schemas.microsoft.com/office/drawing/2014/main" id="{2BFB3396-8EFB-AC40-C9B9-C8A02B1B09A3}"/>
             </a:ext>
           </a:extLst>
@@ -797,7 +679,7 @@
           <a:p>
             <a:fld id="{A67E2EB4-AAAC-4D92-8F4B-6C8B3AB9BD3F}" type="slidenum">
               <a:rPr lang="vi-VN" smtClean="0"/>
-              <a:t>14</a:t>
+              <a:t>13</a:t>
             </a:fld>
             <a:endParaRPr lang="vi-VN"/>
           </a:p>
@@ -816,7 +698,7 @@
 </p:notes>
 </file>
 
-<file path=ppt/notesSlides/notesSlide12.xml><?xml version="1.0" encoding="utf-8"?>
+<file path=ppt/notesSlides/notesSlide11.xml><?xml version="1.0" encoding="utf-8"?>
 <p:notes xmlns:a="http://schemas.openxmlformats.org/drawingml/2006/main" xmlns:r="http://schemas.openxmlformats.org/officeDocument/2006/relationships" xmlns:p="http://schemas.openxmlformats.org/presentationml/2006/main">
   <p:cSld>
     <p:spTree>
@@ -912,7 +794,7 @@
           <a:p>
             <a:fld id="{A67E2EB4-AAAC-4D92-8F4B-6C8B3AB9BD3F}" type="slidenum">
               <a:rPr lang="vi-VN" smtClean="0"/>
-              <a:t>15</a:t>
+              <a:t>14</a:t>
             </a:fld>
             <a:endParaRPr lang="vi-VN"/>
           </a:p>
@@ -931,7 +813,7 @@
 </p:notes>
 </file>
 
-<file path=ppt/notesSlides/notesSlide13.xml><?xml version="1.0" encoding="utf-8"?>
+<file path=ppt/notesSlides/notesSlide12.xml><?xml version="1.0" encoding="utf-8"?>
 <p:notes xmlns:a="http://schemas.openxmlformats.org/drawingml/2006/main" xmlns:r="http://schemas.openxmlformats.org/officeDocument/2006/relationships" xmlns:p="http://schemas.openxmlformats.org/presentationml/2006/main">
   <p:cSld>
     <p:spTree>
@@ -1027,7 +909,7 @@
           <a:p>
             <a:fld id="{A67E2EB4-AAAC-4D92-8F4B-6C8B3AB9BD3F}" type="slidenum">
               <a:rPr lang="vi-VN" smtClean="0"/>
-              <a:t>16</a:t>
+              <a:t>15</a:t>
             </a:fld>
             <a:endParaRPr lang="vi-VN"/>
           </a:p>
@@ -1046,7 +928,7 @@
 </p:notes>
 </file>
 
-<file path=ppt/notesSlides/notesSlide14.xml><?xml version="1.0" encoding="utf-8"?>
+<file path=ppt/notesSlides/notesSlide13.xml><?xml version="1.0" encoding="utf-8"?>
 <p:notes xmlns:a="http://schemas.openxmlformats.org/drawingml/2006/main" xmlns:r="http://schemas.openxmlformats.org/officeDocument/2006/relationships" xmlns:p="http://schemas.openxmlformats.org/presentationml/2006/main">
   <p:cSld>
     <p:spTree>
@@ -1142,7 +1024,7 @@
           <a:p>
             <a:fld id="{A67E2EB4-AAAC-4D92-8F4B-6C8B3AB9BD3F}" type="slidenum">
               <a:rPr lang="vi-VN" smtClean="0"/>
-              <a:t>17</a:t>
+              <a:t>16</a:t>
             </a:fld>
             <a:endParaRPr lang="vi-VN"/>
           </a:p>
@@ -1152,6 +1034,128 @@
     <p:extLst>
       <p:ext uri="{BB962C8B-B14F-4D97-AF65-F5344CB8AC3E}">
         <p14:creationId xmlns:p14="http://schemas.microsoft.com/office/powerpoint/2010/main" val="2772146794"/>
+      </p:ext>
+    </p:extLst>
+  </p:cSld>
+  <p:clrMapOvr>
+    <a:masterClrMapping/>
+  </p:clrMapOvr>
+</p:notes>
+</file>
+
+<file path=ppt/notesSlides/notesSlide14.xml><?xml version="1.0" encoding="utf-8"?>
+<p:notes xmlns:a="http://schemas.openxmlformats.org/drawingml/2006/main" xmlns:r="http://schemas.openxmlformats.org/officeDocument/2006/relationships" xmlns:p="http://schemas.openxmlformats.org/presentationml/2006/main">
+  <p:cSld>
+    <p:spTree>
+      <p:nvGrpSpPr>
+        <p:cNvPr id="1" name=""/>
+        <p:cNvGrpSpPr/>
+        <p:nvPr/>
+      </p:nvGrpSpPr>
+      <p:grpSpPr>
+        <a:xfrm>
+          <a:off x="0" y="0"/>
+          <a:ext cx="0" cy="0"/>
+          <a:chOff x="0" y="0"/>
+          <a:chExt cx="0" cy="0"/>
+        </a:xfrm>
+      </p:grpSpPr>
+      <p:sp>
+        <p:nvSpPr>
+          <p:cNvPr id="2" name="Slide Image Placeholder 1"/>
+          <p:cNvSpPr>
+            <a:spLocks noGrp="1" noRot="1" noChangeAspect="1"/>
+          </p:cNvSpPr>
+          <p:nvPr>
+            <p:ph type="sldImg"/>
+          </p:nvPr>
+        </p:nvSpPr>
+        <p:spPr/>
+        <p:txBody>
+          <a:bodyPr/>
+          <a:lstStyle/>
+          <a:p>
+            <a:endParaRPr lang="en-US"/>
+          </a:p>
+        </p:txBody>
+      </p:sp>
+      <p:sp>
+        <p:nvSpPr>
+          <p:cNvPr id="3" name="Notes Placeholder 2"/>
+          <p:cNvSpPr>
+            <a:spLocks noGrp="1"/>
+          </p:cNvSpPr>
+          <p:nvPr>
+            <p:ph type="body" idx="1"/>
+          </p:nvPr>
+        </p:nvSpPr>
+        <p:spPr/>
+        <p:txBody>
+          <a:bodyPr/>
+          <a:lstStyle/>
+          <a:p>
+            <a:r>
+              <a:rPr lang="en-US" dirty="0" err="1"/>
+              <a:t>Achived</a:t>
+            </a:r>
+            <a:r>
+              <a:rPr lang="en-US" dirty="0"/>
+              <a:t> results:</a:t>
+            </a:r>
+            <a:br>
+              <a:rPr lang="en-US" dirty="0"/>
+            </a:br>
+            <a:r>
+              <a:rPr lang="en-US" dirty="0"/>
+              <a:t>2. local **result** storage</a:t>
+            </a:r>
+          </a:p>
+          <a:p>
+            <a:endParaRPr lang="en-US" dirty="0"/>
+          </a:p>
+          <a:p>
+            <a:r>
+              <a:rPr lang="en-US" dirty="0"/>
+              <a:t>Current limitations:</a:t>
+            </a:r>
+            <a:br>
+              <a:rPr lang="en-US" dirty="0"/>
+            </a:br>
+            <a:r>
+              <a:rPr lang="en-US" dirty="0"/>
+              <a:t>3. which are the search feature and forage map.</a:t>
+            </a:r>
+            <a:endParaRPr lang="vi-VN" dirty="0"/>
+          </a:p>
+        </p:txBody>
+      </p:sp>
+      <p:sp>
+        <p:nvSpPr>
+          <p:cNvPr id="4" name="Slide Number Placeholder 3"/>
+          <p:cNvSpPr>
+            <a:spLocks noGrp="1"/>
+          </p:cNvSpPr>
+          <p:nvPr>
+            <p:ph type="sldNum" sz="quarter" idx="5"/>
+          </p:nvPr>
+        </p:nvSpPr>
+        <p:spPr/>
+        <p:txBody>
+          <a:bodyPr/>
+          <a:lstStyle/>
+          <a:p>
+            <a:fld id="{A67E2EB4-AAAC-4D92-8F4B-6C8B3AB9BD3F}" type="slidenum">
+              <a:rPr lang="vi-VN" smtClean="0"/>
+              <a:t>26</a:t>
+            </a:fld>
+            <a:endParaRPr lang="vi-VN"/>
+          </a:p>
+        </p:txBody>
+      </p:sp>
+    </p:spTree>
+    <p:extLst>
+      <p:ext uri="{BB962C8B-B14F-4D97-AF65-F5344CB8AC3E}">
+        <p14:creationId xmlns:p14="http://schemas.microsoft.com/office/powerpoint/2010/main" val="2167281020"/>
       </p:ext>
     </p:extLst>
   </p:cSld>
@@ -1212,38 +1216,19 @@
           <a:bodyPr/>
           <a:lstStyle/>
           <a:p>
-            <a:r>
-              <a:rPr lang="en-US" dirty="0" err="1"/>
-              <a:t>Achived</a:t>
-            </a:r>
+            <a:pPr marL="228600" indent="-228600">
+              <a:buAutoNum type="arabicPeriod"/>
+            </a:pPr>
             <a:r>
               <a:rPr lang="en-US" dirty="0"/>
-              <a:t> results:</a:t>
+              <a:t>Either through a multi-task model or a separate specialized classifier</a:t>
             </a:r>
-            <a:br>
-              <a:rPr lang="en-US" dirty="0"/>
-            </a:br>
-            <a:r>
-              <a:rPr lang="en-US" dirty="0"/>
-              <a:t>2. local **result** storage</a:t>
-            </a:r>
-          </a:p>
-          <a:p>
+          </a:p>
+          <a:p>
+            <a:pPr marL="228600" indent="-228600">
+              <a:buAutoNum type="arabicPeriod"/>
+            </a:pPr>
             <a:endParaRPr lang="en-US" dirty="0"/>
-          </a:p>
-          <a:p>
-            <a:r>
-              <a:rPr lang="en-US" dirty="0"/>
-              <a:t>Current limitations:</a:t>
-            </a:r>
-            <a:br>
-              <a:rPr lang="en-US" dirty="0"/>
-            </a:br>
-            <a:r>
-              <a:rPr lang="en-US" dirty="0"/>
-              <a:t>3. which are the search feature and forage map.</a:t>
-            </a:r>
-            <a:endParaRPr lang="vi-VN" dirty="0"/>
           </a:p>
         </p:txBody>
       </p:sp>
@@ -1273,225 +1258,7 @@
     </p:spTree>
     <p:extLst>
       <p:ext uri="{BB962C8B-B14F-4D97-AF65-F5344CB8AC3E}">
-        <p14:creationId xmlns:p14="http://schemas.microsoft.com/office/powerpoint/2010/main" val="2167281020"/>
-      </p:ext>
-    </p:extLst>
-  </p:cSld>
-  <p:clrMapOvr>
-    <a:masterClrMapping/>
-  </p:clrMapOvr>
-</p:notes>
-</file>
-
-<file path=ppt/notesSlides/notesSlide16.xml><?xml version="1.0" encoding="utf-8"?>
-<p:notes xmlns:a="http://schemas.openxmlformats.org/drawingml/2006/main" xmlns:r="http://schemas.openxmlformats.org/officeDocument/2006/relationships" xmlns:p="http://schemas.openxmlformats.org/presentationml/2006/main">
-  <p:cSld>
-    <p:spTree>
-      <p:nvGrpSpPr>
-        <p:cNvPr id="1" name=""/>
-        <p:cNvGrpSpPr/>
-        <p:nvPr/>
-      </p:nvGrpSpPr>
-      <p:grpSpPr>
-        <a:xfrm>
-          <a:off x="0" y="0"/>
-          <a:ext cx="0" cy="0"/>
-          <a:chOff x="0" y="0"/>
-          <a:chExt cx="0" cy="0"/>
-        </a:xfrm>
-      </p:grpSpPr>
-      <p:sp>
-        <p:nvSpPr>
-          <p:cNvPr id="2" name="Slide Image Placeholder 1"/>
-          <p:cNvSpPr>
-            <a:spLocks noGrp="1" noRot="1" noChangeAspect="1"/>
-          </p:cNvSpPr>
-          <p:nvPr>
-            <p:ph type="sldImg"/>
-          </p:nvPr>
-        </p:nvSpPr>
-        <p:spPr/>
-        <p:txBody>
-          <a:bodyPr/>
-          <a:lstStyle/>
-          <a:p>
-            <a:endParaRPr lang="en-US"/>
-          </a:p>
-        </p:txBody>
-      </p:sp>
-      <p:sp>
-        <p:nvSpPr>
-          <p:cNvPr id="3" name="Notes Placeholder 2"/>
-          <p:cNvSpPr>
-            <a:spLocks noGrp="1"/>
-          </p:cNvSpPr>
-          <p:nvPr>
-            <p:ph type="body" idx="1"/>
-          </p:nvPr>
-        </p:nvSpPr>
-        <p:spPr/>
-        <p:txBody>
-          <a:bodyPr/>
-          <a:lstStyle/>
-          <a:p>
-            <a:pPr marL="228600" indent="-228600">
-              <a:buAutoNum type="arabicPeriod"/>
-            </a:pPr>
-            <a:r>
-              <a:rPr lang="en-US" dirty="0"/>
-              <a:t>Either through a multi-task model or a separate specialized classifier</a:t>
-            </a:r>
-          </a:p>
-          <a:p>
-            <a:pPr marL="228600" indent="-228600">
-              <a:buAutoNum type="arabicPeriod"/>
-            </a:pPr>
-            <a:endParaRPr lang="en-US" dirty="0"/>
-          </a:p>
-        </p:txBody>
-      </p:sp>
-      <p:sp>
-        <p:nvSpPr>
-          <p:cNvPr id="4" name="Slide Number Placeholder 3"/>
-          <p:cNvSpPr>
-            <a:spLocks noGrp="1"/>
-          </p:cNvSpPr>
-          <p:nvPr>
-            <p:ph type="sldNum" sz="quarter" idx="5"/>
-          </p:nvPr>
-        </p:nvSpPr>
-        <p:spPr/>
-        <p:txBody>
-          <a:bodyPr/>
-          <a:lstStyle/>
-          <a:p>
-            <a:fld id="{A67E2EB4-AAAC-4D92-8F4B-6C8B3AB9BD3F}" type="slidenum">
-              <a:rPr lang="vi-VN" smtClean="0"/>
-              <a:t>28</a:t>
-            </a:fld>
-            <a:endParaRPr lang="vi-VN"/>
-          </a:p>
-        </p:txBody>
-      </p:sp>
-    </p:spTree>
-    <p:extLst>
-      <p:ext uri="{BB962C8B-B14F-4D97-AF65-F5344CB8AC3E}">
         <p14:creationId xmlns:p14="http://schemas.microsoft.com/office/powerpoint/2010/main" val="2855441045"/>
-      </p:ext>
-    </p:extLst>
-  </p:cSld>
-  <p:clrMapOvr>
-    <a:masterClrMapping/>
-  </p:clrMapOvr>
-</p:notes>
-</file>
-
-<file path=ppt/notesSlides/notesSlide17.xml><?xml version="1.0" encoding="utf-8"?>
-<p:notes xmlns:a="http://schemas.openxmlformats.org/drawingml/2006/main" xmlns:r="http://schemas.openxmlformats.org/officeDocument/2006/relationships" xmlns:p="http://schemas.openxmlformats.org/presentationml/2006/main">
-  <p:cSld>
-    <p:spTree>
-      <p:nvGrpSpPr>
-        <p:cNvPr id="1" name="">
-          <a:extLst>
-            <a:ext uri="{FF2B5EF4-FFF2-40B4-BE49-F238E27FC236}">
-              <a16:creationId xmlns:a16="http://schemas.microsoft.com/office/drawing/2014/main" id="{445AAB08-621F-8577-F090-3BDB879159FC}"/>
-            </a:ext>
-          </a:extLst>
-        </p:cNvPr>
-        <p:cNvGrpSpPr/>
-        <p:nvPr/>
-      </p:nvGrpSpPr>
-      <p:grpSpPr>
-        <a:xfrm>
-          <a:off x="0" y="0"/>
-          <a:ext cx="0" cy="0"/>
-          <a:chOff x="0" y="0"/>
-          <a:chExt cx="0" cy="0"/>
-        </a:xfrm>
-      </p:grpSpPr>
-      <p:sp>
-        <p:nvSpPr>
-          <p:cNvPr id="2" name="Slide Image Placeholder 1">
-            <a:extLst>
-              <a:ext uri="{FF2B5EF4-FFF2-40B4-BE49-F238E27FC236}">
-                <a16:creationId xmlns:a16="http://schemas.microsoft.com/office/drawing/2014/main" id="{53051E21-D4E8-E118-5E5C-DE8E6BA70AE6}"/>
-              </a:ext>
-            </a:extLst>
-          </p:cNvPr>
-          <p:cNvSpPr>
-            <a:spLocks noGrp="1" noRot="1" noChangeAspect="1"/>
-          </p:cNvSpPr>
-          <p:nvPr>
-            <p:ph type="sldImg"/>
-          </p:nvPr>
-        </p:nvSpPr>
-        <p:spPr/>
-        <p:txBody>
-          <a:bodyPr/>
-          <a:lstStyle/>
-          <a:p>
-            <a:endParaRPr lang="en-US"/>
-          </a:p>
-        </p:txBody>
-      </p:sp>
-      <p:sp>
-        <p:nvSpPr>
-          <p:cNvPr id="3" name="Notes Placeholder 2">
-            <a:extLst>
-              <a:ext uri="{FF2B5EF4-FFF2-40B4-BE49-F238E27FC236}">
-                <a16:creationId xmlns:a16="http://schemas.microsoft.com/office/drawing/2014/main" id="{CE4516DC-59A5-03E2-C0FF-CF883EC3FDA6}"/>
-              </a:ext>
-            </a:extLst>
-          </p:cNvPr>
-          <p:cNvSpPr>
-            <a:spLocks noGrp="1"/>
-          </p:cNvSpPr>
-          <p:nvPr>
-            <p:ph type="body" idx="1"/>
-          </p:nvPr>
-        </p:nvSpPr>
-        <p:spPr/>
-        <p:txBody>
-          <a:bodyPr/>
-          <a:lstStyle/>
-          <a:p>
-            <a:endParaRPr lang="en-US" dirty="0"/>
-          </a:p>
-        </p:txBody>
-      </p:sp>
-      <p:sp>
-        <p:nvSpPr>
-          <p:cNvPr id="4" name="Slide Number Placeholder 3">
-            <a:extLst>
-              <a:ext uri="{FF2B5EF4-FFF2-40B4-BE49-F238E27FC236}">
-                <a16:creationId xmlns:a16="http://schemas.microsoft.com/office/drawing/2014/main" id="{9E1375FE-AF65-AD32-7A9B-1FCC6C3DCE3A}"/>
-              </a:ext>
-            </a:extLst>
-          </p:cNvPr>
-          <p:cNvSpPr>
-            <a:spLocks noGrp="1"/>
-          </p:cNvSpPr>
-          <p:nvPr>
-            <p:ph type="sldNum" sz="quarter" idx="5"/>
-          </p:nvPr>
-        </p:nvSpPr>
-        <p:spPr/>
-        <p:txBody>
-          <a:bodyPr/>
-          <a:lstStyle/>
-          <a:p>
-            <a:fld id="{A67E2EB4-AAAC-4D92-8F4B-6C8B3AB9BD3F}" type="slidenum">
-              <a:rPr lang="vi-VN" smtClean="0"/>
-              <a:t>30</a:t>
-            </a:fld>
-            <a:endParaRPr lang="vi-VN"/>
-          </a:p>
-        </p:txBody>
-      </p:sp>
-    </p:spTree>
-    <p:extLst>
-      <p:ext uri="{BB962C8B-B14F-4D97-AF65-F5344CB8AC3E}">
-        <p14:creationId xmlns:p14="http://schemas.microsoft.com/office/powerpoint/2010/main" val="4128160173"/>
       </p:ext>
     </p:extLst>
   </p:cSld>
@@ -2084,121 +1851,6 @@
         <p:cNvPr id="1" name="">
           <a:extLst>
             <a:ext uri="{FF2B5EF4-FFF2-40B4-BE49-F238E27FC236}">
-              <a16:creationId xmlns:a16="http://schemas.microsoft.com/office/drawing/2014/main" id="{CC251B75-5016-E0F5-3F50-727C5F95DFA0}"/>
-            </a:ext>
-          </a:extLst>
-        </p:cNvPr>
-        <p:cNvGrpSpPr/>
-        <p:nvPr/>
-      </p:nvGrpSpPr>
-      <p:grpSpPr>
-        <a:xfrm>
-          <a:off x="0" y="0"/>
-          <a:ext cx="0" cy="0"/>
-          <a:chOff x="0" y="0"/>
-          <a:chExt cx="0" cy="0"/>
-        </a:xfrm>
-      </p:grpSpPr>
-      <p:sp>
-        <p:nvSpPr>
-          <p:cNvPr id="2" name="Slide Image Placeholder 1">
-            <a:extLst>
-              <a:ext uri="{FF2B5EF4-FFF2-40B4-BE49-F238E27FC236}">
-                <a16:creationId xmlns:a16="http://schemas.microsoft.com/office/drawing/2014/main" id="{3BFED50A-F9FB-6B1A-38D7-09FACB191E10}"/>
-              </a:ext>
-            </a:extLst>
-          </p:cNvPr>
-          <p:cNvSpPr>
-            <a:spLocks noGrp="1" noRot="1" noChangeAspect="1"/>
-          </p:cNvSpPr>
-          <p:nvPr>
-            <p:ph type="sldImg"/>
-          </p:nvPr>
-        </p:nvSpPr>
-        <p:spPr/>
-        <p:txBody>
-          <a:bodyPr/>
-          <a:lstStyle/>
-          <a:p>
-            <a:endParaRPr lang="en-US"/>
-          </a:p>
-        </p:txBody>
-      </p:sp>
-      <p:sp>
-        <p:nvSpPr>
-          <p:cNvPr id="3" name="Notes Placeholder 2">
-            <a:extLst>
-              <a:ext uri="{FF2B5EF4-FFF2-40B4-BE49-F238E27FC236}">
-                <a16:creationId xmlns:a16="http://schemas.microsoft.com/office/drawing/2014/main" id="{3C58EB54-B6CF-045A-B085-8BB7A769ABB3}"/>
-              </a:ext>
-            </a:extLst>
-          </p:cNvPr>
-          <p:cNvSpPr>
-            <a:spLocks noGrp="1"/>
-          </p:cNvSpPr>
-          <p:nvPr>
-            <p:ph type="body" idx="1"/>
-          </p:nvPr>
-        </p:nvSpPr>
-        <p:spPr/>
-        <p:txBody>
-          <a:bodyPr/>
-          <a:lstStyle/>
-          <a:p>
-            <a:endParaRPr lang="en-US" dirty="0"/>
-          </a:p>
-        </p:txBody>
-      </p:sp>
-      <p:sp>
-        <p:nvSpPr>
-          <p:cNvPr id="4" name="Slide Number Placeholder 3">
-            <a:extLst>
-              <a:ext uri="{FF2B5EF4-FFF2-40B4-BE49-F238E27FC236}">
-                <a16:creationId xmlns:a16="http://schemas.microsoft.com/office/drawing/2014/main" id="{AEFD3086-2EBA-D0F7-53FD-66A44F1E4A09}"/>
-              </a:ext>
-            </a:extLst>
-          </p:cNvPr>
-          <p:cNvSpPr>
-            <a:spLocks noGrp="1"/>
-          </p:cNvSpPr>
-          <p:nvPr>
-            <p:ph type="sldNum" sz="quarter" idx="5"/>
-          </p:nvPr>
-        </p:nvSpPr>
-        <p:spPr/>
-        <p:txBody>
-          <a:bodyPr/>
-          <a:lstStyle/>
-          <a:p>
-            <a:fld id="{A67E2EB4-AAAC-4D92-8F4B-6C8B3AB9BD3F}" type="slidenum">
-              <a:rPr lang="vi-VN" smtClean="0"/>
-              <a:t>10</a:t>
-            </a:fld>
-            <a:endParaRPr lang="vi-VN"/>
-          </a:p>
-        </p:txBody>
-      </p:sp>
-    </p:spTree>
-    <p:extLst>
-      <p:ext uri="{BB962C8B-B14F-4D97-AF65-F5344CB8AC3E}">
-        <p14:creationId xmlns:p14="http://schemas.microsoft.com/office/powerpoint/2010/main" val="3439148564"/>
-      </p:ext>
-    </p:extLst>
-  </p:cSld>
-  <p:clrMapOvr>
-    <a:masterClrMapping/>
-  </p:clrMapOvr>
-</p:notes>
-</file>
-
-<file path=ppt/notesSlides/notesSlide8.xml><?xml version="1.0" encoding="utf-8"?>
-<p:notes xmlns:a="http://schemas.openxmlformats.org/drawingml/2006/main" xmlns:r="http://schemas.openxmlformats.org/officeDocument/2006/relationships" xmlns:p="http://schemas.openxmlformats.org/presentationml/2006/main">
-  <p:cSld>
-    <p:spTree>
-      <p:nvGrpSpPr>
-        <p:cNvPr id="1" name="">
-          <a:extLst>
-            <a:ext uri="{FF2B5EF4-FFF2-40B4-BE49-F238E27FC236}">
               <a16:creationId xmlns:a16="http://schemas.microsoft.com/office/drawing/2014/main" id="{A10E6DF9-98E7-F510-0D5F-BBCF612DF735}"/>
             </a:ext>
           </a:extLst>
@@ -2287,7 +1939,7 @@
           <a:p>
             <a:fld id="{A67E2EB4-AAAC-4D92-8F4B-6C8B3AB9BD3F}" type="slidenum">
               <a:rPr lang="vi-VN" smtClean="0"/>
-              <a:t>11</a:t>
+              <a:t>10</a:t>
             </a:fld>
             <a:endParaRPr lang="vi-VN"/>
           </a:p>
@@ -2306,7 +1958,7 @@
 </p:notes>
 </file>
 
-<file path=ppt/notesSlides/notesSlide9.xml><?xml version="1.0" encoding="utf-8"?>
+<file path=ppt/notesSlides/notesSlide8.xml><?xml version="1.0" encoding="utf-8"?>
 <p:notes xmlns:a="http://schemas.openxmlformats.org/drawingml/2006/main" xmlns:r="http://schemas.openxmlformats.org/officeDocument/2006/relationships" xmlns:p="http://schemas.openxmlformats.org/presentationml/2006/main">
   <p:cSld>
     <p:spTree>
@@ -2402,7 +2054,7 @@
           <a:p>
             <a:fld id="{A67E2EB4-AAAC-4D92-8F4B-6C8B3AB9BD3F}" type="slidenum">
               <a:rPr lang="vi-VN" smtClean="0"/>
-              <a:t>12</a:t>
+              <a:t>11</a:t>
             </a:fld>
             <a:endParaRPr lang="vi-VN"/>
           </a:p>
@@ -2412,6 +2064,121 @@
     <p:extLst>
       <p:ext uri="{BB962C8B-B14F-4D97-AF65-F5344CB8AC3E}">
         <p14:creationId xmlns:p14="http://schemas.microsoft.com/office/powerpoint/2010/main" val="123363835"/>
+      </p:ext>
+    </p:extLst>
+  </p:cSld>
+  <p:clrMapOvr>
+    <a:masterClrMapping/>
+  </p:clrMapOvr>
+</p:notes>
+</file>
+
+<file path=ppt/notesSlides/notesSlide9.xml><?xml version="1.0" encoding="utf-8"?>
+<p:notes xmlns:a="http://schemas.openxmlformats.org/drawingml/2006/main" xmlns:r="http://schemas.openxmlformats.org/officeDocument/2006/relationships" xmlns:p="http://schemas.openxmlformats.org/presentationml/2006/main">
+  <p:cSld>
+    <p:spTree>
+      <p:nvGrpSpPr>
+        <p:cNvPr id="1" name="">
+          <a:extLst>
+            <a:ext uri="{FF2B5EF4-FFF2-40B4-BE49-F238E27FC236}">
+              <a16:creationId xmlns:a16="http://schemas.microsoft.com/office/drawing/2014/main" id="{38D4E520-8007-473F-1EAD-F11A63BDDB6A}"/>
+            </a:ext>
+          </a:extLst>
+        </p:cNvPr>
+        <p:cNvGrpSpPr/>
+        <p:nvPr/>
+      </p:nvGrpSpPr>
+      <p:grpSpPr>
+        <a:xfrm>
+          <a:off x="0" y="0"/>
+          <a:ext cx="0" cy="0"/>
+          <a:chOff x="0" y="0"/>
+          <a:chExt cx="0" cy="0"/>
+        </a:xfrm>
+      </p:grpSpPr>
+      <p:sp>
+        <p:nvSpPr>
+          <p:cNvPr id="2" name="Slide Image Placeholder 1">
+            <a:extLst>
+              <a:ext uri="{FF2B5EF4-FFF2-40B4-BE49-F238E27FC236}">
+                <a16:creationId xmlns:a16="http://schemas.microsoft.com/office/drawing/2014/main" id="{85569434-C290-0358-EADD-2A95BF7707BA}"/>
+              </a:ext>
+            </a:extLst>
+          </p:cNvPr>
+          <p:cNvSpPr>
+            <a:spLocks noGrp="1" noRot="1" noChangeAspect="1"/>
+          </p:cNvSpPr>
+          <p:nvPr>
+            <p:ph type="sldImg"/>
+          </p:nvPr>
+        </p:nvSpPr>
+        <p:spPr/>
+        <p:txBody>
+          <a:bodyPr/>
+          <a:lstStyle/>
+          <a:p>
+            <a:endParaRPr lang="en-US"/>
+          </a:p>
+        </p:txBody>
+      </p:sp>
+      <p:sp>
+        <p:nvSpPr>
+          <p:cNvPr id="3" name="Notes Placeholder 2">
+            <a:extLst>
+              <a:ext uri="{FF2B5EF4-FFF2-40B4-BE49-F238E27FC236}">
+                <a16:creationId xmlns:a16="http://schemas.microsoft.com/office/drawing/2014/main" id="{82B74D49-C1CE-653B-4198-1DE2391C5539}"/>
+              </a:ext>
+            </a:extLst>
+          </p:cNvPr>
+          <p:cNvSpPr>
+            <a:spLocks noGrp="1"/>
+          </p:cNvSpPr>
+          <p:nvPr>
+            <p:ph type="body" idx="1"/>
+          </p:nvPr>
+        </p:nvSpPr>
+        <p:spPr/>
+        <p:txBody>
+          <a:bodyPr/>
+          <a:lstStyle/>
+          <a:p>
+            <a:endParaRPr lang="en-US" dirty="0"/>
+          </a:p>
+        </p:txBody>
+      </p:sp>
+      <p:sp>
+        <p:nvSpPr>
+          <p:cNvPr id="4" name="Slide Number Placeholder 3">
+            <a:extLst>
+              <a:ext uri="{FF2B5EF4-FFF2-40B4-BE49-F238E27FC236}">
+                <a16:creationId xmlns:a16="http://schemas.microsoft.com/office/drawing/2014/main" id="{958A0187-9FF7-9E37-C7E5-DCF651889753}"/>
+              </a:ext>
+            </a:extLst>
+          </p:cNvPr>
+          <p:cNvSpPr>
+            <a:spLocks noGrp="1"/>
+          </p:cNvSpPr>
+          <p:nvPr>
+            <p:ph type="sldNum" sz="quarter" idx="5"/>
+          </p:nvPr>
+        </p:nvSpPr>
+        <p:spPr/>
+        <p:txBody>
+          <a:bodyPr/>
+          <a:lstStyle/>
+          <a:p>
+            <a:fld id="{A67E2EB4-AAAC-4D92-8F4B-6C8B3AB9BD3F}" type="slidenum">
+              <a:rPr lang="vi-VN" smtClean="0"/>
+              <a:t>12</a:t>
+            </a:fld>
+            <a:endParaRPr lang="vi-VN"/>
+          </a:p>
+        </p:txBody>
+      </p:sp>
+    </p:spTree>
+    <p:extLst>
+      <p:ext uri="{BB962C8B-B14F-4D97-AF65-F5344CB8AC3E}">
+        <p14:creationId xmlns:p14="http://schemas.microsoft.com/office/powerpoint/2010/main" val="3213775446"/>
       </p:ext>
     </p:extLst>
   </p:cSld>
@@ -38744,150 +38511,6 @@
         <p:cNvPr id="1" name="">
           <a:extLst>
             <a:ext uri="{FF2B5EF4-FFF2-40B4-BE49-F238E27FC236}">
-              <a16:creationId xmlns:a16="http://schemas.microsoft.com/office/drawing/2014/main" id="{0620BF8C-2B1D-347D-08A0-5065EC1622FD}"/>
-            </a:ext>
-          </a:extLst>
-        </p:cNvPr>
-        <p:cNvGrpSpPr/>
-        <p:nvPr/>
-      </p:nvGrpSpPr>
-      <p:grpSpPr>
-        <a:xfrm>
-          <a:off x="0" y="0"/>
-          <a:ext cx="0" cy="0"/>
-          <a:chOff x="0" y="0"/>
-          <a:chExt cx="0" cy="0"/>
-        </a:xfrm>
-      </p:grpSpPr>
-      <p:sp>
-        <p:nvSpPr>
-          <p:cNvPr id="2" name="Title 1">
-            <a:extLst>
-              <a:ext uri="{FF2B5EF4-FFF2-40B4-BE49-F238E27FC236}">
-                <a16:creationId xmlns:a16="http://schemas.microsoft.com/office/drawing/2014/main" id="{0C001596-C9BF-FDEE-FF39-A9F8DD96F9A7}"/>
-              </a:ext>
-            </a:extLst>
-          </p:cNvPr>
-          <p:cNvSpPr>
-            <a:spLocks noGrp="1"/>
-          </p:cNvSpPr>
-          <p:nvPr>
-            <p:ph type="title"/>
-          </p:nvPr>
-        </p:nvSpPr>
-        <p:spPr/>
-        <p:txBody>
-          <a:bodyPr/>
-          <a:lstStyle/>
-          <a:p>
-            <a:r>
-              <a:rPr lang="en-US" dirty="0"/>
-              <a:t>Theoretical basis &amp; systems analysis</a:t>
-            </a:r>
-          </a:p>
-        </p:txBody>
-      </p:sp>
-      <p:sp>
-        <p:nvSpPr>
-          <p:cNvPr id="3" name="Content Placeholder 2">
-            <a:extLst>
-              <a:ext uri="{FF2B5EF4-FFF2-40B4-BE49-F238E27FC236}">
-                <a16:creationId xmlns:a16="http://schemas.microsoft.com/office/drawing/2014/main" id="{079AD8B6-ECCA-266A-0B15-B3B8B2A60770}"/>
-              </a:ext>
-            </a:extLst>
-          </p:cNvPr>
-          <p:cNvSpPr>
-            <a:spLocks noGrp="1"/>
-          </p:cNvSpPr>
-          <p:nvPr>
-            <p:ph idx="1"/>
-          </p:nvPr>
-        </p:nvSpPr>
-        <p:spPr/>
-        <p:txBody>
-          <a:bodyPr>
-            <a:normAutofit lnSpcReduction="10000"/>
-          </a:bodyPr>
-          <a:lstStyle/>
-          <a:p>
-            <a:r>
-              <a:rPr lang="en-US" b="1" dirty="0"/>
-              <a:t>SLIDE 2 — Deep Learning Overview</a:t>
-            </a:r>
-          </a:p>
-          <a:p>
-            <a:r>
-              <a:rPr lang="en-US" b="1" dirty="0"/>
-              <a:t>Deep Learning</a:t>
-            </a:r>
-            <a:r>
-              <a:rPr lang="en-US" dirty="0"/>
-              <a:t>: Multi-layer neural networks for automatic feature extraction.</a:t>
-            </a:r>
-          </a:p>
-          <a:p>
-            <a:r>
-              <a:rPr lang="en-US" b="1" dirty="0"/>
-              <a:t>CNN vs ViT</a:t>
-            </a:r>
-            <a:r>
-              <a:rPr lang="en-US" dirty="0"/>
-              <a:t>:</a:t>
-            </a:r>
-          </a:p>
-          <a:p>
-            <a:pPr lvl="1"/>
-            <a:r>
-              <a:rPr lang="en-US" dirty="0"/>
-              <a:t>CNN: local feature extraction, strong on structured patterns.</a:t>
-            </a:r>
-          </a:p>
-          <a:p>
-            <a:pPr lvl="1"/>
-            <a:r>
-              <a:rPr lang="en-US" dirty="0"/>
-              <a:t>ViT: patch-based attention, better at global context and fine-grained differences.</a:t>
-            </a:r>
-          </a:p>
-          <a:p>
-            <a:r>
-              <a:rPr lang="en-US" b="1" dirty="0"/>
-              <a:t>Why ViT for mushrooms</a:t>
-            </a:r>
-            <a:r>
-              <a:rPr lang="en-US" dirty="0"/>
-              <a:t>: Handles subtle visual details and complex textures.</a:t>
-            </a:r>
-          </a:p>
-          <a:p>
-            <a:br>
-              <a:rPr lang="en-US" dirty="0"/>
-            </a:br>
-            <a:endParaRPr lang="en-US" dirty="0"/>
-          </a:p>
-        </p:txBody>
-      </p:sp>
-    </p:spTree>
-    <p:extLst>
-      <p:ext uri="{BB962C8B-B14F-4D97-AF65-F5344CB8AC3E}">
-        <p14:creationId xmlns:p14="http://schemas.microsoft.com/office/powerpoint/2010/main" val="1814031870"/>
-      </p:ext>
-    </p:extLst>
-  </p:cSld>
-  <p:clrMapOvr>
-    <a:masterClrMapping/>
-  </p:clrMapOvr>
-</p:sld>
-</file>
-
-<file path=ppt/slides/slide11.xml><?xml version="1.0" encoding="utf-8"?>
-<p:sld xmlns:a="http://schemas.openxmlformats.org/drawingml/2006/main" xmlns:r="http://schemas.openxmlformats.org/officeDocument/2006/relationships" xmlns:p="http://schemas.openxmlformats.org/presentationml/2006/main">
-  <p:cSld>
-    <p:spTree>
-      <p:nvGrpSpPr>
-        <p:cNvPr id="1" name="">
-          <a:extLst>
-            <a:ext uri="{FF2B5EF4-FFF2-40B4-BE49-F238E27FC236}">
               <a16:creationId xmlns:a16="http://schemas.microsoft.com/office/drawing/2014/main" id="{4B1A65E1-EB57-33D4-5329-EF6A85BA3C27}"/>
             </a:ext>
           </a:extLst>
@@ -39029,7 +38652,7 @@
 </p:sld>
 </file>
 
-<file path=ppt/slides/slide12.xml><?xml version="1.0" encoding="utf-8"?>
+<file path=ppt/slides/slide11.xml><?xml version="1.0" encoding="utf-8"?>
 <p:sld xmlns:a="http://schemas.openxmlformats.org/drawingml/2006/main" xmlns:r="http://schemas.openxmlformats.org/officeDocument/2006/relationships" xmlns:p="http://schemas.openxmlformats.org/presentationml/2006/main">
   <p:cSld>
     <p:spTree>
@@ -39125,7 +38748,7 @@
 </p:sld>
 </file>
 
-<file path=ppt/slides/slide13.xml><?xml version="1.0" encoding="utf-8"?>
+<file path=ppt/slides/slide12.xml><?xml version="1.0" encoding="utf-8"?>
 <p:sld xmlns:a="http://schemas.openxmlformats.org/drawingml/2006/main" xmlns:r="http://schemas.openxmlformats.org/officeDocument/2006/relationships" xmlns:p="http://schemas.openxmlformats.org/presentationml/2006/main">
   <p:cSld>
     <p:spTree>
@@ -39221,7 +38844,7 @@
 </p:sld>
 </file>
 
-<file path=ppt/slides/slide14.xml><?xml version="1.0" encoding="utf-8"?>
+<file path=ppt/slides/slide13.xml><?xml version="1.0" encoding="utf-8"?>
 <p:sld xmlns:a="http://schemas.openxmlformats.org/drawingml/2006/main" xmlns:r="http://schemas.openxmlformats.org/officeDocument/2006/relationships" xmlns:p="http://schemas.openxmlformats.org/presentationml/2006/main">
   <p:cSld>
     <p:spTree>
@@ -39317,7 +38940,7 @@
 </p:sld>
 </file>
 
-<file path=ppt/slides/slide15.xml><?xml version="1.0" encoding="utf-8"?>
+<file path=ppt/slides/slide14.xml><?xml version="1.0" encoding="utf-8"?>
 <p:sld xmlns:a="http://schemas.openxmlformats.org/drawingml/2006/main" xmlns:r="http://schemas.openxmlformats.org/officeDocument/2006/relationships" xmlns:p="http://schemas.openxmlformats.org/presentationml/2006/main">
   <p:cSld>
     <p:spTree>
@@ -39413,7 +39036,7 @@
 </p:sld>
 </file>
 
-<file path=ppt/slides/slide16.xml><?xml version="1.0" encoding="utf-8"?>
+<file path=ppt/slides/slide15.xml><?xml version="1.0" encoding="utf-8"?>
 <p:sld xmlns:a="http://schemas.openxmlformats.org/drawingml/2006/main" xmlns:r="http://schemas.openxmlformats.org/officeDocument/2006/relationships" xmlns:p="http://schemas.openxmlformats.org/presentationml/2006/main">
   <p:cSld>
     <p:spTree>
@@ -39509,7 +39132,7 @@
 </p:sld>
 </file>
 
-<file path=ppt/slides/slide17.xml><?xml version="1.0" encoding="utf-8"?>
+<file path=ppt/slides/slide16.xml><?xml version="1.0" encoding="utf-8"?>
 <p:sld xmlns:a="http://schemas.openxmlformats.org/drawingml/2006/main" xmlns:r="http://schemas.openxmlformats.org/officeDocument/2006/relationships" xmlns:p="http://schemas.openxmlformats.org/presentationml/2006/main">
   <p:cSld>
     <p:spTree>
@@ -39605,7 +39228,7 @@
 </p:sld>
 </file>
 
-<file path=ppt/slides/slide18.xml><?xml version="1.0" encoding="utf-8"?>
+<file path=ppt/slides/slide17.xml><?xml version="1.0" encoding="utf-8"?>
 <p:sld xmlns:a="http://schemas.openxmlformats.org/drawingml/2006/main" xmlns:r="http://schemas.openxmlformats.org/officeDocument/2006/relationships" xmlns:p="http://schemas.openxmlformats.org/presentationml/2006/main">
   <p:cSld>
     <p:spTree>
@@ -39669,7 +39292,7 @@
 </p:sld>
 </file>
 
-<file path=ppt/slides/slide19.xml><?xml version="1.0" encoding="utf-8"?>
+<file path=ppt/slides/slide18.xml><?xml version="1.0" encoding="utf-8"?>
 <p:sld xmlns:a="http://schemas.openxmlformats.org/drawingml/2006/main" xmlns:r="http://schemas.openxmlformats.org/officeDocument/2006/relationships" xmlns:p="http://schemas.openxmlformats.org/presentationml/2006/main">
   <p:cSld>
     <p:spTree>
@@ -39846,6 +39469,162 @@
     <p:extLst>
       <p:ext uri="{BB962C8B-B14F-4D97-AF65-F5344CB8AC3E}">
         <p14:creationId xmlns:p14="http://schemas.microsoft.com/office/powerpoint/2010/main" val="1206307982"/>
+      </p:ext>
+    </p:extLst>
+  </p:cSld>
+  <p:clrMapOvr>
+    <a:masterClrMapping/>
+  </p:clrMapOvr>
+</p:sld>
+</file>
+
+<file path=ppt/slides/slide19.xml><?xml version="1.0" encoding="utf-8"?>
+<p:sld xmlns:a="http://schemas.openxmlformats.org/drawingml/2006/main" xmlns:r="http://schemas.openxmlformats.org/officeDocument/2006/relationships" xmlns:p="http://schemas.openxmlformats.org/presentationml/2006/main">
+  <p:cSld>
+    <p:spTree>
+      <p:nvGrpSpPr>
+        <p:cNvPr id="1" name="">
+          <a:extLst>
+            <a:ext uri="{FF2B5EF4-FFF2-40B4-BE49-F238E27FC236}">
+              <a16:creationId xmlns:a16="http://schemas.microsoft.com/office/drawing/2014/main" id="{2020A95D-7449-8411-C9CD-C0A4DD7FE60E}"/>
+            </a:ext>
+          </a:extLst>
+        </p:cNvPr>
+        <p:cNvGrpSpPr/>
+        <p:nvPr/>
+      </p:nvGrpSpPr>
+      <p:grpSpPr>
+        <a:xfrm>
+          <a:off x="0" y="0"/>
+          <a:ext cx="0" cy="0"/>
+          <a:chOff x="0" y="0"/>
+          <a:chExt cx="0" cy="0"/>
+        </a:xfrm>
+      </p:grpSpPr>
+      <p:sp>
+        <p:nvSpPr>
+          <p:cNvPr id="2" name="Title 1">
+            <a:extLst>
+              <a:ext uri="{FF2B5EF4-FFF2-40B4-BE49-F238E27FC236}">
+                <a16:creationId xmlns:a16="http://schemas.microsoft.com/office/drawing/2014/main" id="{F5C3D1BA-C836-EE3B-694B-F0E37731DFC5}"/>
+              </a:ext>
+            </a:extLst>
+          </p:cNvPr>
+          <p:cNvSpPr>
+            <a:spLocks noGrp="1"/>
+          </p:cNvSpPr>
+          <p:nvPr>
+            <p:ph type="title"/>
+          </p:nvPr>
+        </p:nvSpPr>
+        <p:spPr/>
+        <p:txBody>
+          <a:bodyPr>
+            <a:normAutofit/>
+          </a:bodyPr>
+          <a:lstStyle/>
+          <a:p>
+            <a:r>
+              <a:rPr lang="en-US" sz="6000" dirty="0"/>
+              <a:t>3.1. UI Implementation</a:t>
+            </a:r>
+          </a:p>
+        </p:txBody>
+      </p:sp>
+      <p:pic>
+        <p:nvPicPr>
+          <p:cNvPr id="9" name="Picture 8">
+            <a:extLst>
+              <a:ext uri="{FF2B5EF4-FFF2-40B4-BE49-F238E27FC236}">
+                <a16:creationId xmlns:a16="http://schemas.microsoft.com/office/drawing/2014/main" id="{085E7065-CC08-1CD3-4AC6-05F0E499BA2E}"/>
+              </a:ext>
+            </a:extLst>
+          </p:cNvPr>
+          <p:cNvPicPr>
+            <a:picLocks noChangeAspect="1"/>
+          </p:cNvPicPr>
+          <p:nvPr/>
+        </p:nvPicPr>
+        <p:blipFill>
+          <a:blip r:embed="rId2"/>
+          <a:stretch>
+            <a:fillRect/>
+          </a:stretch>
+        </p:blipFill>
+        <p:spPr>
+          <a:xfrm>
+            <a:off x="4876630" y="1292011"/>
+            <a:ext cx="2438740" cy="4982270"/>
+          </a:xfrm>
+          <a:prstGeom prst="rect">
+            <a:avLst/>
+          </a:prstGeom>
+        </p:spPr>
+      </p:pic>
+      <p:pic>
+        <p:nvPicPr>
+          <p:cNvPr id="11" name="Picture 10">
+            <a:extLst>
+              <a:ext uri="{FF2B5EF4-FFF2-40B4-BE49-F238E27FC236}">
+                <a16:creationId xmlns:a16="http://schemas.microsoft.com/office/drawing/2014/main" id="{64E8DD7B-56C7-5953-4602-EC7D1E94C173}"/>
+              </a:ext>
+            </a:extLst>
+          </p:cNvPr>
+          <p:cNvPicPr>
+            <a:picLocks noChangeAspect="1"/>
+          </p:cNvPicPr>
+          <p:nvPr/>
+        </p:nvPicPr>
+        <p:blipFill>
+          <a:blip r:embed="rId3"/>
+          <a:stretch>
+            <a:fillRect/>
+          </a:stretch>
+        </p:blipFill>
+        <p:spPr>
+          <a:xfrm>
+            <a:off x="7735425" y="1258668"/>
+            <a:ext cx="2524477" cy="5020376"/>
+          </a:xfrm>
+          <a:prstGeom prst="rect">
+            <a:avLst/>
+          </a:prstGeom>
+        </p:spPr>
+      </p:pic>
+      <p:pic>
+        <p:nvPicPr>
+          <p:cNvPr id="16" name="Picture 15">
+            <a:extLst>
+              <a:ext uri="{FF2B5EF4-FFF2-40B4-BE49-F238E27FC236}">
+                <a16:creationId xmlns:a16="http://schemas.microsoft.com/office/drawing/2014/main" id="{EE1B147A-0C79-C5D3-6F1E-B3C48885F7D8}"/>
+              </a:ext>
+            </a:extLst>
+          </p:cNvPr>
+          <p:cNvPicPr>
+            <a:picLocks noChangeAspect="1"/>
+          </p:cNvPicPr>
+          <p:nvPr/>
+        </p:nvPicPr>
+        <p:blipFill>
+          <a:blip r:embed="rId4"/>
+          <a:stretch>
+            <a:fillRect/>
+          </a:stretch>
+        </p:blipFill>
+        <p:spPr>
+          <a:xfrm>
+            <a:off x="1961059" y="1263432"/>
+            <a:ext cx="2486372" cy="5010849"/>
+          </a:xfrm>
+          <a:prstGeom prst="rect">
+            <a:avLst/>
+          </a:prstGeom>
+        </p:spPr>
+      </p:pic>
+    </p:spTree>
+    <p:extLst>
+      <p:ext uri="{BB962C8B-B14F-4D97-AF65-F5344CB8AC3E}">
+        <p14:creationId xmlns:p14="http://schemas.microsoft.com/office/powerpoint/2010/main" val="761172681"/>
       </p:ext>
     </p:extLst>
   </p:cSld>
@@ -40190,162 +39969,6 @@
         <p:cNvPr id="1" name="">
           <a:extLst>
             <a:ext uri="{FF2B5EF4-FFF2-40B4-BE49-F238E27FC236}">
-              <a16:creationId xmlns:a16="http://schemas.microsoft.com/office/drawing/2014/main" id="{2020A95D-7449-8411-C9CD-C0A4DD7FE60E}"/>
-            </a:ext>
-          </a:extLst>
-        </p:cNvPr>
-        <p:cNvGrpSpPr/>
-        <p:nvPr/>
-      </p:nvGrpSpPr>
-      <p:grpSpPr>
-        <a:xfrm>
-          <a:off x="0" y="0"/>
-          <a:ext cx="0" cy="0"/>
-          <a:chOff x="0" y="0"/>
-          <a:chExt cx="0" cy="0"/>
-        </a:xfrm>
-      </p:grpSpPr>
-      <p:sp>
-        <p:nvSpPr>
-          <p:cNvPr id="2" name="Title 1">
-            <a:extLst>
-              <a:ext uri="{FF2B5EF4-FFF2-40B4-BE49-F238E27FC236}">
-                <a16:creationId xmlns:a16="http://schemas.microsoft.com/office/drawing/2014/main" id="{F5C3D1BA-C836-EE3B-694B-F0E37731DFC5}"/>
-              </a:ext>
-            </a:extLst>
-          </p:cNvPr>
-          <p:cNvSpPr>
-            <a:spLocks noGrp="1"/>
-          </p:cNvSpPr>
-          <p:nvPr>
-            <p:ph type="title"/>
-          </p:nvPr>
-        </p:nvSpPr>
-        <p:spPr/>
-        <p:txBody>
-          <a:bodyPr>
-            <a:normAutofit/>
-          </a:bodyPr>
-          <a:lstStyle/>
-          <a:p>
-            <a:r>
-              <a:rPr lang="en-US" sz="6000" dirty="0"/>
-              <a:t>3.1. UI Implementation</a:t>
-            </a:r>
-          </a:p>
-        </p:txBody>
-      </p:sp>
-      <p:pic>
-        <p:nvPicPr>
-          <p:cNvPr id="9" name="Picture 8">
-            <a:extLst>
-              <a:ext uri="{FF2B5EF4-FFF2-40B4-BE49-F238E27FC236}">
-                <a16:creationId xmlns:a16="http://schemas.microsoft.com/office/drawing/2014/main" id="{085E7065-CC08-1CD3-4AC6-05F0E499BA2E}"/>
-              </a:ext>
-            </a:extLst>
-          </p:cNvPr>
-          <p:cNvPicPr>
-            <a:picLocks noChangeAspect="1"/>
-          </p:cNvPicPr>
-          <p:nvPr/>
-        </p:nvPicPr>
-        <p:blipFill>
-          <a:blip r:embed="rId2"/>
-          <a:stretch>
-            <a:fillRect/>
-          </a:stretch>
-        </p:blipFill>
-        <p:spPr>
-          <a:xfrm>
-            <a:off x="4876630" y="1292011"/>
-            <a:ext cx="2438740" cy="4982270"/>
-          </a:xfrm>
-          <a:prstGeom prst="rect">
-            <a:avLst/>
-          </a:prstGeom>
-        </p:spPr>
-      </p:pic>
-      <p:pic>
-        <p:nvPicPr>
-          <p:cNvPr id="11" name="Picture 10">
-            <a:extLst>
-              <a:ext uri="{FF2B5EF4-FFF2-40B4-BE49-F238E27FC236}">
-                <a16:creationId xmlns:a16="http://schemas.microsoft.com/office/drawing/2014/main" id="{64E8DD7B-56C7-5953-4602-EC7D1E94C173}"/>
-              </a:ext>
-            </a:extLst>
-          </p:cNvPr>
-          <p:cNvPicPr>
-            <a:picLocks noChangeAspect="1"/>
-          </p:cNvPicPr>
-          <p:nvPr/>
-        </p:nvPicPr>
-        <p:blipFill>
-          <a:blip r:embed="rId3"/>
-          <a:stretch>
-            <a:fillRect/>
-          </a:stretch>
-        </p:blipFill>
-        <p:spPr>
-          <a:xfrm>
-            <a:off x="7735425" y="1258668"/>
-            <a:ext cx="2524477" cy="5020376"/>
-          </a:xfrm>
-          <a:prstGeom prst="rect">
-            <a:avLst/>
-          </a:prstGeom>
-        </p:spPr>
-      </p:pic>
-      <p:pic>
-        <p:nvPicPr>
-          <p:cNvPr id="16" name="Picture 15">
-            <a:extLst>
-              <a:ext uri="{FF2B5EF4-FFF2-40B4-BE49-F238E27FC236}">
-                <a16:creationId xmlns:a16="http://schemas.microsoft.com/office/drawing/2014/main" id="{EE1B147A-0C79-C5D3-6F1E-B3C48885F7D8}"/>
-              </a:ext>
-            </a:extLst>
-          </p:cNvPr>
-          <p:cNvPicPr>
-            <a:picLocks noChangeAspect="1"/>
-          </p:cNvPicPr>
-          <p:nvPr/>
-        </p:nvPicPr>
-        <p:blipFill>
-          <a:blip r:embed="rId4"/>
-          <a:stretch>
-            <a:fillRect/>
-          </a:stretch>
-        </p:blipFill>
-        <p:spPr>
-          <a:xfrm>
-            <a:off x="1961059" y="1263432"/>
-            <a:ext cx="2486372" cy="5010849"/>
-          </a:xfrm>
-          <a:prstGeom prst="rect">
-            <a:avLst/>
-          </a:prstGeom>
-        </p:spPr>
-      </p:pic>
-    </p:spTree>
-    <p:extLst>
-      <p:ext uri="{BB962C8B-B14F-4D97-AF65-F5344CB8AC3E}">
-        <p14:creationId xmlns:p14="http://schemas.microsoft.com/office/powerpoint/2010/main" val="761172681"/>
-      </p:ext>
-    </p:extLst>
-  </p:cSld>
-  <p:clrMapOvr>
-    <a:masterClrMapping/>
-  </p:clrMapOvr>
-</p:sld>
-</file>
-
-<file path=ppt/slides/slide21.xml><?xml version="1.0" encoding="utf-8"?>
-<p:sld xmlns:a="http://schemas.openxmlformats.org/drawingml/2006/main" xmlns:r="http://schemas.openxmlformats.org/officeDocument/2006/relationships" xmlns:p="http://schemas.openxmlformats.org/presentationml/2006/main">
-  <p:cSld>
-    <p:spTree>
-      <p:nvGrpSpPr>
-        <p:cNvPr id="1" name="">
-          <a:extLst>
-            <a:ext uri="{FF2B5EF4-FFF2-40B4-BE49-F238E27FC236}">
               <a16:creationId xmlns:a16="http://schemas.microsoft.com/office/drawing/2014/main" id="{DA2C9BD9-267C-DA7E-5C53-3523265BBE27}"/>
             </a:ext>
           </a:extLst>
@@ -40494,7 +40117,7 @@
 </p:sld>
 </file>
 
-<file path=ppt/slides/slide22.xml><?xml version="1.0" encoding="utf-8"?>
+<file path=ppt/slides/slide21.xml><?xml version="1.0" encoding="utf-8"?>
 <p:sld xmlns:a="http://schemas.openxmlformats.org/drawingml/2006/main" xmlns:r="http://schemas.openxmlformats.org/officeDocument/2006/relationships" xmlns:p="http://schemas.openxmlformats.org/presentationml/2006/main">
   <p:cSld>
     <p:spTree>
@@ -40650,7 +40273,7 @@
 </p:sld>
 </file>
 
-<file path=ppt/slides/slide23.xml><?xml version="1.0" encoding="utf-8"?>
+<file path=ppt/slides/slide22.xml><?xml version="1.0" encoding="utf-8"?>
 <p:sld xmlns:a="http://schemas.openxmlformats.org/drawingml/2006/main" xmlns:r="http://schemas.openxmlformats.org/officeDocument/2006/relationships" xmlns:p="http://schemas.openxmlformats.org/presentationml/2006/main">
   <p:cSld>
     <p:spTree>
@@ -41397,7 +41020,7 @@
 </p:sld>
 </file>
 
-<file path=ppt/slides/slide24.xml><?xml version="1.0" encoding="utf-8"?>
+<file path=ppt/slides/slide23.xml><?xml version="1.0" encoding="utf-8"?>
 <p:sld xmlns:a="http://schemas.openxmlformats.org/drawingml/2006/main" xmlns:r="http://schemas.openxmlformats.org/officeDocument/2006/relationships" xmlns:p="http://schemas.openxmlformats.org/presentationml/2006/main">
   <p:cSld>
     <p:spTree>
@@ -41523,7 +41146,7 @@
 </p:sld>
 </file>
 
-<file path=ppt/slides/slide25.xml><?xml version="1.0" encoding="utf-8"?>
+<file path=ppt/slides/slide24.xml><?xml version="1.0" encoding="utf-8"?>
 <p:sld xmlns:a="http://schemas.openxmlformats.org/drawingml/2006/main" xmlns:r="http://schemas.openxmlformats.org/officeDocument/2006/relationships" xmlns:p="http://schemas.openxmlformats.org/presentationml/2006/main">
   <p:cSld>
     <p:spTree>
@@ -41619,7 +41242,7 @@
 </p:sld>
 </file>
 
-<file path=ppt/slides/slide26.xml><?xml version="1.0" encoding="utf-8"?>
+<file path=ppt/slides/slide25.xml><?xml version="1.0" encoding="utf-8"?>
 <p:sld xmlns:a="http://schemas.openxmlformats.org/drawingml/2006/main" xmlns:r="http://schemas.openxmlformats.org/officeDocument/2006/relationships" xmlns:p="http://schemas.openxmlformats.org/presentationml/2006/main">
   <p:cSld>
     <p:spTree>
@@ -41683,7 +41306,7 @@
 </p:sld>
 </file>
 
-<file path=ppt/slides/slide27.xml><?xml version="1.0" encoding="utf-8"?>
+<file path=ppt/slides/slide26.xml><?xml version="1.0" encoding="utf-8"?>
 <p:sld xmlns:a="http://schemas.openxmlformats.org/drawingml/2006/main" xmlns:r="http://schemas.openxmlformats.org/officeDocument/2006/relationships" xmlns:p="http://schemas.openxmlformats.org/presentationml/2006/main">
   <p:cSld>
     <p:spTree>
@@ -41876,7 +41499,7 @@
 </p:sld>
 </file>
 
-<file path=ppt/slides/slide28.xml><?xml version="1.0" encoding="utf-8"?>
+<file path=ppt/slides/slide27.xml><?xml version="1.0" encoding="utf-8"?>
 <p:sld xmlns:a="http://schemas.openxmlformats.org/drawingml/2006/main" xmlns:r="http://schemas.openxmlformats.org/officeDocument/2006/relationships" xmlns:p="http://schemas.openxmlformats.org/presentationml/2006/main">
   <p:cSld>
     <p:spTree>
@@ -42022,7 +41645,7 @@
 </p:sld>
 </file>
 
-<file path=ppt/slides/slide29.xml><?xml version="1.0" encoding="utf-8"?>
+<file path=ppt/slides/slide28.xml><?xml version="1.0" encoding="utf-8"?>
 <p:sld xmlns:a="http://schemas.openxmlformats.org/drawingml/2006/main" xmlns:r="http://schemas.openxmlformats.org/officeDocument/2006/relationships" xmlns:p="http://schemas.openxmlformats.org/presentationml/2006/main">
   <p:cSld>
     <p:spTree>
@@ -42165,199 +41788,6 @@
     <p:extLst>
       <p:ext uri="{BB962C8B-B14F-4D97-AF65-F5344CB8AC3E}">
         <p14:creationId xmlns:p14="http://schemas.microsoft.com/office/powerpoint/2010/main" val="4232657731"/>
-      </p:ext>
-    </p:extLst>
-  </p:cSld>
-  <p:clrMapOvr>
-    <a:masterClrMapping/>
-  </p:clrMapOvr>
-</p:sld>
-</file>
-
-<file path=ppt/slides/slide30.xml><?xml version="1.0" encoding="utf-8"?>
-<p:sld xmlns:a="http://schemas.openxmlformats.org/drawingml/2006/main" xmlns:r="http://schemas.openxmlformats.org/officeDocument/2006/relationships" xmlns:p="http://schemas.openxmlformats.org/presentationml/2006/main">
-  <p:cSld>
-    <p:spTree>
-      <p:nvGrpSpPr>
-        <p:cNvPr id="1" name="">
-          <a:extLst>
-            <a:ext uri="{FF2B5EF4-FFF2-40B4-BE49-F238E27FC236}">
-              <a16:creationId xmlns:a16="http://schemas.microsoft.com/office/drawing/2014/main" id="{CA10988A-D0E1-75AB-220F-9387E0741A09}"/>
-            </a:ext>
-          </a:extLst>
-        </p:cNvPr>
-        <p:cNvGrpSpPr/>
-        <p:nvPr/>
-      </p:nvGrpSpPr>
-      <p:grpSpPr>
-        <a:xfrm>
-          <a:off x="0" y="0"/>
-          <a:ext cx="0" cy="0"/>
-          <a:chOff x="0" y="0"/>
-          <a:chExt cx="0" cy="0"/>
-        </a:xfrm>
-      </p:grpSpPr>
-      <p:sp>
-        <p:nvSpPr>
-          <p:cNvPr id="2" name="Title 1">
-            <a:extLst>
-              <a:ext uri="{FF2B5EF4-FFF2-40B4-BE49-F238E27FC236}">
-                <a16:creationId xmlns:a16="http://schemas.microsoft.com/office/drawing/2014/main" id="{56CB7F25-6628-CF27-C5CA-22FEF4B89EBC}"/>
-              </a:ext>
-            </a:extLst>
-          </p:cNvPr>
-          <p:cNvSpPr>
-            <a:spLocks noGrp="1"/>
-          </p:cNvSpPr>
-          <p:nvPr>
-            <p:ph type="title"/>
-          </p:nvPr>
-        </p:nvSpPr>
-        <p:spPr/>
-        <p:txBody>
-          <a:bodyPr/>
-          <a:lstStyle/>
-          <a:p>
-            <a:endParaRPr lang="en-US" dirty="0"/>
-          </a:p>
-        </p:txBody>
-      </p:sp>
-      <p:sp>
-        <p:nvSpPr>
-          <p:cNvPr id="3" name="Content Placeholder 2">
-            <a:extLst>
-              <a:ext uri="{FF2B5EF4-FFF2-40B4-BE49-F238E27FC236}">
-                <a16:creationId xmlns:a16="http://schemas.microsoft.com/office/drawing/2014/main" id="{82630AE2-833A-8EEB-48FC-93F020F714C3}"/>
-              </a:ext>
-            </a:extLst>
-          </p:cNvPr>
-          <p:cNvSpPr>
-            <a:spLocks noGrp="1"/>
-          </p:cNvSpPr>
-          <p:nvPr>
-            <p:ph idx="1"/>
-          </p:nvPr>
-        </p:nvSpPr>
-        <p:spPr/>
-        <p:txBody>
-          <a:bodyPr>
-            <a:normAutofit/>
-          </a:bodyPr>
-          <a:lstStyle/>
-          <a:p>
-            <a:endParaRPr lang="en-US" dirty="0"/>
-          </a:p>
-        </p:txBody>
-      </p:sp>
-    </p:spTree>
-    <p:extLst>
-      <p:ext uri="{BB962C8B-B14F-4D97-AF65-F5344CB8AC3E}">
-        <p14:creationId xmlns:p14="http://schemas.microsoft.com/office/powerpoint/2010/main" val="2331155445"/>
-      </p:ext>
-    </p:extLst>
-  </p:cSld>
-  <p:clrMapOvr>
-    <a:masterClrMapping/>
-  </p:clrMapOvr>
-</p:sld>
-</file>
-
-<file path=ppt/slides/slide31.xml><?xml version="1.0" encoding="utf-8"?>
-<p:sld xmlns:a="http://schemas.openxmlformats.org/drawingml/2006/main" xmlns:r="http://schemas.openxmlformats.org/officeDocument/2006/relationships" xmlns:p="http://schemas.openxmlformats.org/presentationml/2006/main">
-  <p:cSld>
-    <p:spTree>
-      <p:nvGrpSpPr>
-        <p:cNvPr id="1" name=""/>
-        <p:cNvGrpSpPr/>
-        <p:nvPr/>
-      </p:nvGrpSpPr>
-      <p:grpSpPr>
-        <a:xfrm>
-          <a:off x="0" y="0"/>
-          <a:ext cx="0" cy="0"/>
-          <a:chOff x="0" y="0"/>
-          <a:chExt cx="0" cy="0"/>
-        </a:xfrm>
-      </p:grpSpPr>
-      <p:sp>
-        <p:nvSpPr>
-          <p:cNvPr id="78" name="Title 77">
-            <a:extLst>
-              <a:ext uri="{FF2B5EF4-FFF2-40B4-BE49-F238E27FC236}">
-                <a16:creationId xmlns:a16="http://schemas.microsoft.com/office/drawing/2014/main" id="{501A25FC-5A3B-300D-8001-38AC2982CF30}"/>
-              </a:ext>
-            </a:extLst>
-          </p:cNvPr>
-          <p:cNvSpPr>
-            <a:spLocks noGrp="1"/>
-          </p:cNvSpPr>
-          <p:nvPr>
-            <p:ph type="ctrTitle"/>
-          </p:nvPr>
-        </p:nvSpPr>
-        <p:spPr/>
-        <p:txBody>
-          <a:bodyPr/>
-          <a:lstStyle/>
-          <a:p>
-            <a:endParaRPr lang="en-US"/>
-          </a:p>
-        </p:txBody>
-      </p:sp>
-      <p:sp>
-        <p:nvSpPr>
-          <p:cNvPr id="79" name="Subtitle 78">
-            <a:extLst>
-              <a:ext uri="{FF2B5EF4-FFF2-40B4-BE49-F238E27FC236}">
-                <a16:creationId xmlns:a16="http://schemas.microsoft.com/office/drawing/2014/main" id="{25975101-BA6B-3E8F-BACA-58D4B16FBF2C}"/>
-              </a:ext>
-            </a:extLst>
-          </p:cNvPr>
-          <p:cNvSpPr>
-            <a:spLocks noGrp="1"/>
-          </p:cNvSpPr>
-          <p:nvPr>
-            <p:ph type="subTitle" idx="1"/>
-          </p:nvPr>
-        </p:nvSpPr>
-        <p:spPr/>
-        <p:txBody>
-          <a:bodyPr/>
-          <a:lstStyle/>
-          <a:p>
-            <a:endParaRPr lang="en-US"/>
-          </a:p>
-        </p:txBody>
-      </p:sp>
-      <p:sp>
-        <p:nvSpPr>
-          <p:cNvPr id="59" name="Picture Placeholder 58">
-            <a:extLst>
-              <a:ext uri="{FF2B5EF4-FFF2-40B4-BE49-F238E27FC236}">
-                <a16:creationId xmlns:a16="http://schemas.microsoft.com/office/drawing/2014/main" id="{C711BF57-35D0-306D-9C25-BF112354CB4E}"/>
-              </a:ext>
-            </a:extLst>
-          </p:cNvPr>
-          <p:cNvSpPr>
-            <a:spLocks noGrp="1"/>
-          </p:cNvSpPr>
-          <p:nvPr>
-            <p:ph type="pic" sz="quarter" idx="15"/>
-          </p:nvPr>
-        </p:nvSpPr>
-        <p:spPr/>
-        <p:txBody>
-          <a:bodyPr/>
-          <a:lstStyle/>
-          <a:p>
-            <a:endParaRPr lang="en-US"/>
-          </a:p>
-        </p:txBody>
-      </p:sp>
-    </p:spTree>
-    <p:extLst>
-      <p:ext uri="{BB962C8B-B14F-4D97-AF65-F5344CB8AC3E}">
-        <p14:creationId xmlns:p14="http://schemas.microsoft.com/office/powerpoint/2010/main" val="3562301540"/>
       </p:ext>
     </p:extLst>
   </p:cSld>
@@ -43118,58 +42548,37 @@
           </a:bodyPr>
           <a:lstStyle/>
           <a:p>
-            <a:r>
-              <a:rPr lang="en-US" b="1" dirty="0"/>
-              <a:t>Vision Transformer (ViT) Model (which model, add it here</a:t>
-            </a:r>
-            <a:r>
-              <a:rPr lang="en-US" b="1"/>
-              <a:t>, pre-trained </a:t>
-            </a:r>
-            <a:r>
-              <a:rPr lang="en-US" b="1" dirty="0"/>
-              <a:t>on?)</a:t>
-            </a:r>
-            <a:endParaRPr lang="en-US" dirty="0"/>
-          </a:p>
-          <a:p>
             <a:pPr marL="342900" indent="-342900">
               <a:buFont typeface="Arial" panose="020B0604020202020204" pitchFamily="34" charset="0"/>
               <a:buChar char="•"/>
             </a:pPr>
             <a:r>
+              <a:rPr lang="en-US" b="1" dirty="0"/>
+              <a:t>Google/vit-base-patch16-224-in21k </a:t>
+            </a:r>
+            <a:r>
               <a:rPr lang="en-US" dirty="0"/>
-              <a:t>Image → split into patches → embedded as tokens.</a:t>
+              <a:t>(Pre-trained on ImageNet-21k)</a:t>
             </a:r>
           </a:p>
           <a:p>
-            <a:pPr marL="342900" indent="-342900">
-              <a:buFont typeface="Arial" panose="020B0604020202020204" pitchFamily="34" charset="0"/>
-              <a:buChar char="•"/>
+            <a:pPr marL="800100" lvl="1" indent="-342900">
+              <a:buFont typeface="Courier New" panose="02070309020205020404" pitchFamily="49" charset="0"/>
+              <a:buChar char="o"/>
             </a:pPr>
             <a:r>
               <a:rPr lang="en-US" dirty="0"/>
-              <a:t>Multi-Head Self-Attention captures global relationships.</a:t>
+              <a:t>Higher accuracy than ResNet-50, EfficientNet, and MobileNet on our mushroom dataset</a:t>
             </a:r>
           </a:p>
           <a:p>
-            <a:pPr marL="342900" indent="-342900">
-              <a:buFont typeface="Arial" panose="020B0604020202020204" pitchFamily="34" charset="0"/>
-              <a:buChar char="•"/>
+            <a:pPr marL="800100" lvl="1" indent="-342900">
+              <a:buFont typeface="Courier New" panose="02070309020205020404" pitchFamily="49" charset="0"/>
+              <a:buChar char="o"/>
             </a:pPr>
             <a:r>
               <a:rPr lang="en-US" dirty="0"/>
-              <a:t>CLS token produces final class prediction.</a:t>
-            </a:r>
-          </a:p>
-          <a:p>
-            <a:pPr marL="342900" indent="-342900">
-              <a:buFont typeface="Arial" panose="020B0604020202020204" pitchFamily="34" charset="0"/>
-              <a:buChar char="•"/>
-            </a:pPr>
-            <a:r>
-              <a:rPr lang="en-US" dirty="0"/>
-              <a:t>Higher accuracy than ResNet-50, EfficientNet and MobileNet on the custom dataset.</a:t>
+              <a:t>Perfect for subtle details and complex textures</a:t>
             </a:r>
           </a:p>
           <a:p>

</xml_diff>

<commit_message>
feat: Final report document update
I have to make peace with my failures
</commit_message>
<xml_diff>
--- a/Báo cáo/ThesisReport.pptx
+++ b/Báo cáo/ThesisReport.pptx
@@ -227,7 +227,7 @@
           <a:p>
             <a:fld id="{36BB93D1-677A-4727-ACB1-B4ED1776CBF7}" type="datetimeFigureOut">
               <a:rPr lang="vi-VN" smtClean="0"/>
-              <a:t>16/12/2025</a:t>
+              <a:t>17/12/2025</a:t>
             </a:fld>
             <a:endParaRPr lang="vi-VN"/>
           </a:p>
@@ -4738,7 +4738,7 @@
             <a:fld id="{D86B3AB3-BDCC-41BF-8781-963E853753C3}" type="datetime1">
               <a:rPr lang="en-US" smtClean="0"/>
               <a:pPr/>
-              <a:t>16-Dec-25</a:t>
+              <a:t>17-Dec-25</a:t>
             </a:fld>
             <a:endParaRPr lang="en-US"/>
           </a:p>
@@ -6011,7 +6011,7 @@
             <a:fld id="{D86B3AB3-BDCC-41BF-8781-963E853753C3}" type="datetime1">
               <a:rPr lang="en-US" smtClean="0"/>
               <a:pPr/>
-              <a:t>16-Dec-25</a:t>
+              <a:t>17-Dec-25</a:t>
             </a:fld>
             <a:endParaRPr lang="en-US"/>
           </a:p>
@@ -7108,7 +7108,7 @@
             <a:fld id="{D86B3AB3-BDCC-41BF-8781-963E853753C3}" type="datetime1">
               <a:rPr lang="en-US" smtClean="0"/>
               <a:pPr/>
-              <a:t>16-Dec-25</a:t>
+              <a:t>17-Dec-25</a:t>
             </a:fld>
             <a:endParaRPr lang="en-US"/>
           </a:p>
@@ -8233,7 +8233,7 @@
             <a:fld id="{D86B3AB3-BDCC-41BF-8781-963E853753C3}" type="datetime1">
               <a:rPr lang="en-US" smtClean="0"/>
               <a:pPr/>
-              <a:t>16-Dec-25</a:t>
+              <a:t>17-Dec-25</a:t>
             </a:fld>
             <a:endParaRPr lang="en-US"/>
           </a:p>
@@ -9216,7 +9216,7 @@
             <a:fld id="{D86B3AB3-BDCC-41BF-8781-963E853753C3}" type="datetime1">
               <a:rPr lang="en-US" smtClean="0"/>
               <a:pPr/>
-              <a:t>16-Dec-25</a:t>
+              <a:t>17-Dec-25</a:t>
             </a:fld>
             <a:endParaRPr lang="en-US"/>
           </a:p>
@@ -10199,7 +10199,7 @@
             <a:fld id="{D86B3AB3-BDCC-41BF-8781-963E853753C3}" type="datetime1">
               <a:rPr lang="en-US" smtClean="0"/>
               <a:pPr/>
-              <a:t>16-Dec-25</a:t>
+              <a:t>17-Dec-25</a:t>
             </a:fld>
             <a:endParaRPr lang="en-US"/>
           </a:p>
@@ -11203,7 +11203,7 @@
             <a:fld id="{D86B3AB3-BDCC-41BF-8781-963E853753C3}" type="datetime1">
               <a:rPr lang="en-US" smtClean="0"/>
               <a:pPr/>
-              <a:t>16-Dec-25</a:t>
+              <a:t>17-Dec-25</a:t>
             </a:fld>
             <a:endParaRPr lang="en-US"/>
           </a:p>
@@ -12292,7 +12292,7 @@
             <a:fld id="{D86B3AB3-BDCC-41BF-8781-963E853753C3}" type="datetime1">
               <a:rPr lang="en-US" smtClean="0"/>
               <a:pPr/>
-              <a:t>16-Dec-25</a:t>
+              <a:t>17-Dec-25</a:t>
             </a:fld>
             <a:endParaRPr lang="en-US"/>
           </a:p>
@@ -13202,7 +13202,7 @@
             <a:fld id="{D86B3AB3-BDCC-41BF-8781-963E853753C3}" type="datetime1">
               <a:rPr lang="en-US" smtClean="0"/>
               <a:pPr/>
-              <a:t>16-Dec-25</a:t>
+              <a:t>17-Dec-25</a:t>
             </a:fld>
             <a:endParaRPr lang="en-US"/>
           </a:p>
@@ -14649,7 +14649,7 @@
             <a:fld id="{D86B3AB3-BDCC-41BF-8781-963E853753C3}" type="datetime1">
               <a:rPr lang="en-US" smtClean="0"/>
               <a:pPr/>
-              <a:t>16-Dec-25</a:t>
+              <a:t>17-Dec-25</a:t>
             </a:fld>
             <a:endParaRPr lang="en-US"/>
           </a:p>
@@ -15868,7 +15868,7 @@
             <a:fld id="{D86B3AB3-BDCC-41BF-8781-963E853753C3}" type="datetime1">
               <a:rPr lang="en-US" smtClean="0"/>
               <a:pPr/>
-              <a:t>16-Dec-25</a:t>
+              <a:t>17-Dec-25</a:t>
             </a:fld>
             <a:endParaRPr lang="en-US"/>
           </a:p>
@@ -16689,7 +16689,7 @@
             <a:fld id="{D86B3AB3-BDCC-41BF-8781-963E853753C3}" type="datetime1">
               <a:rPr lang="en-US" smtClean="0"/>
               <a:pPr/>
-              <a:t>16-Dec-25</a:t>
+              <a:t>17-Dec-25</a:t>
             </a:fld>
             <a:endParaRPr lang="en-US"/>
           </a:p>
@@ -17899,7 +17899,7 @@
             <a:fld id="{D86B3AB3-BDCC-41BF-8781-963E853753C3}" type="datetime1">
               <a:rPr lang="en-US" smtClean="0"/>
               <a:pPr/>
-              <a:t>16-Dec-25</a:t>
+              <a:t>17-Dec-25</a:t>
             </a:fld>
             <a:endParaRPr lang="en-US"/>
           </a:p>
@@ -18743,7 +18743,7 @@
             <a:fld id="{D86B3AB3-BDCC-41BF-8781-963E853753C3}" type="datetime1">
               <a:rPr lang="en-US" smtClean="0"/>
               <a:pPr/>
-              <a:t>16-Dec-25</a:t>
+              <a:t>17-Dec-25</a:t>
             </a:fld>
             <a:endParaRPr lang="en-US"/>
           </a:p>
@@ -19448,7 +19448,7 @@
             <a:fld id="{D86B3AB3-BDCC-41BF-8781-963E853753C3}" type="datetime1">
               <a:rPr lang="en-US" smtClean="0"/>
               <a:pPr/>
-              <a:t>16-Dec-25</a:t>
+              <a:t>17-Dec-25</a:t>
             </a:fld>
             <a:endParaRPr lang="en-US"/>
           </a:p>
@@ -20174,7 +20174,7 @@
             <a:fld id="{D86B3AB3-BDCC-41BF-8781-963E853753C3}" type="datetime1">
               <a:rPr lang="en-US" smtClean="0"/>
               <a:pPr/>
-              <a:t>16-Dec-25</a:t>
+              <a:t>17-Dec-25</a:t>
             </a:fld>
             <a:endParaRPr lang="en-US"/>
           </a:p>
@@ -20974,7 +20974,7 @@
             <a:fld id="{D86B3AB3-BDCC-41BF-8781-963E853753C3}" type="datetime1">
               <a:rPr lang="en-US" smtClean="0"/>
               <a:pPr/>
-              <a:t>16-Dec-25</a:t>
+              <a:t>17-Dec-25</a:t>
             </a:fld>
             <a:endParaRPr lang="en-US"/>
           </a:p>
@@ -21777,7 +21777,7 @@
             <a:fld id="{D86B3AB3-BDCC-41BF-8781-963E853753C3}" type="datetime1">
               <a:rPr lang="en-US" smtClean="0"/>
               <a:pPr/>
-              <a:t>16-Dec-25</a:t>
+              <a:t>17-Dec-25</a:t>
             </a:fld>
             <a:endParaRPr lang="en-US"/>
           </a:p>
@@ -24751,7 +24751,7 @@
             <a:fld id="{D86B3AB3-BDCC-41BF-8781-963E853753C3}" type="datetime1">
               <a:rPr lang="en-US" smtClean="0"/>
               <a:pPr/>
-              <a:t>16-Dec-25</a:t>
+              <a:t>17-Dec-25</a:t>
             </a:fld>
             <a:endParaRPr lang="en-US"/>
           </a:p>
@@ -27881,7 +27881,7 @@
             <a:fld id="{D86B3AB3-BDCC-41BF-8781-963E853753C3}" type="datetime1">
               <a:rPr lang="en-US" smtClean="0"/>
               <a:pPr/>
-              <a:t>16-Dec-25</a:t>
+              <a:t>17-Dec-25</a:t>
             </a:fld>
             <a:endParaRPr lang="en-US"/>
           </a:p>
@@ -28897,7 +28897,7 @@
             <a:fld id="{D86B3AB3-BDCC-41BF-8781-963E853753C3}" type="datetime1">
               <a:rPr lang="en-US" smtClean="0"/>
               <a:pPr/>
-              <a:t>16-Dec-25</a:t>
+              <a:t>17-Dec-25</a:t>
             </a:fld>
             <a:endParaRPr lang="en-US"/>
           </a:p>
@@ -30999,7 +30999,7 @@
             <a:fld id="{D86B3AB3-BDCC-41BF-8781-963E853753C3}" type="datetime1">
               <a:rPr lang="en-US" smtClean="0"/>
               <a:pPr/>
-              <a:t>16-Dec-25</a:t>
+              <a:t>17-Dec-25</a:t>
             </a:fld>
             <a:endParaRPr lang="en-US"/>
           </a:p>
@@ -33194,7 +33194,7 @@
             <a:fld id="{D86B3AB3-BDCC-41BF-8781-963E853753C3}" type="datetime1">
               <a:rPr lang="en-US" smtClean="0"/>
               <a:pPr/>
-              <a:t>16-Dec-25</a:t>
+              <a:t>17-Dec-25</a:t>
             </a:fld>
             <a:endParaRPr lang="en-US"/>
           </a:p>
@@ -34381,7 +34381,7 @@
             <a:fld id="{D86B3AB3-BDCC-41BF-8781-963E853753C3}" type="datetime1">
               <a:rPr lang="en-US" smtClean="0"/>
               <a:pPr/>
-              <a:t>16-Dec-25</a:t>
+              <a:t>17-Dec-25</a:t>
             </a:fld>
             <a:endParaRPr lang="en-US"/>
           </a:p>
@@ -35461,7 +35461,7 @@
             <a:fld id="{D86B3AB3-BDCC-41BF-8781-963E853753C3}" type="datetime1">
               <a:rPr lang="en-US" smtClean="0"/>
               <a:pPr/>
-              <a:t>16-Dec-25</a:t>
+              <a:t>17-Dec-25</a:t>
             </a:fld>
             <a:endParaRPr lang="en-US"/>
           </a:p>
@@ -36418,7 +36418,7 @@
             <a:fld id="{D86B3AB3-BDCC-41BF-8781-963E853753C3}" type="datetime1">
               <a:rPr lang="en-US" smtClean="0"/>
               <a:pPr/>
-              <a:t>16-Dec-25</a:t>
+              <a:t>17-Dec-25</a:t>
             </a:fld>
             <a:endParaRPr lang="en-US"/>
           </a:p>
@@ -37321,7 +37321,7 @@
             <a:fld id="{D86B3AB3-BDCC-41BF-8781-963E853753C3}" type="datetime1">
               <a:rPr lang="en-US" smtClean="0"/>
               <a:pPr/>
-              <a:t>16-Dec-25</a:t>
+              <a:t>17-Dec-25</a:t>
             </a:fld>
             <a:endParaRPr lang="en-US"/>
           </a:p>
@@ -38256,7 +38256,7 @@
             <a:fld id="{D86B3AB3-BDCC-41BF-8781-963E853753C3}" type="datetime1">
               <a:rPr lang="en-US" smtClean="0"/>
               <a:pPr/>
-              <a:t>16-Dec-25</a:t>
+              <a:t>17-Dec-25</a:t>
             </a:fld>
             <a:endParaRPr lang="en-US"/>
           </a:p>
@@ -39285,7 +39285,7 @@
             <a:fld id="{D86B3AB3-BDCC-41BF-8781-963E853753C3}" type="datetime1">
               <a:rPr lang="en-US" smtClean="0"/>
               <a:pPr/>
-              <a:t>16-Dec-25</a:t>
+              <a:t>17-Dec-25</a:t>
             </a:fld>
             <a:endParaRPr lang="en-US"/>
           </a:p>
@@ -39676,7 +39676,7 @@
             <a:fld id="{00D1CE85-AA59-46D7-98F4-301D80B40614}" type="datetimeFigureOut">
               <a:rPr lang="en-US" smtClean="0"/>
               <a:pPr/>
-              <a:t>16-Dec-25</a:t>
+              <a:t>17-Dec-25</a:t>
             </a:fld>
             <a:endParaRPr lang="en-US"/>
           </a:p>
@@ -41040,8 +41040,13 @@
           <a:p>
             <a:r>
               <a:rPr lang="en-US" sz="6000" dirty="0"/>
-              <a:t>2.6. Main System Workflows</a:t>
+              <a:t>2.6. Main </a:t>
             </a:r>
+            <a:r>
+              <a:rPr lang="en-US" sz="6000"/>
+              <a:t>System Workflows</a:t>
+            </a:r>
+            <a:endParaRPr lang="en-US" sz="6000" dirty="0"/>
           </a:p>
         </p:txBody>
       </p:sp>
@@ -41825,8 +41830,8 @@
           </a:p>
         </p:txBody>
       </p:sp>
-      <mc:AlternateContent xmlns:mc="http://schemas.openxmlformats.org/markup-compatibility/2006">
-        <mc:Choice xmlns:a14="http://schemas.microsoft.com/office/drawing/2010/main" Requires="a14">
+      <mc:AlternateContent xmlns:mc="http://schemas.openxmlformats.org/markup-compatibility/2006" xmlns:a14="http://schemas.microsoft.com/office/drawing/2010/main">
+        <mc:Choice Requires="a14">
           <p:sp>
             <p:nvSpPr>
               <p:cNvPr id="8" name="Content Placeholder 2">
@@ -42549,7 +42554,7 @@
             </p:txBody>
           </p:sp>
         </mc:Choice>
-        <mc:Fallback>
+        <mc:Fallback xmlns="">
           <p:sp>
             <p:nvSpPr>
               <p:cNvPr id="8" name="Content Placeholder 2">
@@ -43001,8 +43006,8 @@
           </a:p>
         </p:txBody>
       </p:sp>
-      <mc:AlternateContent xmlns:mc="http://schemas.openxmlformats.org/markup-compatibility/2006">
-        <mc:Choice xmlns:a14="http://schemas.microsoft.com/office/drawing/2010/main" Requires="a14">
+      <mc:AlternateContent xmlns:mc="http://schemas.openxmlformats.org/markup-compatibility/2006" xmlns:a14="http://schemas.microsoft.com/office/drawing/2010/main">
+        <mc:Choice Requires="a14">
           <p:sp>
             <p:nvSpPr>
               <p:cNvPr id="8" name="Content Placeholder 2">
@@ -43585,7 +43590,7 @@
             </p:txBody>
           </p:sp>
         </mc:Choice>
-        <mc:Fallback>
+        <mc:Fallback xmlns="">
           <p:sp>
             <p:nvSpPr>
               <p:cNvPr id="8" name="Content Placeholder 2">
@@ -44242,8 +44247,8 @@
           </a:p>
         </p:txBody>
       </p:sp>
-      <mc:AlternateContent xmlns:mc="http://schemas.openxmlformats.org/markup-compatibility/2006">
-        <mc:Choice xmlns:a14="http://schemas.microsoft.com/office/drawing/2010/main" Requires="a14">
+      <mc:AlternateContent xmlns:mc="http://schemas.openxmlformats.org/markup-compatibility/2006" xmlns:a14="http://schemas.microsoft.com/office/drawing/2010/main">
+        <mc:Choice Requires="a14">
           <p:sp>
             <p:nvSpPr>
               <p:cNvPr id="8" name="Content Placeholder 2">
@@ -44435,7 +44440,6 @@
                 </a:endParaRPr>
               </a:p>
               <a:p>
-                <a:pPr/>
                 <a:endParaRPr lang="en-US" sz="800" dirty="0">
                   <a:latin typeface="Cambria Math" panose="02040503050406030204" pitchFamily="18" charset="0"/>
                   <a:ea typeface="Cambria Math" panose="02040503050406030204" pitchFamily="18" charset="0"/>
@@ -44602,7 +44606,7 @@
             </p:txBody>
           </p:sp>
         </mc:Choice>
-        <mc:Fallback>
+        <mc:Fallback xmlns="">
           <p:sp>
             <p:nvSpPr>
               <p:cNvPr id="8" name="Content Placeholder 2">

</xml_diff>